<commit_message>
<updated deck, draft 2 - more content, prelim data, outstanding needs>
</commit_message>
<xml_diff>
--- a/Group_project_deck.pptx
+++ b/Group_project_deck.pptx
@@ -4,16 +4,22 @@
   <p:sldMasterIdLst>
     <p:sldMasterId id="2147483648" r:id="rId1"/>
   </p:sldMasterIdLst>
+  <p:notesMasterIdLst>
+    <p:notesMasterId r:id="rId14"/>
+  </p:notesMasterIdLst>
   <p:sldIdLst>
-    <p:sldId id="256" r:id="rId2"/>
+    <p:sldId id="265" r:id="rId2"/>
     <p:sldId id="257" r:id="rId3"/>
     <p:sldId id="258" r:id="rId4"/>
     <p:sldId id="259" r:id="rId5"/>
-    <p:sldId id="260" r:id="rId6"/>
-    <p:sldId id="261" r:id="rId7"/>
+    <p:sldId id="261" r:id="rId6"/>
+    <p:sldId id="260" r:id="rId7"/>
     <p:sldId id="262" r:id="rId8"/>
-    <p:sldId id="263" r:id="rId9"/>
+    <p:sldId id="266" r:id="rId9"/>
     <p:sldId id="264" r:id="rId10"/>
+    <p:sldId id="268" r:id="rId11"/>
+    <p:sldId id="263" r:id="rId12"/>
+    <p:sldId id="267" r:id="rId13"/>
   </p:sldIdLst>
   <p:sldSz cx="12192000" cy="6858000"/>
   <p:notesSz cx="6858000" cy="9144000"/>
@@ -112,7 +118,790 @@
       </a:defRPr>
     </a:lvl9pPr>
   </p:defaultTextStyle>
+  <p:extLst>
+    <p:ext uri="{EFAFB233-063F-42B5-8137-9DF3F51BA10A}">
+      <p15:sldGuideLst xmlns:p15="http://schemas.microsoft.com/office/powerpoint/2012/main"/>
+    </p:ext>
+  </p:extLst>
 </p:presentation>
+</file>
+
+<file path=ppt/notesMasters/notesMaster1.xml><?xml version="1.0" encoding="utf-8"?>
+<p:notesMaster xmlns:a="http://schemas.openxmlformats.org/drawingml/2006/main" xmlns:r="http://schemas.openxmlformats.org/officeDocument/2006/relationships" xmlns:p="http://schemas.openxmlformats.org/presentationml/2006/main">
+  <p:cSld>
+    <p:bg>
+      <p:bgRef idx="1001">
+        <a:schemeClr val="bg1"/>
+      </p:bgRef>
+    </p:bg>
+    <p:spTree>
+      <p:nvGrpSpPr>
+        <p:cNvPr id="1" name=""/>
+        <p:cNvGrpSpPr/>
+        <p:nvPr/>
+      </p:nvGrpSpPr>
+      <p:grpSpPr>
+        <a:xfrm>
+          <a:off x="0" y="0"/>
+          <a:ext cx="0" cy="0"/>
+          <a:chOff x="0" y="0"/>
+          <a:chExt cx="0" cy="0"/>
+        </a:xfrm>
+      </p:grpSpPr>
+      <p:sp>
+        <p:nvSpPr>
+          <p:cNvPr id="2" name="Header Placeholder 1"/>
+          <p:cNvSpPr>
+            <a:spLocks noGrp="1"/>
+          </p:cNvSpPr>
+          <p:nvPr>
+            <p:ph type="hdr" sz="quarter"/>
+          </p:nvPr>
+        </p:nvSpPr>
+        <p:spPr>
+          <a:xfrm>
+            <a:off x="0" y="0"/>
+            <a:ext cx="2971800" cy="458788"/>
+          </a:xfrm>
+          <a:prstGeom prst="rect">
+            <a:avLst/>
+          </a:prstGeom>
+        </p:spPr>
+        <p:txBody>
+          <a:bodyPr vert="horz" lIns="91440" tIns="45720" rIns="91440" bIns="45720" rtlCol="0"/>
+          <a:lstStyle>
+            <a:lvl1pPr algn="l">
+              <a:defRPr sz="1200"/>
+            </a:lvl1pPr>
+          </a:lstStyle>
+          <a:p>
+            <a:endParaRPr lang="en-US"/>
+          </a:p>
+        </p:txBody>
+      </p:sp>
+      <p:sp>
+        <p:nvSpPr>
+          <p:cNvPr id="3" name="Date Placeholder 2"/>
+          <p:cNvSpPr>
+            <a:spLocks noGrp="1"/>
+          </p:cNvSpPr>
+          <p:nvPr>
+            <p:ph type="dt" idx="1"/>
+          </p:nvPr>
+        </p:nvSpPr>
+        <p:spPr>
+          <a:xfrm>
+            <a:off x="3884613" y="0"/>
+            <a:ext cx="2971800" cy="458788"/>
+          </a:xfrm>
+          <a:prstGeom prst="rect">
+            <a:avLst/>
+          </a:prstGeom>
+        </p:spPr>
+        <p:txBody>
+          <a:bodyPr vert="horz" lIns="91440" tIns="45720" rIns="91440" bIns="45720" rtlCol="0"/>
+          <a:lstStyle>
+            <a:lvl1pPr algn="r">
+              <a:defRPr sz="1200"/>
+            </a:lvl1pPr>
+          </a:lstStyle>
+          <a:p>
+            <a:fld id="{46BE0A99-7F05-42F8-8D10-B7D701853D1D}" type="datetimeFigureOut">
+              <a:rPr lang="en-US" smtClean="0"/>
+              <a:t>10/17/2020</a:t>
+            </a:fld>
+            <a:endParaRPr lang="en-US"/>
+          </a:p>
+        </p:txBody>
+      </p:sp>
+      <p:sp>
+        <p:nvSpPr>
+          <p:cNvPr id="4" name="Slide Image Placeholder 3"/>
+          <p:cNvSpPr>
+            <a:spLocks noGrp="1" noRot="1" noChangeAspect="1"/>
+          </p:cNvSpPr>
+          <p:nvPr>
+            <p:ph type="sldImg" idx="2"/>
+          </p:nvPr>
+        </p:nvSpPr>
+        <p:spPr>
+          <a:xfrm>
+            <a:off x="685800" y="1143000"/>
+            <a:ext cx="5486400" cy="3086100"/>
+          </a:xfrm>
+          <a:prstGeom prst="rect">
+            <a:avLst/>
+          </a:prstGeom>
+          <a:noFill/>
+          <a:ln w="12700">
+            <a:solidFill>
+              <a:prstClr val="black"/>
+            </a:solidFill>
+          </a:ln>
+        </p:spPr>
+        <p:txBody>
+          <a:bodyPr vert="horz" lIns="91440" tIns="45720" rIns="91440" bIns="45720" rtlCol="0" anchor="ctr"/>
+          <a:lstStyle/>
+          <a:p>
+            <a:endParaRPr lang="en-US"/>
+          </a:p>
+        </p:txBody>
+      </p:sp>
+      <p:sp>
+        <p:nvSpPr>
+          <p:cNvPr id="5" name="Notes Placeholder 4"/>
+          <p:cNvSpPr>
+            <a:spLocks noGrp="1"/>
+          </p:cNvSpPr>
+          <p:nvPr>
+            <p:ph type="body" sz="quarter" idx="3"/>
+          </p:nvPr>
+        </p:nvSpPr>
+        <p:spPr>
+          <a:xfrm>
+            <a:off x="685800" y="4400550"/>
+            <a:ext cx="5486400" cy="3600450"/>
+          </a:xfrm>
+          <a:prstGeom prst="rect">
+            <a:avLst/>
+          </a:prstGeom>
+        </p:spPr>
+        <p:txBody>
+          <a:bodyPr vert="horz" lIns="91440" tIns="45720" rIns="91440" bIns="45720" rtlCol="0"/>
+          <a:lstStyle/>
+          <a:p>
+            <a:pPr lvl="0"/>
+            <a:r>
+              <a:rPr lang="en-US"/>
+              <a:t>Click to edit Master text styles</a:t>
+            </a:r>
+          </a:p>
+          <a:p>
+            <a:pPr lvl="1"/>
+            <a:r>
+              <a:rPr lang="en-US"/>
+              <a:t>Second level</a:t>
+            </a:r>
+          </a:p>
+          <a:p>
+            <a:pPr lvl="2"/>
+            <a:r>
+              <a:rPr lang="en-US"/>
+              <a:t>Third level</a:t>
+            </a:r>
+          </a:p>
+          <a:p>
+            <a:pPr lvl="3"/>
+            <a:r>
+              <a:rPr lang="en-US"/>
+              <a:t>Fourth level</a:t>
+            </a:r>
+          </a:p>
+          <a:p>
+            <a:pPr lvl="4"/>
+            <a:r>
+              <a:rPr lang="en-US"/>
+              <a:t>Fifth level</a:t>
+            </a:r>
+          </a:p>
+        </p:txBody>
+      </p:sp>
+      <p:sp>
+        <p:nvSpPr>
+          <p:cNvPr id="6" name="Footer Placeholder 5"/>
+          <p:cNvSpPr>
+            <a:spLocks noGrp="1"/>
+          </p:cNvSpPr>
+          <p:nvPr>
+            <p:ph type="ftr" sz="quarter" idx="4"/>
+          </p:nvPr>
+        </p:nvSpPr>
+        <p:spPr>
+          <a:xfrm>
+            <a:off x="0" y="8685213"/>
+            <a:ext cx="2971800" cy="458787"/>
+          </a:xfrm>
+          <a:prstGeom prst="rect">
+            <a:avLst/>
+          </a:prstGeom>
+        </p:spPr>
+        <p:txBody>
+          <a:bodyPr vert="horz" lIns="91440" tIns="45720" rIns="91440" bIns="45720" rtlCol="0" anchor="b"/>
+          <a:lstStyle>
+            <a:lvl1pPr algn="l">
+              <a:defRPr sz="1200"/>
+            </a:lvl1pPr>
+          </a:lstStyle>
+          <a:p>
+            <a:endParaRPr lang="en-US"/>
+          </a:p>
+        </p:txBody>
+      </p:sp>
+      <p:sp>
+        <p:nvSpPr>
+          <p:cNvPr id="7" name="Slide Number Placeholder 6"/>
+          <p:cNvSpPr>
+            <a:spLocks noGrp="1"/>
+          </p:cNvSpPr>
+          <p:nvPr>
+            <p:ph type="sldNum" sz="quarter" idx="5"/>
+          </p:nvPr>
+        </p:nvSpPr>
+        <p:spPr>
+          <a:xfrm>
+            <a:off x="3884613" y="8685213"/>
+            <a:ext cx="2971800" cy="458787"/>
+          </a:xfrm>
+          <a:prstGeom prst="rect">
+            <a:avLst/>
+          </a:prstGeom>
+        </p:spPr>
+        <p:txBody>
+          <a:bodyPr vert="horz" lIns="91440" tIns="45720" rIns="91440" bIns="45720" rtlCol="0" anchor="b"/>
+          <a:lstStyle>
+            <a:lvl1pPr algn="r">
+              <a:defRPr sz="1200"/>
+            </a:lvl1pPr>
+          </a:lstStyle>
+          <a:p>
+            <a:fld id="{1F88B8BE-972A-4AD0-BD0D-E769440C7A47}" type="slidenum">
+              <a:rPr lang="en-US" smtClean="0"/>
+              <a:t>‹#›</a:t>
+            </a:fld>
+            <a:endParaRPr lang="en-US"/>
+          </a:p>
+        </p:txBody>
+      </p:sp>
+    </p:spTree>
+    <p:extLst>
+      <p:ext uri="{BB962C8B-B14F-4D97-AF65-F5344CB8AC3E}">
+        <p14:creationId xmlns:p14="http://schemas.microsoft.com/office/powerpoint/2010/main" val="1844994203"/>
+      </p:ext>
+    </p:extLst>
+  </p:cSld>
+  <p:clrMap bg1="lt1" tx1="dk1" bg2="lt2" tx2="dk2" accent1="accent1" accent2="accent2" accent3="accent3" accent4="accent4" accent5="accent5" accent6="accent6" hlink="hlink" folHlink="folHlink"/>
+  <p:notesStyle>
+    <a:lvl1pPr marL="0" algn="l" defTabSz="914400" rtl="0" eaLnBrk="1" latinLnBrk="0" hangingPunct="1">
+      <a:defRPr sz="1200" kern="1200">
+        <a:solidFill>
+          <a:schemeClr val="tx1"/>
+        </a:solidFill>
+        <a:latin typeface="+mn-lt"/>
+        <a:ea typeface="+mn-ea"/>
+        <a:cs typeface="+mn-cs"/>
+      </a:defRPr>
+    </a:lvl1pPr>
+    <a:lvl2pPr marL="457200" algn="l" defTabSz="914400" rtl="0" eaLnBrk="1" latinLnBrk="0" hangingPunct="1">
+      <a:defRPr sz="1200" kern="1200">
+        <a:solidFill>
+          <a:schemeClr val="tx1"/>
+        </a:solidFill>
+        <a:latin typeface="+mn-lt"/>
+        <a:ea typeface="+mn-ea"/>
+        <a:cs typeface="+mn-cs"/>
+      </a:defRPr>
+    </a:lvl2pPr>
+    <a:lvl3pPr marL="914400" algn="l" defTabSz="914400" rtl="0" eaLnBrk="1" latinLnBrk="0" hangingPunct="1">
+      <a:defRPr sz="1200" kern="1200">
+        <a:solidFill>
+          <a:schemeClr val="tx1"/>
+        </a:solidFill>
+        <a:latin typeface="+mn-lt"/>
+        <a:ea typeface="+mn-ea"/>
+        <a:cs typeface="+mn-cs"/>
+      </a:defRPr>
+    </a:lvl3pPr>
+    <a:lvl4pPr marL="1371600" algn="l" defTabSz="914400" rtl="0" eaLnBrk="1" latinLnBrk="0" hangingPunct="1">
+      <a:defRPr sz="1200" kern="1200">
+        <a:solidFill>
+          <a:schemeClr val="tx1"/>
+        </a:solidFill>
+        <a:latin typeface="+mn-lt"/>
+        <a:ea typeface="+mn-ea"/>
+        <a:cs typeface="+mn-cs"/>
+      </a:defRPr>
+    </a:lvl4pPr>
+    <a:lvl5pPr marL="1828800" algn="l" defTabSz="914400" rtl="0" eaLnBrk="1" latinLnBrk="0" hangingPunct="1">
+      <a:defRPr sz="1200" kern="1200">
+        <a:solidFill>
+          <a:schemeClr val="tx1"/>
+        </a:solidFill>
+        <a:latin typeface="+mn-lt"/>
+        <a:ea typeface="+mn-ea"/>
+        <a:cs typeface="+mn-cs"/>
+      </a:defRPr>
+    </a:lvl5pPr>
+    <a:lvl6pPr marL="2286000" algn="l" defTabSz="914400" rtl="0" eaLnBrk="1" latinLnBrk="0" hangingPunct="1">
+      <a:defRPr sz="1200" kern="1200">
+        <a:solidFill>
+          <a:schemeClr val="tx1"/>
+        </a:solidFill>
+        <a:latin typeface="+mn-lt"/>
+        <a:ea typeface="+mn-ea"/>
+        <a:cs typeface="+mn-cs"/>
+      </a:defRPr>
+    </a:lvl6pPr>
+    <a:lvl7pPr marL="2743200" algn="l" defTabSz="914400" rtl="0" eaLnBrk="1" latinLnBrk="0" hangingPunct="1">
+      <a:defRPr sz="1200" kern="1200">
+        <a:solidFill>
+          <a:schemeClr val="tx1"/>
+        </a:solidFill>
+        <a:latin typeface="+mn-lt"/>
+        <a:ea typeface="+mn-ea"/>
+        <a:cs typeface="+mn-cs"/>
+      </a:defRPr>
+    </a:lvl7pPr>
+    <a:lvl8pPr marL="3200400" algn="l" defTabSz="914400" rtl="0" eaLnBrk="1" latinLnBrk="0" hangingPunct="1">
+      <a:defRPr sz="1200" kern="1200">
+        <a:solidFill>
+          <a:schemeClr val="tx1"/>
+        </a:solidFill>
+        <a:latin typeface="+mn-lt"/>
+        <a:ea typeface="+mn-ea"/>
+        <a:cs typeface="+mn-cs"/>
+      </a:defRPr>
+    </a:lvl8pPr>
+    <a:lvl9pPr marL="3657600" algn="l" defTabSz="914400" rtl="0" eaLnBrk="1" latinLnBrk="0" hangingPunct="1">
+      <a:defRPr sz="1200" kern="1200">
+        <a:solidFill>
+          <a:schemeClr val="tx1"/>
+        </a:solidFill>
+        <a:latin typeface="+mn-lt"/>
+        <a:ea typeface="+mn-ea"/>
+        <a:cs typeface="+mn-cs"/>
+      </a:defRPr>
+    </a:lvl9pPr>
+  </p:notesStyle>
+</p:notesMaster>
+</file>
+
+<file path=ppt/notesSlides/notesSlide1.xml><?xml version="1.0" encoding="utf-8"?>
+<p:notes xmlns:a="http://schemas.openxmlformats.org/drawingml/2006/main" xmlns:r="http://schemas.openxmlformats.org/officeDocument/2006/relationships" xmlns:p="http://schemas.openxmlformats.org/presentationml/2006/main">
+  <p:cSld>
+    <p:spTree>
+      <p:nvGrpSpPr>
+        <p:cNvPr id="1" name=""/>
+        <p:cNvGrpSpPr/>
+        <p:nvPr/>
+      </p:nvGrpSpPr>
+      <p:grpSpPr>
+        <a:xfrm>
+          <a:off x="0" y="0"/>
+          <a:ext cx="0" cy="0"/>
+          <a:chOff x="0" y="0"/>
+          <a:chExt cx="0" cy="0"/>
+        </a:xfrm>
+      </p:grpSpPr>
+      <p:sp>
+        <p:nvSpPr>
+          <p:cNvPr id="2" name="Slide Image Placeholder 1"/>
+          <p:cNvSpPr>
+            <a:spLocks noGrp="1" noRot="1" noChangeAspect="1"/>
+          </p:cNvSpPr>
+          <p:nvPr>
+            <p:ph type="sldImg"/>
+          </p:nvPr>
+        </p:nvSpPr>
+        <p:spPr/>
+      </p:sp>
+      <p:sp>
+        <p:nvSpPr>
+          <p:cNvPr id="3" name="Notes Placeholder 2"/>
+          <p:cNvSpPr>
+            <a:spLocks noGrp="1"/>
+          </p:cNvSpPr>
+          <p:nvPr>
+            <p:ph type="body" idx="1"/>
+          </p:nvPr>
+        </p:nvSpPr>
+        <p:spPr/>
+        <p:txBody>
+          <a:bodyPr/>
+          <a:lstStyle/>
+          <a:p>
+            <a:pPr marL="457200" marR="0" lvl="1" indent="0" algn="l" defTabSz="914400" rtl="0" eaLnBrk="1" fontAlgn="auto" latinLnBrk="0" hangingPunct="1">
+              <a:lnSpc>
+                <a:spcPct val="100000"/>
+              </a:lnSpc>
+              <a:spcBef>
+                <a:spcPts val="0"/>
+              </a:spcBef>
+              <a:spcAft>
+                <a:spcPts val="0"/>
+              </a:spcAft>
+              <a:buClrTx/>
+              <a:buSzTx/>
+              <a:buFontTx/>
+              <a:buNone/>
+              <a:tabLst/>
+              <a:defRPr/>
+            </a:pPr>
+            <a:r>
+              <a:rPr lang="en-US" dirty="0"/>
+              <a:t>Pull down and store headlines and newspaper metadata from the News API with four keywords:</a:t>
+            </a:r>
+          </a:p>
+          <a:p>
+            <a:pPr marL="628650" lvl="1" indent="-171450">
+              <a:spcBef>
+                <a:spcPts val="0"/>
+              </a:spcBef>
+              <a:spcAft>
+                <a:spcPts val="0"/>
+              </a:spcAft>
+              <a:buFont typeface="Arial" panose="020B0604020202020204" pitchFamily="34" charset="0"/>
+              <a:buChar char="•"/>
+            </a:pPr>
+            <a:r>
+              <a:rPr lang="en-US" dirty="0"/>
+              <a:t>Only searching domains available in Pew Research Center</a:t>
+            </a:r>
+          </a:p>
+          <a:p>
+            <a:pPr marL="628650" lvl="1" indent="-171450">
+              <a:spcBef>
+                <a:spcPts val="0"/>
+              </a:spcBef>
+              <a:spcAft>
+                <a:spcPts val="0"/>
+              </a:spcAft>
+              <a:buFont typeface="Arial" panose="020B0604020202020204" pitchFamily="34" charset="0"/>
+              <a:buChar char="•"/>
+            </a:pPr>
+            <a:r>
+              <a:rPr lang="en-US" dirty="0"/>
+              <a:t>Searching keywords in news article</a:t>
+            </a:r>
+          </a:p>
+          <a:p>
+            <a:pPr marL="628650" lvl="1" indent="-171450">
+              <a:spcBef>
+                <a:spcPts val="0"/>
+              </a:spcBef>
+              <a:spcAft>
+                <a:spcPts val="0"/>
+              </a:spcAft>
+              <a:buFont typeface="Arial" panose="020B0604020202020204" pitchFamily="34" charset="0"/>
+              <a:buChar char="•"/>
+            </a:pPr>
+            <a:r>
+              <a:rPr lang="en-US" dirty="0"/>
+              <a:t>Sort by relevance</a:t>
+            </a:r>
+          </a:p>
+          <a:p>
+            <a:pPr marL="628650" lvl="1" indent="-171450">
+              <a:spcBef>
+                <a:spcPts val="0"/>
+              </a:spcBef>
+              <a:spcAft>
+                <a:spcPts val="0"/>
+              </a:spcAft>
+              <a:buFont typeface="Arial" panose="020B0604020202020204" pitchFamily="34" charset="0"/>
+              <a:buChar char="•"/>
+            </a:pPr>
+            <a:endParaRPr lang="en-US" dirty="0"/>
+          </a:p>
+          <a:p>
+            <a:pPr>
+              <a:spcBef>
+                <a:spcPts val="0"/>
+              </a:spcBef>
+              <a:spcAft>
+                <a:spcPts val="0"/>
+              </a:spcAft>
+            </a:pPr>
+            <a:r>
+              <a:rPr lang="en-US" dirty="0"/>
+              <a:t>Clean and sort data</a:t>
+            </a:r>
+          </a:p>
+          <a:p>
+            <a:pPr lvl="1">
+              <a:spcBef>
+                <a:spcPts val="0"/>
+              </a:spcBef>
+              <a:spcAft>
+                <a:spcPts val="0"/>
+              </a:spcAft>
+            </a:pPr>
+            <a:r>
+              <a:rPr lang="en-US" dirty="0"/>
+              <a:t>Removed news sources with low results</a:t>
+            </a:r>
+          </a:p>
+          <a:p>
+            <a:pPr marL="628650" lvl="1" indent="-171450">
+              <a:spcBef>
+                <a:spcPts val="0"/>
+              </a:spcBef>
+              <a:spcAft>
+                <a:spcPts val="0"/>
+              </a:spcAft>
+              <a:buFont typeface="Arial" panose="020B0604020202020204" pitchFamily="34" charset="0"/>
+              <a:buChar char="•"/>
+            </a:pPr>
+            <a:endParaRPr lang="en-US" dirty="0"/>
+          </a:p>
+          <a:p>
+            <a:endParaRPr lang="en-US" dirty="0"/>
+          </a:p>
+        </p:txBody>
+      </p:sp>
+      <p:sp>
+        <p:nvSpPr>
+          <p:cNvPr id="4" name="Slide Number Placeholder 3"/>
+          <p:cNvSpPr>
+            <a:spLocks noGrp="1"/>
+          </p:cNvSpPr>
+          <p:nvPr>
+            <p:ph type="sldNum" sz="quarter" idx="5"/>
+          </p:nvPr>
+        </p:nvSpPr>
+        <p:spPr/>
+        <p:txBody>
+          <a:bodyPr/>
+          <a:lstStyle/>
+          <a:p>
+            <a:fld id="{1F88B8BE-972A-4AD0-BD0D-E769440C7A47}" type="slidenum">
+              <a:rPr lang="en-US" smtClean="0"/>
+              <a:t>3</a:t>
+            </a:fld>
+            <a:endParaRPr lang="en-US"/>
+          </a:p>
+        </p:txBody>
+      </p:sp>
+    </p:spTree>
+    <p:extLst>
+      <p:ext uri="{BB962C8B-B14F-4D97-AF65-F5344CB8AC3E}">
+        <p14:creationId xmlns:p14="http://schemas.microsoft.com/office/powerpoint/2010/main" val="3143328780"/>
+      </p:ext>
+    </p:extLst>
+  </p:cSld>
+  <p:clrMapOvr>
+    <a:masterClrMapping/>
+  </p:clrMapOvr>
+</p:notes>
+</file>
+
+<file path=ppt/notesSlides/notesSlide2.xml><?xml version="1.0" encoding="utf-8"?>
+<p:notes xmlns:a="http://schemas.openxmlformats.org/drawingml/2006/main" xmlns:r="http://schemas.openxmlformats.org/officeDocument/2006/relationships" xmlns:p="http://schemas.openxmlformats.org/presentationml/2006/main">
+  <p:cSld>
+    <p:spTree>
+      <p:nvGrpSpPr>
+        <p:cNvPr id="1" name=""/>
+        <p:cNvGrpSpPr/>
+        <p:nvPr/>
+      </p:nvGrpSpPr>
+      <p:grpSpPr>
+        <a:xfrm>
+          <a:off x="0" y="0"/>
+          <a:ext cx="0" cy="0"/>
+          <a:chOff x="0" y="0"/>
+          <a:chExt cx="0" cy="0"/>
+        </a:xfrm>
+      </p:grpSpPr>
+      <p:sp>
+        <p:nvSpPr>
+          <p:cNvPr id="2" name="Slide Image Placeholder 1"/>
+          <p:cNvSpPr>
+            <a:spLocks noGrp="1" noRot="1" noChangeAspect="1"/>
+          </p:cNvSpPr>
+          <p:nvPr>
+            <p:ph type="sldImg"/>
+          </p:nvPr>
+        </p:nvSpPr>
+        <p:spPr/>
+      </p:sp>
+      <p:sp>
+        <p:nvSpPr>
+          <p:cNvPr id="3" name="Notes Placeholder 2"/>
+          <p:cNvSpPr>
+            <a:spLocks noGrp="1"/>
+          </p:cNvSpPr>
+          <p:nvPr>
+            <p:ph type="body" idx="1"/>
+          </p:nvPr>
+        </p:nvSpPr>
+        <p:spPr/>
+        <p:txBody>
+          <a:bodyPr/>
+          <a:lstStyle/>
+          <a:p>
+            <a:pPr marL="0" marR="0" lvl="0" indent="0" algn="l" defTabSz="914400" rtl="0" eaLnBrk="1" fontAlgn="auto" latinLnBrk="0" hangingPunct="1">
+              <a:lnSpc>
+                <a:spcPct val="100000"/>
+              </a:lnSpc>
+              <a:spcBef>
+                <a:spcPts val="0"/>
+              </a:spcBef>
+              <a:spcAft>
+                <a:spcPts val="0"/>
+              </a:spcAft>
+              <a:buClrTx/>
+              <a:buSzTx/>
+              <a:buFontTx/>
+              <a:buNone/>
+              <a:tabLst/>
+              <a:defRPr/>
+            </a:pPr>
+            <a:r>
+              <a:rPr lang="en-US" dirty="0"/>
+              <a:t>Top word used in positive/negative headlines</a:t>
+            </a:r>
+          </a:p>
+          <a:p>
+            <a:endParaRPr lang="en-US" dirty="0"/>
+          </a:p>
+        </p:txBody>
+      </p:sp>
+      <p:sp>
+        <p:nvSpPr>
+          <p:cNvPr id="4" name="Slide Number Placeholder 3"/>
+          <p:cNvSpPr>
+            <a:spLocks noGrp="1"/>
+          </p:cNvSpPr>
+          <p:nvPr>
+            <p:ph type="sldNum" sz="quarter" idx="5"/>
+          </p:nvPr>
+        </p:nvSpPr>
+        <p:spPr/>
+        <p:txBody>
+          <a:bodyPr/>
+          <a:lstStyle/>
+          <a:p>
+            <a:fld id="{1F88B8BE-972A-4AD0-BD0D-E769440C7A47}" type="slidenum">
+              <a:rPr lang="en-US" smtClean="0"/>
+              <a:t>7</a:t>
+            </a:fld>
+            <a:endParaRPr lang="en-US"/>
+          </a:p>
+        </p:txBody>
+      </p:sp>
+    </p:spTree>
+    <p:extLst>
+      <p:ext uri="{BB962C8B-B14F-4D97-AF65-F5344CB8AC3E}">
+        <p14:creationId xmlns:p14="http://schemas.microsoft.com/office/powerpoint/2010/main" val="3845021542"/>
+      </p:ext>
+    </p:extLst>
+  </p:cSld>
+  <p:clrMapOvr>
+    <a:masterClrMapping/>
+  </p:clrMapOvr>
+</p:notes>
+</file>
+
+<file path=ppt/notesSlides/notesSlide3.xml><?xml version="1.0" encoding="utf-8"?>
+<p:notes xmlns:a="http://schemas.openxmlformats.org/drawingml/2006/main" xmlns:r="http://schemas.openxmlformats.org/officeDocument/2006/relationships" xmlns:p="http://schemas.openxmlformats.org/presentationml/2006/main">
+  <p:cSld>
+    <p:spTree>
+      <p:nvGrpSpPr>
+        <p:cNvPr id="1" name=""/>
+        <p:cNvGrpSpPr/>
+        <p:nvPr/>
+      </p:nvGrpSpPr>
+      <p:grpSpPr>
+        <a:xfrm>
+          <a:off x="0" y="0"/>
+          <a:ext cx="0" cy="0"/>
+          <a:chOff x="0" y="0"/>
+          <a:chExt cx="0" cy="0"/>
+        </a:xfrm>
+      </p:grpSpPr>
+      <p:sp>
+        <p:nvSpPr>
+          <p:cNvPr id="2" name="Slide Image Placeholder 1"/>
+          <p:cNvSpPr>
+            <a:spLocks noGrp="1" noRot="1" noChangeAspect="1"/>
+          </p:cNvSpPr>
+          <p:nvPr>
+            <p:ph type="sldImg"/>
+          </p:nvPr>
+        </p:nvSpPr>
+        <p:spPr/>
+      </p:sp>
+      <p:sp>
+        <p:nvSpPr>
+          <p:cNvPr id="3" name="Notes Placeholder 2"/>
+          <p:cNvSpPr>
+            <a:spLocks noGrp="1"/>
+          </p:cNvSpPr>
+          <p:nvPr>
+            <p:ph type="body" idx="1"/>
+          </p:nvPr>
+        </p:nvSpPr>
+        <p:spPr/>
+        <p:txBody>
+          <a:bodyPr/>
+          <a:lstStyle/>
+          <a:p>
+            <a:r>
+              <a:rPr lang="en-US" dirty="0"/>
+              <a:t>Challenges</a:t>
+            </a:r>
+          </a:p>
+          <a:p>
+            <a:pPr lvl="1"/>
+            <a:r>
+              <a:rPr lang="en-US" dirty="0"/>
+              <a:t>Sentiment scoring is not customized – NLTK Vader was trained on social media</a:t>
+            </a:r>
+          </a:p>
+          <a:p>
+            <a:pPr lvl="1"/>
+            <a:r>
+              <a:rPr lang="en-US" dirty="0" err="1"/>
+              <a:t>NewsAPI</a:t>
+            </a:r>
+            <a:r>
+              <a:rPr lang="en-US" dirty="0"/>
+              <a:t> limits access to sources- data, first page of results, </a:t>
+            </a:r>
+            <a:r>
+              <a:rPr lang="en-US" dirty="0" err="1"/>
+              <a:t>etc</a:t>
+            </a:r>
+            <a:endParaRPr lang="en-US" dirty="0"/>
+          </a:p>
+          <a:p>
+            <a:endParaRPr lang="en-US" dirty="0"/>
+          </a:p>
+        </p:txBody>
+      </p:sp>
+      <p:sp>
+        <p:nvSpPr>
+          <p:cNvPr id="4" name="Slide Number Placeholder 3"/>
+          <p:cNvSpPr>
+            <a:spLocks noGrp="1"/>
+          </p:cNvSpPr>
+          <p:nvPr>
+            <p:ph type="sldNum" sz="quarter" idx="5"/>
+          </p:nvPr>
+        </p:nvSpPr>
+        <p:spPr/>
+        <p:txBody>
+          <a:bodyPr/>
+          <a:lstStyle/>
+          <a:p>
+            <a:fld id="{1F88B8BE-972A-4AD0-BD0D-E769440C7A47}" type="slidenum">
+              <a:rPr lang="en-US" smtClean="0"/>
+              <a:t>9</a:t>
+            </a:fld>
+            <a:endParaRPr lang="en-US"/>
+          </a:p>
+        </p:txBody>
+      </p:sp>
+    </p:spTree>
+    <p:extLst>
+      <p:ext uri="{BB962C8B-B14F-4D97-AF65-F5344CB8AC3E}">
+        <p14:creationId xmlns:p14="http://schemas.microsoft.com/office/powerpoint/2010/main" val="858953395"/>
+      </p:ext>
+    </p:extLst>
+  </p:cSld>
+  <p:clrMapOvr>
+    <a:masterClrMapping/>
+  </p:clrMapOvr>
+</p:notes>
 </file>
 
 <file path=ppt/slideLayouts/slideLayout1.xml><?xml version="1.0" encoding="utf-8"?>
@@ -140,6 +929,94 @@
           <a:chExt cx="0" cy="0"/>
         </a:xfrm>
       </p:grpSpPr>
+      <p:pic>
+        <p:nvPicPr>
+          <p:cNvPr id="8" name="Picture 7">
+            <a:extLst>
+              <a:ext uri="{FF2B5EF4-FFF2-40B4-BE49-F238E27FC236}">
+                <a16:creationId xmlns:a16="http://schemas.microsoft.com/office/drawing/2014/main" id="{951E2DC6-E393-42D8-9C0B-DFF85185EA7C}"/>
+              </a:ext>
+            </a:extLst>
+          </p:cNvPr>
+          <p:cNvPicPr>
+            <a:picLocks noChangeAspect="1"/>
+          </p:cNvPicPr>
+          <p:nvPr userDrawn="1"/>
+        </p:nvPicPr>
+        <p:blipFill rotWithShape="1">
+          <a:blip r:embed="rId2">
+            <a:alphaModFix/>
+          </a:blip>
+          <a:srcRect l="7972" t="17475" r="4779" b="33522"/>
+          <a:stretch/>
+        </p:blipFill>
+        <p:spPr>
+          <a:xfrm>
+            <a:off x="-258" y="-21206"/>
+            <a:ext cx="12192000" cy="6847398"/>
+          </a:xfrm>
+          <a:prstGeom prst="rect">
+            <a:avLst/>
+          </a:prstGeom>
+          <a:solidFill>
+            <a:srgbClr val="EFEDE3"/>
+          </a:solidFill>
+        </p:spPr>
+      </p:pic>
+      <p:sp>
+        <p:nvSpPr>
+          <p:cNvPr id="9" name="Rectangle 8">
+            <a:extLst>
+              <a:ext uri="{FF2B5EF4-FFF2-40B4-BE49-F238E27FC236}">
+                <a16:creationId xmlns:a16="http://schemas.microsoft.com/office/drawing/2014/main" id="{0D6928F7-D87C-41CC-A7AC-433D88E8D76F}"/>
+              </a:ext>
+            </a:extLst>
+          </p:cNvPr>
+          <p:cNvSpPr/>
+          <p:nvPr userDrawn="1"/>
+        </p:nvSpPr>
+        <p:spPr>
+          <a:xfrm>
+            <a:off x="-258" y="0"/>
+            <a:ext cx="12192000" cy="6836794"/>
+          </a:xfrm>
+          <a:prstGeom prst="rect">
+            <a:avLst/>
+          </a:prstGeom>
+          <a:solidFill>
+            <a:srgbClr val="EFEDE3">
+              <a:alpha val="92000"/>
+            </a:srgbClr>
+          </a:solidFill>
+          <a:ln>
+            <a:noFill/>
+          </a:ln>
+        </p:spPr>
+        <p:style>
+          <a:lnRef idx="2">
+            <a:schemeClr val="accent1">
+              <a:shade val="50000"/>
+            </a:schemeClr>
+          </a:lnRef>
+          <a:fillRef idx="1">
+            <a:schemeClr val="accent1"/>
+          </a:fillRef>
+          <a:effectRef idx="0">
+            <a:schemeClr val="accent1"/>
+          </a:effectRef>
+          <a:fontRef idx="minor">
+            <a:schemeClr val="lt1"/>
+          </a:fontRef>
+        </p:style>
+        <p:txBody>
+          <a:bodyPr rtlCol="0" anchor="ctr"/>
+          <a:lstStyle/>
+          <a:p>
+            <a:pPr algn="ctr"/>
+            <a:endParaRPr lang="en-US"/>
+          </a:p>
+        </p:txBody>
+      </p:sp>
       <p:sp>
         <p:nvSpPr>
           <p:cNvPr id="2" name="Title 1"/>
@@ -3822,7 +4699,7 @@
           <a:p>
             <a:r>
               <a:rPr lang="en-US" sz="6000" dirty="0"/>
-              <a:t>Measuring emotion in our news</a:t>
+              <a:t>Does tone really get lost in text</a:t>
             </a:r>
           </a:p>
         </p:txBody>
@@ -3895,7 +4772,259 @@
     </p:spTree>
     <p:extLst>
       <p:ext uri="{BB962C8B-B14F-4D97-AF65-F5344CB8AC3E}">
-        <p14:creationId xmlns:p14="http://schemas.microsoft.com/office/powerpoint/2010/main" val="1901413748"/>
+        <p14:creationId xmlns:p14="http://schemas.microsoft.com/office/powerpoint/2010/main" val="2641519390"/>
+      </p:ext>
+    </p:extLst>
+  </p:cSld>
+  <p:clrMapOvr>
+    <a:masterClrMapping/>
+  </p:clrMapOvr>
+</p:sld>
+</file>
+
+<file path=ppt/slides/slide10.xml><?xml version="1.0" encoding="utf-8"?>
+<p:sld xmlns:a="http://schemas.openxmlformats.org/drawingml/2006/main" xmlns:r="http://schemas.openxmlformats.org/officeDocument/2006/relationships" xmlns:p="http://schemas.openxmlformats.org/presentationml/2006/main">
+  <p:cSld>
+    <p:spTree>
+      <p:nvGrpSpPr>
+        <p:cNvPr id="1" name=""/>
+        <p:cNvGrpSpPr/>
+        <p:nvPr/>
+      </p:nvGrpSpPr>
+      <p:grpSpPr>
+        <a:xfrm>
+          <a:off x="0" y="0"/>
+          <a:ext cx="0" cy="0"/>
+          <a:chOff x="0" y="0"/>
+          <a:chExt cx="0" cy="0"/>
+        </a:xfrm>
+      </p:grpSpPr>
+      <p:sp>
+        <p:nvSpPr>
+          <p:cNvPr id="4" name="Title 3">
+            <a:extLst>
+              <a:ext uri="{FF2B5EF4-FFF2-40B4-BE49-F238E27FC236}">
+                <a16:creationId xmlns:a16="http://schemas.microsoft.com/office/drawing/2014/main" id="{57BA24D8-4846-4CBC-89B0-82F29721185A}"/>
+              </a:ext>
+            </a:extLst>
+          </p:cNvPr>
+          <p:cNvSpPr>
+            <a:spLocks noGrp="1"/>
+          </p:cNvSpPr>
+          <p:nvPr>
+            <p:ph type="ctrTitle"/>
+          </p:nvPr>
+        </p:nvSpPr>
+        <p:spPr/>
+        <p:txBody>
+          <a:bodyPr/>
+          <a:lstStyle/>
+          <a:p>
+            <a:r>
+              <a:rPr lang="en-US" dirty="0"/>
+              <a:t>appendix</a:t>
+            </a:r>
+          </a:p>
+        </p:txBody>
+      </p:sp>
+      <p:sp>
+        <p:nvSpPr>
+          <p:cNvPr id="5" name="Subtitle 4">
+            <a:extLst>
+              <a:ext uri="{FF2B5EF4-FFF2-40B4-BE49-F238E27FC236}">
+                <a16:creationId xmlns:a16="http://schemas.microsoft.com/office/drawing/2014/main" id="{909BEE3E-3CC4-4B3D-B5AF-528107D32272}"/>
+              </a:ext>
+            </a:extLst>
+          </p:cNvPr>
+          <p:cNvSpPr>
+            <a:spLocks noGrp="1"/>
+          </p:cNvSpPr>
+          <p:nvPr>
+            <p:ph type="subTitle" idx="1"/>
+          </p:nvPr>
+        </p:nvSpPr>
+        <p:spPr/>
+        <p:txBody>
+          <a:bodyPr/>
+          <a:lstStyle/>
+          <a:p>
+            <a:endParaRPr lang="en-US"/>
+          </a:p>
+        </p:txBody>
+      </p:sp>
+    </p:spTree>
+    <p:extLst>
+      <p:ext uri="{BB962C8B-B14F-4D97-AF65-F5344CB8AC3E}">
+        <p14:creationId xmlns:p14="http://schemas.microsoft.com/office/powerpoint/2010/main" val="2873799757"/>
+      </p:ext>
+    </p:extLst>
+  </p:cSld>
+  <p:clrMapOvr>
+    <a:masterClrMapping/>
+  </p:clrMapOvr>
+</p:sld>
+</file>
+
+<file path=ppt/slides/slide11.xml><?xml version="1.0" encoding="utf-8"?>
+<p:sld xmlns:a="http://schemas.openxmlformats.org/drawingml/2006/main" xmlns:r="http://schemas.openxmlformats.org/officeDocument/2006/relationships" xmlns:p="http://schemas.openxmlformats.org/presentationml/2006/main">
+  <p:cSld>
+    <p:spTree>
+      <p:nvGrpSpPr>
+        <p:cNvPr id="1" name=""/>
+        <p:cNvGrpSpPr/>
+        <p:nvPr/>
+      </p:nvGrpSpPr>
+      <p:grpSpPr>
+        <a:xfrm>
+          <a:off x="0" y="0"/>
+          <a:ext cx="0" cy="0"/>
+          <a:chOff x="0" y="0"/>
+          <a:chExt cx="0" cy="0"/>
+        </a:xfrm>
+      </p:grpSpPr>
+      <p:sp>
+        <p:nvSpPr>
+          <p:cNvPr id="2" name="Title 1">
+            <a:extLst>
+              <a:ext uri="{FF2B5EF4-FFF2-40B4-BE49-F238E27FC236}">
+                <a16:creationId xmlns:a16="http://schemas.microsoft.com/office/drawing/2014/main" id="{6E1DFE7F-8996-4432-B0B9-1278B1C45367}"/>
+              </a:ext>
+            </a:extLst>
+          </p:cNvPr>
+          <p:cNvSpPr>
+            <a:spLocks noGrp="1"/>
+          </p:cNvSpPr>
+          <p:nvPr>
+            <p:ph type="title"/>
+          </p:nvPr>
+        </p:nvSpPr>
+        <p:spPr/>
+        <p:txBody>
+          <a:bodyPr/>
+          <a:lstStyle/>
+          <a:p>
+            <a:r>
+              <a:rPr lang="en-US" dirty="0"/>
+              <a:t>References </a:t>
+            </a:r>
+          </a:p>
+        </p:txBody>
+      </p:sp>
+      <p:sp>
+        <p:nvSpPr>
+          <p:cNvPr id="7" name="Content Placeholder 6">
+            <a:extLst>
+              <a:ext uri="{FF2B5EF4-FFF2-40B4-BE49-F238E27FC236}">
+                <a16:creationId xmlns:a16="http://schemas.microsoft.com/office/drawing/2014/main" id="{3C8A78CA-CB3A-4F5A-8CC6-03FD0D5CEADB}"/>
+              </a:ext>
+            </a:extLst>
+          </p:cNvPr>
+          <p:cNvSpPr>
+            <a:spLocks noGrp="1"/>
+          </p:cNvSpPr>
+          <p:nvPr>
+            <p:ph idx="1"/>
+          </p:nvPr>
+        </p:nvSpPr>
+        <p:spPr/>
+        <p:txBody>
+          <a:bodyPr/>
+          <a:lstStyle/>
+          <a:p>
+            <a:endParaRPr lang="en-US" dirty="0"/>
+          </a:p>
+        </p:txBody>
+      </p:sp>
+    </p:spTree>
+    <p:extLst>
+      <p:ext uri="{BB962C8B-B14F-4D97-AF65-F5344CB8AC3E}">
+        <p14:creationId xmlns:p14="http://schemas.microsoft.com/office/powerpoint/2010/main" val="1768583760"/>
+      </p:ext>
+    </p:extLst>
+  </p:cSld>
+  <p:clrMapOvr>
+    <a:masterClrMapping/>
+  </p:clrMapOvr>
+</p:sld>
+</file>
+
+<file path=ppt/slides/slide12.xml><?xml version="1.0" encoding="utf-8"?>
+<p:sld xmlns:a="http://schemas.openxmlformats.org/drawingml/2006/main" xmlns:r="http://schemas.openxmlformats.org/officeDocument/2006/relationships" xmlns:p="http://schemas.openxmlformats.org/presentationml/2006/main">
+  <p:cSld>
+    <p:spTree>
+      <p:nvGrpSpPr>
+        <p:cNvPr id="1" name=""/>
+        <p:cNvGrpSpPr/>
+        <p:nvPr/>
+      </p:nvGrpSpPr>
+      <p:grpSpPr>
+        <a:xfrm>
+          <a:off x="0" y="0"/>
+          <a:ext cx="0" cy="0"/>
+          <a:chOff x="0" y="0"/>
+          <a:chExt cx="0" cy="0"/>
+        </a:xfrm>
+      </p:grpSpPr>
+      <p:sp>
+        <p:nvSpPr>
+          <p:cNvPr id="2" name="Title 1">
+            <a:extLst>
+              <a:ext uri="{FF2B5EF4-FFF2-40B4-BE49-F238E27FC236}">
+                <a16:creationId xmlns:a16="http://schemas.microsoft.com/office/drawing/2014/main" id="{6E1DFE7F-8996-4432-B0B9-1278B1C45367}"/>
+              </a:ext>
+            </a:extLst>
+          </p:cNvPr>
+          <p:cNvSpPr>
+            <a:spLocks noGrp="1"/>
+          </p:cNvSpPr>
+          <p:nvPr>
+            <p:ph type="title"/>
+          </p:nvPr>
+        </p:nvSpPr>
+        <p:spPr/>
+        <p:txBody>
+          <a:bodyPr/>
+          <a:lstStyle/>
+          <a:p>
+            <a:r>
+              <a:rPr lang="en-US" dirty="0"/>
+              <a:t>Interesting things found along the way</a:t>
+            </a:r>
+          </a:p>
+        </p:txBody>
+      </p:sp>
+      <p:sp>
+        <p:nvSpPr>
+          <p:cNvPr id="7" name="Content Placeholder 6">
+            <a:extLst>
+              <a:ext uri="{FF2B5EF4-FFF2-40B4-BE49-F238E27FC236}">
+                <a16:creationId xmlns:a16="http://schemas.microsoft.com/office/drawing/2014/main" id="{3C8A78CA-CB3A-4F5A-8CC6-03FD0D5CEADB}"/>
+              </a:ext>
+            </a:extLst>
+          </p:cNvPr>
+          <p:cNvSpPr>
+            <a:spLocks noGrp="1"/>
+          </p:cNvSpPr>
+          <p:nvPr>
+            <p:ph idx="1"/>
+          </p:nvPr>
+        </p:nvSpPr>
+        <p:spPr/>
+        <p:txBody>
+          <a:bodyPr/>
+          <a:lstStyle/>
+          <a:p>
+            <a:r>
+              <a:rPr lang="en-US" dirty="0"/>
+              <a:t>Check out the repository here</a:t>
+            </a:r>
+          </a:p>
+        </p:txBody>
+      </p:sp>
+    </p:spTree>
+    <p:extLst>
+      <p:ext uri="{BB962C8B-B14F-4D97-AF65-F5344CB8AC3E}">
+        <p14:creationId xmlns:p14="http://schemas.microsoft.com/office/powerpoint/2010/main" val="4099439248"/>
       </p:ext>
     </p:extLst>
   </p:cSld>
@@ -3969,7 +5098,7 @@
         <p:spPr/>
         <p:txBody>
           <a:bodyPr>
-            <a:normAutofit fontScale="85000" lnSpcReduction="10000"/>
+            <a:normAutofit lnSpcReduction="10000"/>
           </a:bodyPr>
           <a:lstStyle/>
           <a:p>
@@ -3990,7 +5119,7 @@
                 <a:effectLst/>
                 <a:latin typeface="Arial" panose="020B0604020202020204" pitchFamily="34" charset="0"/>
               </a:rPr>
-              <a:t>In this project we created a database of newspaper headlines using News API and evaluated the </a:t>
+              <a:t>In this project we created a database of newspaper headlines across 9 different sources using News API and evaluated the </a:t>
             </a:r>
             <a:r>
               <a:rPr lang="en-US" sz="1800" dirty="0">
@@ -3999,7 +5128,7 @@
                 </a:solidFill>
                 <a:latin typeface="Arial" panose="020B0604020202020204" pitchFamily="34" charset="0"/>
               </a:rPr>
-              <a:t>emotional strength of the article </a:t>
+              <a:t>emotional strength of the headlines </a:t>
             </a:r>
             <a:r>
               <a:rPr lang="en-US" sz="1800" b="0" i="0" u="none" strike="noStrike" dirty="0">
@@ -4009,7 +5138,59 @@
                 <a:effectLst/>
                 <a:latin typeface="Arial" panose="020B0604020202020204" pitchFamily="34" charset="0"/>
               </a:rPr>
-              <a:t>using NLTK’s Vader to determine their sentiment related to specific keywords. We will be looking at how different newspapers on the left/right bias spectrum represent immigrants.</a:t>
+              <a:t>using NLTK’s Vader to determine their sentiment related to specific keywords. We will be looking at how different newspapers on the left/right bias spectrum represent immigrants</a:t>
+            </a:r>
+            <a:r>
+              <a:rPr lang="en-US" sz="1800" b="1" i="0" u="none" strike="noStrike" dirty="0">
+                <a:solidFill>
+                  <a:srgbClr val="000000"/>
+                </a:solidFill>
+                <a:effectLst/>
+                <a:latin typeface="Arial" panose="020B0604020202020204" pitchFamily="34" charset="0"/>
+              </a:rPr>
+              <a:t>. (slim down)</a:t>
+            </a:r>
+          </a:p>
+          <a:p>
+            <a:pPr marL="0" indent="0" rtl="0">
+              <a:spcBef>
+                <a:spcPts val="1200"/>
+              </a:spcBef>
+              <a:spcAft>
+                <a:spcPts val="1200"/>
+              </a:spcAft>
+              <a:buNone/>
+            </a:pPr>
+            <a:r>
+              <a:rPr lang="en-US" sz="1800" b="1" i="0" u="none" strike="noStrike" dirty="0">
+                <a:solidFill>
+                  <a:srgbClr val="000000"/>
+                </a:solidFill>
+                <a:effectLst/>
+                <a:latin typeface="Arial" panose="020B0604020202020204" pitchFamily="34" charset="0"/>
+              </a:rPr>
+              <a:t>Time frame, dates</a:t>
+            </a:r>
+          </a:p>
+          <a:p>
+            <a:pPr marL="0" indent="0" rtl="0">
+              <a:spcBef>
+                <a:spcPts val="1200"/>
+              </a:spcBef>
+              <a:spcAft>
+                <a:spcPts val="1200"/>
+              </a:spcAft>
+              <a:buNone/>
+            </a:pPr>
+            <a:r>
+              <a:rPr lang="en-US" sz="1800" b="0" i="0" u="none" strike="noStrike" dirty="0">
+                <a:solidFill>
+                  <a:srgbClr val="000000"/>
+                </a:solidFill>
+                <a:effectLst/>
+                <a:latin typeface="Arial" panose="020B0604020202020204" pitchFamily="34" charset="0"/>
+              </a:rPr>
+              <a:t>What is sentiment analysis: Emotion conveyed through text</a:t>
             </a:r>
           </a:p>
           <a:p>
@@ -4026,7 +5207,13 @@
               <a:rPr lang="en-US" b="0" dirty="0">
                 <a:effectLst/>
               </a:rPr>
-              <a:t>Research Questions to Answer</a:t>
+              <a:t>Research Questions to Answer(</a:t>
+            </a:r>
+            <a:r>
+              <a:rPr lang="en-US" b="1" dirty="0">
+                <a:effectLst/>
+              </a:rPr>
+              <a:t>needs updating)</a:t>
             </a:r>
           </a:p>
           <a:p>
@@ -4058,27 +5245,7 @@
               <a:rPr lang="en-US" b="0" dirty="0">
                 <a:effectLst/>
               </a:rPr>
-              <a:t>What is the difference in sentiment among headlines containing the terms “migrant</a:t>
-            </a:r>
-            <a:r>
-              <a:rPr lang="en-US" dirty="0"/>
-              <a:t>(</a:t>
-            </a:r>
-            <a:r>
-              <a:rPr lang="en-US" b="0" dirty="0">
-                <a:effectLst/>
-              </a:rPr>
-              <a:t>s)”, “refugee</a:t>
-            </a:r>
-            <a:r>
-              <a:rPr lang="en-US" dirty="0"/>
-              <a:t>(</a:t>
-            </a:r>
-            <a:r>
-              <a:rPr lang="en-US" b="0" dirty="0">
-                <a:effectLst/>
-              </a:rPr>
-              <a:t>s)” and “immigrant(s)”?</a:t>
+              <a:t>Which topics are associated with negative or positive sentiment</a:t>
             </a:r>
           </a:p>
           <a:p>
@@ -4096,145 +5263,6 @@
               </a:rPr>
               <a:t>What is the sentiment of conservative vs. liberal English newspaper headlines in the US? </a:t>
             </a:r>
-          </a:p>
-          <a:p>
-            <a:pPr marL="0" indent="0" rtl="0">
-              <a:spcBef>
-                <a:spcPts val="0"/>
-              </a:spcBef>
-              <a:spcAft>
-                <a:spcPts val="0"/>
-              </a:spcAft>
-              <a:buNone/>
-            </a:pPr>
-            <a:endParaRPr lang="en-US" b="0" dirty="0">
-              <a:effectLst/>
-            </a:endParaRPr>
-          </a:p>
-          <a:p>
-            <a:pPr marL="0" indent="0" rtl="0">
-              <a:spcBef>
-                <a:spcPts val="0"/>
-              </a:spcBef>
-              <a:spcAft>
-                <a:spcPts val="0"/>
-              </a:spcAft>
-              <a:buNone/>
-            </a:pPr>
-            <a:r>
-              <a:rPr lang="en-US" b="0" dirty="0">
-                <a:effectLst/>
-              </a:rPr>
-              <a:t>Datasets to Be Used</a:t>
-            </a:r>
-          </a:p>
-          <a:p>
-            <a:pPr>
-              <a:spcBef>
-                <a:spcPts val="0"/>
-              </a:spcBef>
-              <a:spcAft>
-                <a:spcPts val="0"/>
-              </a:spcAft>
-            </a:pPr>
-            <a:r>
-              <a:rPr lang="en-US" b="0" dirty="0">
-                <a:effectLst/>
-              </a:rPr>
-              <a:t>News headlines in English published in the US</a:t>
-            </a:r>
-          </a:p>
-          <a:p>
-            <a:pPr>
-              <a:spcBef>
-                <a:spcPts val="0"/>
-              </a:spcBef>
-              <a:spcAft>
-                <a:spcPts val="0"/>
-              </a:spcAft>
-            </a:pPr>
-            <a:r>
-              <a:rPr lang="en-US" b="0" dirty="0" err="1">
-                <a:effectLst/>
-              </a:rPr>
-              <a:t>NewsAPI</a:t>
-            </a:r>
-            <a:r>
-              <a:rPr lang="en-US" b="0" dirty="0">
-                <a:effectLst/>
-              </a:rPr>
-              <a:t> - author, title, domain, </a:t>
-            </a:r>
-            <a:r>
-              <a:rPr lang="en-US" b="0" dirty="0" err="1">
-                <a:effectLst/>
-              </a:rPr>
-              <a:t>url</a:t>
-            </a:r>
-            <a:r>
-              <a:rPr lang="en-US" b="0" dirty="0">
-                <a:effectLst/>
-              </a:rPr>
-              <a:t>, headline, first 200 words </a:t>
-            </a:r>
-          </a:p>
-          <a:p>
-            <a:pPr lvl="1">
-              <a:spcBef>
-                <a:spcPts val="0"/>
-              </a:spcBef>
-              <a:spcAft>
-                <a:spcPts val="0"/>
-              </a:spcAft>
-            </a:pPr>
-            <a:r>
-              <a:rPr lang="en-US" b="0" dirty="0">
-                <a:effectLst/>
-              </a:rPr>
-              <a:t>https://newsapi.org/ </a:t>
-            </a:r>
-          </a:p>
-          <a:p>
-            <a:pPr>
-              <a:spcBef>
-                <a:spcPts val="0"/>
-              </a:spcBef>
-              <a:spcAft>
-                <a:spcPts val="0"/>
-              </a:spcAft>
-            </a:pPr>
-            <a:r>
-              <a:rPr lang="en-US" b="0" dirty="0">
-                <a:effectLst/>
-              </a:rPr>
-              <a:t>Conservative/Liberal Bias of </a:t>
-            </a:r>
-            <a:r>
-              <a:rPr lang="en-US" b="0" dirty="0" err="1">
-                <a:effectLst/>
-              </a:rPr>
-              <a:t>NewsPapers</a:t>
-            </a:r>
-            <a:r>
-              <a:rPr lang="en-US" b="0" dirty="0">
-                <a:effectLst/>
-              </a:rPr>
-              <a:t> 	https://www.journalism.org/2014/10/21/political-polarization-media-habits/ </a:t>
-            </a:r>
-          </a:p>
-          <a:p>
-            <a:pPr marL="0" indent="0" rtl="0">
-              <a:spcBef>
-                <a:spcPts val="1200"/>
-              </a:spcBef>
-              <a:spcAft>
-                <a:spcPts val="1200"/>
-              </a:spcAft>
-              <a:buNone/>
-            </a:pPr>
-            <a:endParaRPr lang="en-US" b="0" dirty="0">
-              <a:effectLst/>
-            </a:endParaRPr>
           </a:p>
         </p:txBody>
       </p:sp>
@@ -4315,7 +5343,7 @@
         <p:spPr/>
         <p:txBody>
           <a:bodyPr>
-            <a:normAutofit fontScale="85000" lnSpcReduction="20000"/>
+            <a:normAutofit lnSpcReduction="10000"/>
           </a:bodyPr>
           <a:lstStyle/>
           <a:p>
@@ -4329,7 +5357,7 @@
             </a:pPr>
             <a:r>
               <a:rPr lang="en-US" dirty="0"/>
-              <a:t>Pull down and store headlines and newspaper metadata from the News API with four keywords: immigration, immigrant(s), migrant(s), refugee(s)</a:t>
+              <a:t>Pull down and store headlines and newspaper metadata from the News API with four keywords:</a:t>
             </a:r>
           </a:p>
           <a:p>
@@ -4343,7 +5371,7 @@
             </a:pPr>
             <a:r>
               <a:rPr lang="en-US" dirty="0"/>
-              <a:t>Only searching domains available in Pew Research Center</a:t>
+              <a:t>immigration</a:t>
             </a:r>
           </a:p>
           <a:p>
@@ -4357,7 +5385,7 @@
             </a:pPr>
             <a:r>
               <a:rPr lang="en-US" dirty="0"/>
-              <a:t>Searching keywords in news article</a:t>
+              <a:t>immigrant(s)</a:t>
             </a:r>
           </a:p>
           <a:p>
@@ -4371,7 +5399,21 @@
             </a:pPr>
             <a:r>
               <a:rPr lang="en-US" dirty="0"/>
-              <a:t>Sort by relevance</a:t>
+              <a:t>migrant(s)</a:t>
+            </a:r>
+          </a:p>
+          <a:p>
+            <a:pPr lvl="1">
+              <a:spcBef>
+                <a:spcPts val="0"/>
+              </a:spcBef>
+              <a:spcAft>
+                <a:spcPts val="0"/>
+              </a:spcAft>
+            </a:pPr>
+            <a:r>
+              <a:rPr lang="en-US" dirty="0"/>
+              <a:t>refugee(s)</a:t>
             </a:r>
           </a:p>
           <a:p>
@@ -4398,7 +5440,7 @@
               </a:spcAft>
             </a:pPr>
             <a:r>
-              <a:rPr lang="en-US" dirty="0"/>
+              <a:rPr lang="en-US" strike="sngStrike" dirty="0"/>
               <a:t>Create numerical representation of conservative vs. liberal news sources</a:t>
             </a:r>
           </a:p>
@@ -4413,7 +5455,7 @@
             </a:pPr>
             <a:r>
               <a:rPr lang="en-US" dirty="0"/>
-              <a:t>Perform sentiment analysis: https://www.nltk.org/_modules/nltk/sentiment/vader.html </a:t>
+              <a:t>Perform sentiment analysis using NLTK’s Vader</a:t>
             </a:r>
           </a:p>
           <a:p>
@@ -4427,49 +5469,7 @@
             </a:pPr>
             <a:r>
               <a:rPr lang="en-US" dirty="0"/>
-              <a:t>Determine cutoff points for negative/neutral/positive ratings</a:t>
-            </a:r>
-          </a:p>
-          <a:p>
-            <a:pPr lvl="1">
-              <a:spcBef>
-                <a:spcPts val="0"/>
-              </a:spcBef>
-              <a:spcAft>
-                <a:spcPts val="0"/>
-              </a:spcAft>
-            </a:pPr>
-            <a:r>
-              <a:rPr lang="en-US" dirty="0"/>
-              <a:t>-1.0 to -0.2 = negative</a:t>
-            </a:r>
-          </a:p>
-          <a:p>
-            <a:pPr lvl="1">
-              <a:spcBef>
-                <a:spcPts val="0"/>
-              </a:spcBef>
-              <a:spcAft>
-                <a:spcPts val="0"/>
-              </a:spcAft>
-            </a:pPr>
-            <a:r>
-              <a:rPr lang="en-US" dirty="0"/>
-              <a:t>-0.2 to 0.2 = neutral</a:t>
-            </a:r>
-          </a:p>
-          <a:p>
-            <a:pPr lvl="1">
-              <a:spcBef>
-                <a:spcPts val="0"/>
-              </a:spcBef>
-              <a:spcAft>
-                <a:spcPts val="0"/>
-              </a:spcAft>
-            </a:pPr>
-            <a:r>
-              <a:rPr lang="en-US" dirty="0"/>
-              <a:t>0.2 - 1 = positive</a:t>
+              <a:t>Determined bins for negative/neutral/positive ratings</a:t>
             </a:r>
           </a:p>
           <a:p>
@@ -4483,7 +5483,7 @@
             </a:pPr>
             <a:r>
               <a:rPr lang="en-US" dirty="0"/>
-              <a:t>Reach goal: perform keyword analysis and n-gram analysis</a:t>
+              <a:t>Performed keyword analysis</a:t>
             </a:r>
           </a:p>
           <a:p>
@@ -4495,13 +5495,10 @@
                 <a:spcPts val="0"/>
               </a:spcAft>
             </a:pPr>
-            <a:r>
-              <a:rPr lang="en-US" dirty="0"/>
-              <a:t>Analyze and visualize data - potential areas: </a:t>
-            </a:r>
-          </a:p>
-          <a:p>
-            <a:pPr lvl="1">
+            <a:endParaRPr lang="en-US" dirty="0"/>
+          </a:p>
+          <a:p>
+            <a:pPr>
               <a:spcBef>
                 <a:spcPts val="0"/>
               </a:spcBef>
@@ -4511,35 +5508,7 @@
             </a:pPr>
             <a:r>
               <a:rPr lang="en-US" dirty="0"/>
-              <a:t>Sentiment by keyword (migrants, refugees, immigrants)</a:t>
-            </a:r>
-          </a:p>
-          <a:p>
-            <a:pPr lvl="1">
-              <a:spcBef>
-                <a:spcPts val="0"/>
-              </a:spcBef>
-              <a:spcAft>
-                <a:spcPts val="0"/>
-              </a:spcAft>
-            </a:pPr>
-            <a:r>
-              <a:rPr lang="en-US" dirty="0"/>
-              <a:t>Sentiment by newspaper</a:t>
-            </a:r>
-          </a:p>
-          <a:p>
-            <a:pPr lvl="1">
-              <a:spcBef>
-                <a:spcPts val="0"/>
-              </a:spcBef>
-              <a:spcAft>
-                <a:spcPts val="0"/>
-              </a:spcAft>
-            </a:pPr>
-            <a:r>
-              <a:rPr lang="en-US" dirty="0"/>
-              <a:t>Sentiment by left vs. right</a:t>
+              <a:t>TENSE</a:t>
             </a:r>
           </a:p>
         </p:txBody>
@@ -4602,28 +5571,80 @@
           </a:p>
         </p:txBody>
       </p:sp>
-      <p:sp>
-        <p:nvSpPr>
-          <p:cNvPr id="3" name="Content Placeholder 2">
+      <p:pic>
+        <p:nvPicPr>
+          <p:cNvPr id="4" name="Content Placeholder 4">
             <a:extLst>
               <a:ext uri="{FF2B5EF4-FFF2-40B4-BE49-F238E27FC236}">
-                <a16:creationId xmlns:a16="http://schemas.microsoft.com/office/drawing/2014/main" id="{3C61505E-A045-4D93-AAF1-4FE014076D80}"/>
+                <a16:creationId xmlns:a16="http://schemas.microsoft.com/office/drawing/2014/main" id="{8D81DDF3-5428-4900-A029-39FCFDC225BE}"/>
               </a:ext>
             </a:extLst>
           </p:cNvPr>
-          <p:cNvSpPr>
-            <a:spLocks noGrp="1"/>
-          </p:cNvSpPr>
-          <p:nvPr>
-            <p:ph idx="1"/>
-          </p:nvPr>
-        </p:nvSpPr>
-        <p:spPr/>
-        <p:txBody>
-          <a:bodyPr/>
+          <p:cNvPicPr>
+            <a:picLocks noChangeAspect="1"/>
+          </p:cNvPicPr>
+          <p:nvPr/>
+        </p:nvPicPr>
+        <p:blipFill>
+          <a:blip r:embed="rId2"/>
+          <a:stretch>
+            <a:fillRect/>
+          </a:stretch>
+        </p:blipFill>
+        <p:spPr>
+          <a:xfrm>
+            <a:off x="1371600" y="2171700"/>
+            <a:ext cx="5372100" cy="3581400"/>
+          </a:xfrm>
+          <a:prstGeom prst="rect">
+            <a:avLst/>
+          </a:prstGeom>
+        </p:spPr>
+      </p:pic>
+      <p:sp>
+        <p:nvSpPr>
+          <p:cNvPr id="5" name="TextBox 4">
+            <a:extLst>
+              <a:ext uri="{FF2B5EF4-FFF2-40B4-BE49-F238E27FC236}">
+                <a16:creationId xmlns:a16="http://schemas.microsoft.com/office/drawing/2014/main" id="{370E6952-E282-41C7-831B-5C48CF7D1B3D}"/>
+              </a:ext>
+            </a:extLst>
+          </p:cNvPr>
+          <p:cNvSpPr txBox="1"/>
+          <p:nvPr/>
+        </p:nvSpPr>
+        <p:spPr>
+          <a:xfrm>
+            <a:off x="7812741" y="1869141"/>
+            <a:ext cx="2749920" cy="923330"/>
+          </a:xfrm>
+          <a:prstGeom prst="rect">
+            <a:avLst/>
+          </a:prstGeom>
+          <a:noFill/>
+        </p:spPr>
+        <p:txBody>
+          <a:bodyPr wrap="none" rtlCol="0">
+            <a:spAutoFit/>
+          </a:bodyPr>
           <a:lstStyle/>
           <a:p>
-            <a:endParaRPr lang="en-US"/>
+            <a:r>
+              <a:rPr lang="en-US" dirty="0"/>
+              <a:t>Describe data set</a:t>
+            </a:r>
+          </a:p>
+          <a:p>
+            <a:r>
+              <a:rPr lang="en-US" dirty="0"/>
+              <a:t>Need to fix titles in image</a:t>
+            </a:r>
+          </a:p>
+          <a:p>
+            <a:r>
+              <a:rPr lang="en-US" dirty="0"/>
+              <a:t>Need summary stats table</a:t>
+            </a:r>
           </a:p>
         </p:txBody>
       </p:sp>
@@ -4685,35 +5706,81 @@
           </a:p>
         </p:txBody>
       </p:sp>
-      <p:sp>
-        <p:nvSpPr>
-          <p:cNvPr id="3" name="Content Placeholder 2">
+      <p:pic>
+        <p:nvPicPr>
+          <p:cNvPr id="8" name="Content Placeholder 4">
             <a:extLst>
               <a:ext uri="{FF2B5EF4-FFF2-40B4-BE49-F238E27FC236}">
-                <a16:creationId xmlns:a16="http://schemas.microsoft.com/office/drawing/2014/main" id="{3C61505E-A045-4D93-AAF1-4FE014076D80}"/>
+                <a16:creationId xmlns:a16="http://schemas.microsoft.com/office/drawing/2014/main" id="{BDF77434-7F9A-47B8-AD14-F7FF046BF989}"/>
               </a:ext>
             </a:extLst>
           </p:cNvPr>
-          <p:cNvSpPr>
-            <a:spLocks noGrp="1"/>
-          </p:cNvSpPr>
-          <p:nvPr>
-            <p:ph idx="1"/>
-          </p:nvPr>
-        </p:nvSpPr>
-        <p:spPr/>
-        <p:txBody>
-          <a:bodyPr/>
+          <p:cNvPicPr>
+            <a:picLocks noChangeAspect="1"/>
+          </p:cNvPicPr>
+          <p:nvPr/>
+        </p:nvPicPr>
+        <p:blipFill>
+          <a:blip r:embed="rId2"/>
+          <a:stretch>
+            <a:fillRect/>
+          </a:stretch>
+        </p:blipFill>
+        <p:spPr>
+          <a:xfrm>
+            <a:off x="1219200" y="2044252"/>
+            <a:ext cx="3581400" cy="3581400"/>
+          </a:xfrm>
+          <a:prstGeom prst="rect">
+            <a:avLst/>
+          </a:prstGeom>
+        </p:spPr>
+      </p:pic>
+      <p:sp>
+        <p:nvSpPr>
+          <p:cNvPr id="10" name="TextBox 9">
+            <a:extLst>
+              <a:ext uri="{FF2B5EF4-FFF2-40B4-BE49-F238E27FC236}">
+                <a16:creationId xmlns:a16="http://schemas.microsoft.com/office/drawing/2014/main" id="{6480B22D-BF79-4E73-A67E-724DDD59837C}"/>
+              </a:ext>
+            </a:extLst>
+          </p:cNvPr>
+          <p:cNvSpPr txBox="1"/>
+          <p:nvPr/>
+        </p:nvSpPr>
+        <p:spPr>
+          <a:xfrm>
+            <a:off x="7812741" y="1869141"/>
+            <a:ext cx="2792431" cy="646331"/>
+          </a:xfrm>
+          <a:prstGeom prst="rect">
+            <a:avLst/>
+          </a:prstGeom>
+          <a:noFill/>
+        </p:spPr>
+        <p:txBody>
+          <a:bodyPr wrap="none" rtlCol="0">
+            <a:spAutoFit/>
+          </a:bodyPr>
           <a:lstStyle/>
           <a:p>
-            <a:endParaRPr lang="en-US"/>
+            <a:r>
+              <a:rPr lang="en-US" dirty="0"/>
+              <a:t>Descriptive stats</a:t>
+            </a:r>
+          </a:p>
+          <a:p>
+            <a:r>
+              <a:rPr lang="en-US" dirty="0"/>
+              <a:t>“Ugly” table from notebook</a:t>
+            </a:r>
           </a:p>
         </p:txBody>
       </p:sp>
     </p:spTree>
     <p:extLst>
       <p:ext uri="{BB962C8B-B14F-4D97-AF65-F5344CB8AC3E}">
-        <p14:creationId xmlns:p14="http://schemas.microsoft.com/office/powerpoint/2010/main" val="3833635891"/>
+        <p14:creationId xmlns:p14="http://schemas.microsoft.com/office/powerpoint/2010/main" val="996373735"/>
       </p:ext>
     </p:extLst>
   </p:cSld>
@@ -4768,35 +5835,177 @@
           </a:p>
         </p:txBody>
       </p:sp>
-      <p:sp>
-        <p:nvSpPr>
-          <p:cNvPr id="3" name="Content Placeholder 2">
+      <p:pic>
+        <p:nvPicPr>
+          <p:cNvPr id="5" name="Content Placeholder 4">
             <a:extLst>
               <a:ext uri="{FF2B5EF4-FFF2-40B4-BE49-F238E27FC236}">
-                <a16:creationId xmlns:a16="http://schemas.microsoft.com/office/drawing/2014/main" id="{3C61505E-A045-4D93-AAF1-4FE014076D80}"/>
+                <a16:creationId xmlns:a16="http://schemas.microsoft.com/office/drawing/2014/main" id="{20995F38-0608-4CB0-8367-DC705EB68F82}"/>
               </a:ext>
             </a:extLst>
           </p:cNvPr>
-          <p:cNvSpPr>
-            <a:spLocks noGrp="1"/>
-          </p:cNvSpPr>
+          <p:cNvPicPr>
+            <a:picLocks noGrp="1" noChangeAspect="1"/>
+          </p:cNvPicPr>
           <p:nvPr>
             <p:ph idx="1"/>
           </p:nvPr>
-        </p:nvSpPr>
-        <p:spPr/>
-        <p:txBody>
-          <a:bodyPr/>
+        </p:nvPicPr>
+        <p:blipFill>
+          <a:blip r:embed="rId2"/>
+          <a:stretch>
+            <a:fillRect/>
+          </a:stretch>
+        </p:blipFill>
+        <p:spPr>
+          <a:xfrm>
+            <a:off x="1950384" y="1909483"/>
+            <a:ext cx="4476750" cy="3581400"/>
+          </a:xfrm>
+        </p:spPr>
+      </p:pic>
+      <p:sp>
+        <p:nvSpPr>
+          <p:cNvPr id="7" name="TextBox 6">
+            <a:extLst>
+              <a:ext uri="{FF2B5EF4-FFF2-40B4-BE49-F238E27FC236}">
+                <a16:creationId xmlns:a16="http://schemas.microsoft.com/office/drawing/2014/main" id="{5BB0E451-C0D1-4D5B-A5D7-02F06B62EA3F}"/>
+              </a:ext>
+            </a:extLst>
+          </p:cNvPr>
+          <p:cNvSpPr txBox="1"/>
+          <p:nvPr/>
+        </p:nvSpPr>
+        <p:spPr>
+          <a:xfrm>
+            <a:off x="1139639" y="5867400"/>
+            <a:ext cx="6098240" cy="830997"/>
+          </a:xfrm>
+          <a:prstGeom prst="rect">
+            <a:avLst/>
+          </a:prstGeom>
+          <a:noFill/>
+        </p:spPr>
+        <p:txBody>
+          <a:bodyPr wrap="square">
+            <a:spAutoFit/>
+          </a:bodyPr>
           <a:lstStyle/>
           <a:p>
-            <a:endParaRPr lang="en-US"/>
+            <a:pPr lvl="1">
+              <a:spcBef>
+                <a:spcPts val="0"/>
+              </a:spcBef>
+              <a:spcAft>
+                <a:spcPts val="0"/>
+              </a:spcAft>
+            </a:pPr>
+            <a:r>
+              <a:rPr lang="en-US" sz="1200" dirty="0"/>
+              <a:t>Bins for data:</a:t>
+            </a:r>
+          </a:p>
+          <a:p>
+            <a:pPr lvl="1">
+              <a:spcBef>
+                <a:spcPts val="0"/>
+              </a:spcBef>
+              <a:spcAft>
+                <a:spcPts val="0"/>
+              </a:spcAft>
+            </a:pPr>
+            <a:r>
+              <a:rPr lang="en-US" sz="1200" dirty="0"/>
+              <a:t>-1.0 to -0.2 = negative</a:t>
+            </a:r>
+          </a:p>
+          <a:p>
+            <a:pPr lvl="1">
+              <a:spcBef>
+                <a:spcPts val="0"/>
+              </a:spcBef>
+              <a:spcAft>
+                <a:spcPts val="0"/>
+              </a:spcAft>
+            </a:pPr>
+            <a:r>
+              <a:rPr lang="en-US" sz="1200" dirty="0"/>
+              <a:t>-0.2 to 0.2 = neutral</a:t>
+            </a:r>
+          </a:p>
+          <a:p>
+            <a:pPr lvl="1">
+              <a:spcBef>
+                <a:spcPts val="0"/>
+              </a:spcBef>
+              <a:spcAft>
+                <a:spcPts val="0"/>
+              </a:spcAft>
+            </a:pPr>
+            <a:r>
+              <a:rPr lang="en-US" sz="1200" dirty="0"/>
+              <a:t>0.2 - 1 = positive</a:t>
+            </a:r>
+          </a:p>
+        </p:txBody>
+      </p:sp>
+      <p:sp>
+        <p:nvSpPr>
+          <p:cNvPr id="8" name="TextBox 7">
+            <a:extLst>
+              <a:ext uri="{FF2B5EF4-FFF2-40B4-BE49-F238E27FC236}">
+                <a16:creationId xmlns:a16="http://schemas.microsoft.com/office/drawing/2014/main" id="{C65C89DD-619F-4E2E-A3DA-75FBD1FCE033}"/>
+              </a:ext>
+            </a:extLst>
+          </p:cNvPr>
+          <p:cNvSpPr txBox="1"/>
+          <p:nvPr/>
+        </p:nvSpPr>
+        <p:spPr>
+          <a:xfrm>
+            <a:off x="6763870" y="1909483"/>
+            <a:ext cx="5671040" cy="1200329"/>
+          </a:xfrm>
+          <a:prstGeom prst="rect">
+            <a:avLst/>
+          </a:prstGeom>
+          <a:noFill/>
+        </p:spPr>
+        <p:txBody>
+          <a:bodyPr wrap="none" rtlCol="0">
+            <a:spAutoFit/>
+          </a:bodyPr>
+          <a:lstStyle/>
+          <a:p>
+            <a:r>
+              <a:rPr lang="en-US" dirty="0"/>
+              <a:t>Count of positive/negative/neutral per news source</a:t>
+            </a:r>
+          </a:p>
+          <a:p>
+            <a:r>
+              <a:rPr lang="en-US" dirty="0"/>
+              <a:t>Need to determine talking points: </a:t>
+            </a:r>
+          </a:p>
+          <a:p>
+            <a:r>
+              <a:rPr lang="en-US" dirty="0"/>
+              <a:t>Could be extreme language, could be extreme view point</a:t>
+            </a:r>
+          </a:p>
+          <a:p>
+            <a:r>
+              <a:rPr lang="en-US" dirty="0"/>
+              <a:t>Example of positive/negative title</a:t>
+            </a:r>
           </a:p>
         </p:txBody>
       </p:sp>
     </p:spTree>
     <p:extLst>
       <p:ext uri="{BB962C8B-B14F-4D97-AF65-F5344CB8AC3E}">
-        <p14:creationId xmlns:p14="http://schemas.microsoft.com/office/powerpoint/2010/main" val="996373735"/>
+        <p14:creationId xmlns:p14="http://schemas.microsoft.com/office/powerpoint/2010/main" val="3833635891"/>
       </p:ext>
     </p:extLst>
   </p:cSld>
@@ -4846,36 +6055,70 @@
           <a:p>
             <a:r>
               <a:rPr lang="en-US" dirty="0"/>
-              <a:t>Insights</a:t>
-            </a:r>
-          </a:p>
-        </p:txBody>
-      </p:sp>
-      <p:sp>
-        <p:nvSpPr>
-          <p:cNvPr id="3" name="Content Placeholder 2">
+              <a:t>Most frequent words</a:t>
+            </a:r>
+          </a:p>
+        </p:txBody>
+      </p:sp>
+      <p:pic>
+        <p:nvPicPr>
+          <p:cNvPr id="5" name="Content Placeholder 4">
             <a:extLst>
               <a:ext uri="{FF2B5EF4-FFF2-40B4-BE49-F238E27FC236}">
-                <a16:creationId xmlns:a16="http://schemas.microsoft.com/office/drawing/2014/main" id="{3C61505E-A045-4D93-AAF1-4FE014076D80}"/>
+                <a16:creationId xmlns:a16="http://schemas.microsoft.com/office/drawing/2014/main" id="{C0F80B75-CE59-4699-B83E-516676432F43}"/>
               </a:ext>
             </a:extLst>
           </p:cNvPr>
-          <p:cNvSpPr>
-            <a:spLocks noGrp="1"/>
-          </p:cNvSpPr>
+          <p:cNvPicPr>
+            <a:picLocks noGrp="1" noChangeAspect="1"/>
+          </p:cNvPicPr>
           <p:nvPr>
             <p:ph idx="1"/>
           </p:nvPr>
-        </p:nvSpPr>
-        <p:spPr/>
-        <p:txBody>
-          <a:bodyPr/>
-          <a:lstStyle/>
-          <a:p>
-            <a:endParaRPr lang="en-US"/>
-          </a:p>
-        </p:txBody>
-      </p:sp>
+        </p:nvPicPr>
+        <p:blipFill>
+          <a:blip r:embed="rId3"/>
+          <a:stretch>
+            <a:fillRect/>
+          </a:stretch>
+        </p:blipFill>
+        <p:spPr>
+          <a:xfrm>
+            <a:off x="876115" y="2171700"/>
+            <a:ext cx="5372100" cy="3581400"/>
+          </a:xfrm>
+        </p:spPr>
+      </p:pic>
+      <p:pic>
+        <p:nvPicPr>
+          <p:cNvPr id="7" name="Picture 6">
+            <a:extLst>
+              <a:ext uri="{FF2B5EF4-FFF2-40B4-BE49-F238E27FC236}">
+                <a16:creationId xmlns:a16="http://schemas.microsoft.com/office/drawing/2014/main" id="{31B4DBB5-9BA0-4EB2-A444-D5F07B38B169}"/>
+              </a:ext>
+            </a:extLst>
+          </p:cNvPr>
+          <p:cNvPicPr>
+            <a:picLocks noChangeAspect="1"/>
+          </p:cNvPicPr>
+          <p:nvPr/>
+        </p:nvPicPr>
+        <p:blipFill>
+          <a:blip r:embed="rId4"/>
+          <a:stretch>
+            <a:fillRect/>
+          </a:stretch>
+        </p:blipFill>
+        <p:spPr>
+          <a:xfrm>
+            <a:off x="6450481" y="2171700"/>
+            <a:ext cx="5487650" cy="3658433"/>
+          </a:xfrm>
+          <a:prstGeom prst="rect">
+            <a:avLst/>
+          </a:prstGeom>
+        </p:spPr>
+      </p:pic>
     </p:spTree>
     <p:extLst>
       <p:ext uri="{BB962C8B-B14F-4D97-AF65-F5344CB8AC3E}">
@@ -4911,7 +6154,7 @@
           <p:cNvPr id="2" name="Title 1">
             <a:extLst>
               <a:ext uri="{FF2B5EF4-FFF2-40B4-BE49-F238E27FC236}">
-                <a16:creationId xmlns:a16="http://schemas.microsoft.com/office/drawing/2014/main" id="{6E1DFE7F-8996-4432-B0B9-1278B1C45367}"/>
+                <a16:creationId xmlns:a16="http://schemas.microsoft.com/office/drawing/2014/main" id="{ADA029E3-0F45-465C-854E-81C45A498C86}"/>
               </a:ext>
             </a:extLst>
           </p:cNvPr>
@@ -4929,40 +6172,142 @@
           <a:p>
             <a:r>
               <a:rPr lang="en-US" dirty="0"/>
-              <a:t>Interesting things we learned along the way</a:t>
-            </a:r>
-          </a:p>
-        </p:txBody>
-      </p:sp>
-      <p:sp>
-        <p:nvSpPr>
-          <p:cNvPr id="3" name="Content Placeholder 2">
+              <a:t>The bigger picture</a:t>
+            </a:r>
+          </a:p>
+        </p:txBody>
+      </p:sp>
+      <p:pic>
+        <p:nvPicPr>
+          <p:cNvPr id="5" name="Content Placeholder 4">
             <a:extLst>
               <a:ext uri="{FF2B5EF4-FFF2-40B4-BE49-F238E27FC236}">
-                <a16:creationId xmlns:a16="http://schemas.microsoft.com/office/drawing/2014/main" id="{62650EB6-537B-41B0-BD21-36EDF3512704}"/>
+                <a16:creationId xmlns:a16="http://schemas.microsoft.com/office/drawing/2014/main" id="{61B5D899-AB94-41CC-BDB2-80D86E0E3A56}"/>
               </a:ext>
             </a:extLst>
           </p:cNvPr>
-          <p:cNvSpPr>
-            <a:spLocks noGrp="1"/>
-          </p:cNvSpPr>
+          <p:cNvPicPr>
+            <a:picLocks noGrp="1" noChangeAspect="1"/>
+          </p:cNvPicPr>
           <p:nvPr>
             <p:ph idx="1"/>
           </p:nvPr>
-        </p:nvSpPr>
-        <p:spPr/>
-        <p:txBody>
-          <a:bodyPr/>
+        </p:nvPicPr>
+        <p:blipFill rotWithShape="1">
+          <a:blip r:embed="rId2"/>
+          <a:srcRect l="7635" t="18586" r="5257" b="12515"/>
+          <a:stretch/>
+        </p:blipFill>
+        <p:spPr>
+          <a:xfrm>
+            <a:off x="1371600" y="2259104"/>
+            <a:ext cx="4947344" cy="3913095"/>
+          </a:xfrm>
+        </p:spPr>
+      </p:pic>
+      <p:pic>
+        <p:nvPicPr>
+          <p:cNvPr id="7" name="Picture 6">
+            <a:extLst>
+              <a:ext uri="{FF2B5EF4-FFF2-40B4-BE49-F238E27FC236}">
+                <a16:creationId xmlns:a16="http://schemas.microsoft.com/office/drawing/2014/main" id="{1A1AA57C-65CA-4CF7-8B76-D31D849A0EDC}"/>
+              </a:ext>
+            </a:extLst>
+          </p:cNvPr>
+          <p:cNvPicPr>
+            <a:picLocks noChangeAspect="1"/>
+          </p:cNvPicPr>
+          <p:nvPr/>
+        </p:nvPicPr>
+        <p:blipFill rotWithShape="1">
+          <a:blip r:embed="rId3"/>
+          <a:srcRect l="8171" t="17843" r="5164" b="12746"/>
+          <a:stretch/>
+        </p:blipFill>
+        <p:spPr>
+          <a:xfrm>
+            <a:off x="6763872" y="2259105"/>
+            <a:ext cx="4885842" cy="3913095"/>
+          </a:xfrm>
+          <a:prstGeom prst="rect">
+            <a:avLst/>
+          </a:prstGeom>
+        </p:spPr>
+      </p:pic>
+      <p:sp>
+        <p:nvSpPr>
+          <p:cNvPr id="8" name="TextBox 7">
+            <a:extLst>
+              <a:ext uri="{FF2B5EF4-FFF2-40B4-BE49-F238E27FC236}">
+                <a16:creationId xmlns:a16="http://schemas.microsoft.com/office/drawing/2014/main" id="{A18138FB-2DB6-474D-B3D1-9F757C02832D}"/>
+              </a:ext>
+            </a:extLst>
+          </p:cNvPr>
+          <p:cNvSpPr txBox="1"/>
+          <p:nvPr/>
+        </p:nvSpPr>
+        <p:spPr>
+          <a:xfrm>
+            <a:off x="3052482" y="6259603"/>
+            <a:ext cx="1037207" cy="369332"/>
+          </a:xfrm>
+          <a:prstGeom prst="rect">
+            <a:avLst/>
+          </a:prstGeom>
+          <a:noFill/>
+        </p:spPr>
+        <p:txBody>
+          <a:bodyPr wrap="none" rtlCol="0">
+            <a:spAutoFit/>
+          </a:bodyPr>
           <a:lstStyle/>
           <a:p>
-            <a:endParaRPr lang="en-US"/>
+            <a:r>
+              <a:rPr lang="en-US" dirty="0"/>
+              <a:t>Negative</a:t>
+            </a:r>
+          </a:p>
+        </p:txBody>
+      </p:sp>
+      <p:sp>
+        <p:nvSpPr>
+          <p:cNvPr id="10" name="TextBox 9">
+            <a:extLst>
+              <a:ext uri="{FF2B5EF4-FFF2-40B4-BE49-F238E27FC236}">
+                <a16:creationId xmlns:a16="http://schemas.microsoft.com/office/drawing/2014/main" id="{875B1AD5-3EE4-4B2C-9BD7-1429A1835369}"/>
+              </a:ext>
+            </a:extLst>
+          </p:cNvPr>
+          <p:cNvSpPr txBox="1"/>
+          <p:nvPr/>
+        </p:nvSpPr>
+        <p:spPr>
+          <a:xfrm>
+            <a:off x="8946776" y="6286032"/>
+            <a:ext cx="936154" cy="369332"/>
+          </a:xfrm>
+          <a:prstGeom prst="rect">
+            <a:avLst/>
+          </a:prstGeom>
+          <a:noFill/>
+        </p:spPr>
+        <p:txBody>
+          <a:bodyPr wrap="none" rtlCol="0">
+            <a:spAutoFit/>
+          </a:bodyPr>
+          <a:lstStyle/>
+          <a:p>
+            <a:r>
+              <a:rPr lang="en-US" dirty="0"/>
+              <a:t>Positive</a:t>
+            </a:r>
           </a:p>
         </p:txBody>
       </p:sp>
     </p:spTree>
     <p:extLst>
       <p:ext uri="{BB962C8B-B14F-4D97-AF65-F5344CB8AC3E}">
-        <p14:creationId xmlns:p14="http://schemas.microsoft.com/office/powerpoint/2010/main" val="1768583760"/>
+        <p14:creationId xmlns:p14="http://schemas.microsoft.com/office/powerpoint/2010/main" val="2513785858"/>
       </p:ext>
     </p:extLst>
   </p:cSld>
@@ -5012,7 +6357,7 @@
           <a:p>
             <a:r>
               <a:rPr lang="en-US" dirty="0"/>
-              <a:t>Conclusion</a:t>
+              <a:t>Key takeaways</a:t>
             </a:r>
           </a:p>
         </p:txBody>
@@ -5035,10 +6380,120 @@
         </p:nvSpPr>
         <p:spPr/>
         <p:txBody>
-          <a:bodyPr/>
+          <a:bodyPr>
+            <a:normAutofit fontScale="70000" lnSpcReduction="20000"/>
+          </a:bodyPr>
           <a:lstStyle/>
           <a:p>
-            <a:endParaRPr lang="en-US" dirty="0"/>
+            <a:r>
+              <a:rPr lang="en-US" dirty="0"/>
+              <a:t>Key findings</a:t>
+            </a:r>
+          </a:p>
+          <a:p>
+            <a:pPr lvl="1"/>
+            <a:r>
+              <a:rPr lang="en-US" dirty="0" err="1"/>
+              <a:t>Britebart</a:t>
+            </a:r>
+            <a:r>
+              <a:rPr lang="en-US" dirty="0"/>
+              <a:t>/</a:t>
+            </a:r>
+            <a:r>
+              <a:rPr lang="en-US" dirty="0" err="1"/>
+              <a:t>Aljezera</a:t>
+            </a:r>
+            <a:r>
+              <a:rPr lang="en-US" dirty="0"/>
+              <a:t> seem to use most extreme language</a:t>
+            </a:r>
+          </a:p>
+          <a:p>
+            <a:pPr lvl="2"/>
+            <a:r>
+              <a:rPr lang="en-US" dirty="0"/>
+              <a:t>Seem to be writing for a specific population of readers</a:t>
+            </a:r>
+          </a:p>
+          <a:p>
+            <a:pPr lvl="1"/>
+            <a:r>
+              <a:rPr lang="en-US" dirty="0"/>
+              <a:t>Negative/Positive headlines seem to have different topics with some overlap</a:t>
+            </a:r>
+          </a:p>
+          <a:p>
+            <a:pPr lvl="2"/>
+            <a:r>
+              <a:rPr lang="en-US" dirty="0"/>
+              <a:t>Topics seem to change over time based on current events</a:t>
+            </a:r>
+          </a:p>
+          <a:p>
+            <a:r>
+              <a:rPr lang="en-US" dirty="0"/>
+              <a:t>Challenges</a:t>
+            </a:r>
+          </a:p>
+          <a:p>
+            <a:pPr lvl="1"/>
+            <a:r>
+              <a:rPr lang="en-US" dirty="0"/>
+              <a:t>Sentiment scoring is not customized – NLTK Vader was trained on social media</a:t>
+            </a:r>
+          </a:p>
+          <a:p>
+            <a:pPr lvl="1"/>
+            <a:r>
+              <a:rPr lang="en-US" dirty="0" err="1"/>
+              <a:t>NewsAPI</a:t>
+            </a:r>
+            <a:r>
+              <a:rPr lang="en-US" dirty="0"/>
+              <a:t> limits access to sources</a:t>
+            </a:r>
+          </a:p>
+          <a:p>
+            <a:r>
+              <a:rPr lang="en-US" dirty="0"/>
+              <a:t>Additional questions to be asked if had more time/resources</a:t>
+            </a:r>
+          </a:p>
+          <a:p>
+            <a:pPr lvl="1"/>
+            <a:r>
+              <a:rPr lang="en-US" dirty="0"/>
+              <a:t>Emotional analysis – what’s behind the extremity of the language used</a:t>
+            </a:r>
+          </a:p>
+          <a:p>
+            <a:pPr lvl="1"/>
+            <a:r>
+              <a:rPr lang="en-US" dirty="0"/>
+              <a:t>Look at body of the articles instead of headline</a:t>
+            </a:r>
+          </a:p>
+          <a:p>
+            <a:pPr lvl="1"/>
+            <a:r>
+              <a:rPr lang="en-US" dirty="0"/>
+              <a:t>Looking more into differences in publishers and authors</a:t>
+            </a:r>
+          </a:p>
+          <a:p>
+            <a:pPr lvl="1"/>
+            <a:r>
+              <a:rPr lang="en-US" dirty="0"/>
+              <a:t>Customizing the sentiment analysis</a:t>
+            </a:r>
+          </a:p>
+          <a:p>
+            <a:pPr lvl="1"/>
+            <a:r>
+              <a:rPr lang="en-US" dirty="0"/>
+              <a:t>Add to dataset monthly to observe impact of current events</a:t>
+            </a:r>
           </a:p>
         </p:txBody>
       </p:sp>
@@ -5311,4 +6766,299 @@
     </a:ext>
   </a:extLst>
 </a:theme>
+</file>
+
+<file path=ppt/theme/theme2.xml><?xml version="1.0" encoding="utf-8"?>
+<a:theme xmlns:a="http://schemas.openxmlformats.org/drawingml/2006/main" name="Office Theme">
+  <a:themeElements>
+    <a:clrScheme name="Office">
+      <a:dk1>
+        <a:sysClr val="windowText" lastClr="000000"/>
+      </a:dk1>
+      <a:lt1>
+        <a:sysClr val="window" lastClr="FFFFFF"/>
+      </a:lt1>
+      <a:dk2>
+        <a:srgbClr val="44546A"/>
+      </a:dk2>
+      <a:lt2>
+        <a:srgbClr val="E7E6E6"/>
+      </a:lt2>
+      <a:accent1>
+        <a:srgbClr val="4472C4"/>
+      </a:accent1>
+      <a:accent2>
+        <a:srgbClr val="ED7D31"/>
+      </a:accent2>
+      <a:accent3>
+        <a:srgbClr val="A5A5A5"/>
+      </a:accent3>
+      <a:accent4>
+        <a:srgbClr val="FFC000"/>
+      </a:accent4>
+      <a:accent5>
+        <a:srgbClr val="5B9BD5"/>
+      </a:accent5>
+      <a:accent6>
+        <a:srgbClr val="70AD47"/>
+      </a:accent6>
+      <a:hlink>
+        <a:srgbClr val="0563C1"/>
+      </a:hlink>
+      <a:folHlink>
+        <a:srgbClr val="954F72"/>
+      </a:folHlink>
+    </a:clrScheme>
+    <a:fontScheme name="Office">
+      <a:majorFont>
+        <a:latin typeface="Calibri Light" panose="020F0302020204030204"/>
+        <a:ea typeface=""/>
+        <a:cs typeface=""/>
+        <a:font script="Jpan" typeface="游ゴシック Light"/>
+        <a:font script="Hang" typeface="맑은 고딕"/>
+        <a:font script="Hans" typeface="等线 Light"/>
+        <a:font script="Hant" typeface="新細明體"/>
+        <a:font script="Arab" typeface="Times New Roman"/>
+        <a:font script="Hebr" typeface="Times New Roman"/>
+        <a:font script="Thai" typeface="Angsana New"/>
+        <a:font script="Ethi" typeface="Nyala"/>
+        <a:font script="Beng" typeface="Vrinda"/>
+        <a:font script="Gujr" typeface="Shruti"/>
+        <a:font script="Khmr" typeface="MoolBoran"/>
+        <a:font script="Knda" typeface="Tunga"/>
+        <a:font script="Guru" typeface="Raavi"/>
+        <a:font script="Cans" typeface="Euphemia"/>
+        <a:font script="Cher" typeface="Plantagenet Cherokee"/>
+        <a:font script="Yiii" typeface="Microsoft Yi Baiti"/>
+        <a:font script="Tibt" typeface="Microsoft Himalaya"/>
+        <a:font script="Thaa" typeface="MV Boli"/>
+        <a:font script="Deva" typeface="Mangal"/>
+        <a:font script="Telu" typeface="Gautami"/>
+        <a:font script="Taml" typeface="Latha"/>
+        <a:font script="Syrc" typeface="Estrangelo Edessa"/>
+        <a:font script="Orya" typeface="Kalinga"/>
+        <a:font script="Mlym" typeface="Kartika"/>
+        <a:font script="Laoo" typeface="DokChampa"/>
+        <a:font script="Sinh" typeface="Iskoola Pota"/>
+        <a:font script="Mong" typeface="Mongolian Baiti"/>
+        <a:font script="Viet" typeface="Times New Roman"/>
+        <a:font script="Uigh" typeface="Microsoft Uighur"/>
+        <a:font script="Geor" typeface="Sylfaen"/>
+        <a:font script="Armn" typeface="Arial"/>
+        <a:font script="Bugi" typeface="Leelawadee UI"/>
+        <a:font script="Bopo" typeface="Microsoft JhengHei"/>
+        <a:font script="Java" typeface="Javanese Text"/>
+        <a:font script="Lisu" typeface="Segoe UI"/>
+        <a:font script="Mymr" typeface="Myanmar Text"/>
+        <a:font script="Nkoo" typeface="Ebrima"/>
+        <a:font script="Olck" typeface="Nirmala UI"/>
+        <a:font script="Osma" typeface="Ebrima"/>
+        <a:font script="Phag" typeface="Phagspa"/>
+        <a:font script="Syrn" typeface="Estrangelo Edessa"/>
+        <a:font script="Syrj" typeface="Estrangelo Edessa"/>
+        <a:font script="Syre" typeface="Estrangelo Edessa"/>
+        <a:font script="Sora" typeface="Nirmala UI"/>
+        <a:font script="Tale" typeface="Microsoft Tai Le"/>
+        <a:font script="Talu" typeface="Microsoft New Tai Lue"/>
+        <a:font script="Tfng" typeface="Ebrima"/>
+      </a:majorFont>
+      <a:minorFont>
+        <a:latin typeface="Calibri" panose="020F0502020204030204"/>
+        <a:ea typeface=""/>
+        <a:cs typeface=""/>
+        <a:font script="Jpan" typeface="游ゴシック"/>
+        <a:font script="Hang" typeface="맑은 고딕"/>
+        <a:font script="Hans" typeface="等线"/>
+        <a:font script="Hant" typeface="新細明體"/>
+        <a:font script="Arab" typeface="Arial"/>
+        <a:font script="Hebr" typeface="Arial"/>
+        <a:font script="Thai" typeface="Cordia New"/>
+        <a:font script="Ethi" typeface="Nyala"/>
+        <a:font script="Beng" typeface="Vrinda"/>
+        <a:font script="Gujr" typeface="Shruti"/>
+        <a:font script="Khmr" typeface="DaunPenh"/>
+        <a:font script="Knda" typeface="Tunga"/>
+        <a:font script="Guru" typeface="Raavi"/>
+        <a:font script="Cans" typeface="Euphemia"/>
+        <a:font script="Cher" typeface="Plantagenet Cherokee"/>
+        <a:font script="Yiii" typeface="Microsoft Yi Baiti"/>
+        <a:font script="Tibt" typeface="Microsoft Himalaya"/>
+        <a:font script="Thaa" typeface="MV Boli"/>
+        <a:font script="Deva" typeface="Mangal"/>
+        <a:font script="Telu" typeface="Gautami"/>
+        <a:font script="Taml" typeface="Latha"/>
+        <a:font script="Syrc" typeface="Estrangelo Edessa"/>
+        <a:font script="Orya" typeface="Kalinga"/>
+        <a:font script="Mlym" typeface="Kartika"/>
+        <a:font script="Laoo" typeface="DokChampa"/>
+        <a:font script="Sinh" typeface="Iskoola Pota"/>
+        <a:font script="Mong" typeface="Mongolian Baiti"/>
+        <a:font script="Viet" typeface="Arial"/>
+        <a:font script="Uigh" typeface="Microsoft Uighur"/>
+        <a:font script="Geor" typeface="Sylfaen"/>
+        <a:font script="Armn" typeface="Arial"/>
+        <a:font script="Bugi" typeface="Leelawadee UI"/>
+        <a:font script="Bopo" typeface="Microsoft JhengHei"/>
+        <a:font script="Java" typeface="Javanese Text"/>
+        <a:font script="Lisu" typeface="Segoe UI"/>
+        <a:font script="Mymr" typeface="Myanmar Text"/>
+        <a:font script="Nkoo" typeface="Ebrima"/>
+        <a:font script="Olck" typeface="Nirmala UI"/>
+        <a:font script="Osma" typeface="Ebrima"/>
+        <a:font script="Phag" typeface="Phagspa"/>
+        <a:font script="Syrn" typeface="Estrangelo Edessa"/>
+        <a:font script="Syrj" typeface="Estrangelo Edessa"/>
+        <a:font script="Syre" typeface="Estrangelo Edessa"/>
+        <a:font script="Sora" typeface="Nirmala UI"/>
+        <a:font script="Tale" typeface="Microsoft Tai Le"/>
+        <a:font script="Talu" typeface="Microsoft New Tai Lue"/>
+        <a:font script="Tfng" typeface="Ebrima"/>
+      </a:minorFont>
+    </a:fontScheme>
+    <a:fmtScheme name="Office">
+      <a:fillStyleLst>
+        <a:solidFill>
+          <a:schemeClr val="phClr"/>
+        </a:solidFill>
+        <a:gradFill rotWithShape="1">
+          <a:gsLst>
+            <a:gs pos="0">
+              <a:schemeClr val="phClr">
+                <a:lumMod val="110000"/>
+                <a:satMod val="105000"/>
+                <a:tint val="67000"/>
+              </a:schemeClr>
+            </a:gs>
+            <a:gs pos="50000">
+              <a:schemeClr val="phClr">
+                <a:lumMod val="105000"/>
+                <a:satMod val="103000"/>
+                <a:tint val="73000"/>
+              </a:schemeClr>
+            </a:gs>
+            <a:gs pos="100000">
+              <a:schemeClr val="phClr">
+                <a:lumMod val="105000"/>
+                <a:satMod val="109000"/>
+                <a:tint val="81000"/>
+              </a:schemeClr>
+            </a:gs>
+          </a:gsLst>
+          <a:lin ang="5400000" scaled="0"/>
+        </a:gradFill>
+        <a:gradFill rotWithShape="1">
+          <a:gsLst>
+            <a:gs pos="0">
+              <a:schemeClr val="phClr">
+                <a:satMod val="103000"/>
+                <a:lumMod val="102000"/>
+                <a:tint val="94000"/>
+              </a:schemeClr>
+            </a:gs>
+            <a:gs pos="50000">
+              <a:schemeClr val="phClr">
+                <a:satMod val="110000"/>
+                <a:lumMod val="100000"/>
+                <a:shade val="100000"/>
+              </a:schemeClr>
+            </a:gs>
+            <a:gs pos="100000">
+              <a:schemeClr val="phClr">
+                <a:lumMod val="99000"/>
+                <a:satMod val="120000"/>
+                <a:shade val="78000"/>
+              </a:schemeClr>
+            </a:gs>
+          </a:gsLst>
+          <a:lin ang="5400000" scaled="0"/>
+        </a:gradFill>
+      </a:fillStyleLst>
+      <a:lnStyleLst>
+        <a:ln w="6350" cap="flat" cmpd="sng" algn="ctr">
+          <a:solidFill>
+            <a:schemeClr val="phClr"/>
+          </a:solidFill>
+          <a:prstDash val="solid"/>
+          <a:miter lim="800000"/>
+        </a:ln>
+        <a:ln w="12700" cap="flat" cmpd="sng" algn="ctr">
+          <a:solidFill>
+            <a:schemeClr val="phClr"/>
+          </a:solidFill>
+          <a:prstDash val="solid"/>
+          <a:miter lim="800000"/>
+        </a:ln>
+        <a:ln w="19050" cap="flat" cmpd="sng" algn="ctr">
+          <a:solidFill>
+            <a:schemeClr val="phClr"/>
+          </a:solidFill>
+          <a:prstDash val="solid"/>
+          <a:miter lim="800000"/>
+        </a:ln>
+      </a:lnStyleLst>
+      <a:effectStyleLst>
+        <a:effectStyle>
+          <a:effectLst/>
+        </a:effectStyle>
+        <a:effectStyle>
+          <a:effectLst/>
+        </a:effectStyle>
+        <a:effectStyle>
+          <a:effectLst>
+            <a:outerShdw blurRad="57150" dist="19050" dir="5400000" algn="ctr" rotWithShape="0">
+              <a:srgbClr val="000000">
+                <a:alpha val="63000"/>
+              </a:srgbClr>
+            </a:outerShdw>
+          </a:effectLst>
+        </a:effectStyle>
+      </a:effectStyleLst>
+      <a:bgFillStyleLst>
+        <a:solidFill>
+          <a:schemeClr val="phClr"/>
+        </a:solidFill>
+        <a:solidFill>
+          <a:schemeClr val="phClr">
+            <a:tint val="95000"/>
+            <a:satMod val="170000"/>
+          </a:schemeClr>
+        </a:solidFill>
+        <a:gradFill rotWithShape="1">
+          <a:gsLst>
+            <a:gs pos="0">
+              <a:schemeClr val="phClr">
+                <a:tint val="93000"/>
+                <a:satMod val="150000"/>
+                <a:shade val="98000"/>
+                <a:lumMod val="102000"/>
+              </a:schemeClr>
+            </a:gs>
+            <a:gs pos="50000">
+              <a:schemeClr val="phClr">
+                <a:tint val="98000"/>
+                <a:satMod val="130000"/>
+                <a:shade val="90000"/>
+                <a:lumMod val="103000"/>
+              </a:schemeClr>
+            </a:gs>
+            <a:gs pos="100000">
+              <a:schemeClr val="phClr">
+                <a:shade val="63000"/>
+                <a:satMod val="120000"/>
+              </a:schemeClr>
+            </a:gs>
+          </a:gsLst>
+          <a:lin ang="5400000" scaled="0"/>
+        </a:gradFill>
+      </a:bgFillStyleLst>
+    </a:fmtScheme>
+  </a:themeElements>
+  <a:objectDefaults/>
+  <a:extraClrSchemeLst/>
+  <a:extLst>
+    <a:ext uri="{05A4C25C-085E-4340-85A3-A5531E510DB2}">
+      <thm15:themeFamily xmlns:thm15="http://schemas.microsoft.com/office/thememl/2012/main" name="Office Theme" id="{62F939B6-93AF-4DB8-9C6B-D6C7DFDC589F}" vid="{4A3C46E8-61CC-4603-A589-7422A47A8E4A}"/>
+    </a:ext>
+  </a:extLst>
+</a:theme>
 </file>
</xml_diff>

<commit_message>
<draft deck 3, added content and updated charts>
</commit_message>
<xml_diff>
--- a/Group_project_deck.pptx
+++ b/Group_project_deck.pptx
@@ -5,7 +5,7 @@
     <p:sldMasterId id="2147483648" r:id="rId1"/>
   </p:sldMasterIdLst>
   <p:notesMasterIdLst>
-    <p:notesMasterId r:id="rId14"/>
+    <p:notesMasterId r:id="rId15"/>
   </p:notesMasterIdLst>
   <p:sldIdLst>
     <p:sldId id="265" r:id="rId2"/>
@@ -14,12 +14,13 @@
     <p:sldId id="259" r:id="rId5"/>
     <p:sldId id="261" r:id="rId6"/>
     <p:sldId id="260" r:id="rId7"/>
-    <p:sldId id="262" r:id="rId8"/>
-    <p:sldId id="266" r:id="rId9"/>
-    <p:sldId id="264" r:id="rId10"/>
-    <p:sldId id="268" r:id="rId11"/>
-    <p:sldId id="263" r:id="rId12"/>
-    <p:sldId id="267" r:id="rId13"/>
+    <p:sldId id="269" r:id="rId8"/>
+    <p:sldId id="262" r:id="rId9"/>
+    <p:sldId id="266" r:id="rId10"/>
+    <p:sldId id="264" r:id="rId11"/>
+    <p:sldId id="268" r:id="rId12"/>
+    <p:sldId id="263" r:id="rId13"/>
+    <p:sldId id="267" r:id="rId14"/>
   </p:sldIdLst>
   <p:sldSz cx="12192000" cy="6858000"/>
   <p:notesSz cx="6858000" cy="9144000"/>
@@ -208,7 +209,7 @@
           <a:p>
             <a:fld id="{46BE0A99-7F05-42F8-8D10-B7D701853D1D}" type="datetimeFigureOut">
               <a:rPr lang="en-US" smtClean="0"/>
-              <a:t>10/17/2020</a:t>
+              <a:t>10/19/2020</a:t>
             </a:fld>
             <a:endParaRPr lang="en-US"/>
           </a:p>
@@ -728,30 +729,121 @@
           <a:bodyPr/>
           <a:lstStyle/>
           <a:p>
-            <a:pPr marL="0" marR="0" lvl="0" indent="0" algn="l" defTabSz="914400" rtl="0" eaLnBrk="1" fontAlgn="auto" latinLnBrk="0" hangingPunct="1">
-              <a:lnSpc>
-                <a:spcPct val="100000"/>
-              </a:lnSpc>
-              <a:spcBef>
-                <a:spcPts val="0"/>
-              </a:spcBef>
-              <a:spcAft>
-                <a:spcPts val="0"/>
-              </a:spcAft>
-              <a:buClrTx/>
-              <a:buSzTx/>
-              <a:buFontTx/>
-              <a:buNone/>
-              <a:tabLst/>
-              <a:defRPr/>
-            </a:pPr>
-            <a:r>
-              <a:rPr lang="en-US" dirty="0"/>
-              <a:t>Top word used in positive/negative headlines</a:t>
-            </a:r>
-          </a:p>
-          <a:p>
-            <a:endParaRPr lang="en-US" dirty="0"/>
+            <a:r>
+              <a:rPr lang="en-US" sz="1800" b="0" i="0" u="none" strike="noStrike" dirty="0">
+                <a:solidFill>
+                  <a:srgbClr val="000000"/>
+                </a:solidFill>
+                <a:effectLst/>
+                <a:latin typeface="Calibri" panose="020F0502020204030204" pitchFamily="34" charset="0"/>
+              </a:rPr>
+              <a:t>The Washington Post</a:t>
+            </a:r>
+            <a:r>
+              <a:rPr lang="en-US" sz="2800" dirty="0"/>
+              <a:t> - </a:t>
+            </a:r>
+            <a:r>
+              <a:rPr lang="en-US" sz="1800" b="0" i="0" u="none" strike="noStrike" dirty="0">
+                <a:solidFill>
+                  <a:srgbClr val="000000"/>
+                </a:solidFill>
+                <a:effectLst/>
+                <a:latin typeface="Calibri" panose="020F0502020204030204" pitchFamily="34" charset="0"/>
+              </a:rPr>
+              <a:t>Ruth Bader Ginsburg, Supreme Court justice and legal pioneer for gender equality, dies at 87,</a:t>
+            </a:r>
+            <a:r>
+              <a:rPr lang="en-US" sz="2800" dirty="0"/>
+              <a:t> </a:t>
+            </a:r>
+            <a:r>
+              <a:rPr lang="en-US" sz="1800" b="0" i="0" u="none" strike="noStrike" dirty="0">
+                <a:solidFill>
+                  <a:srgbClr val="000000"/>
+                </a:solidFill>
+                <a:effectLst/>
+                <a:latin typeface="Calibri" panose="020F0502020204030204" pitchFamily="34" charset="0"/>
+              </a:rPr>
+              <a:t>0.8176</a:t>
+            </a:r>
+            <a:r>
+              <a:rPr lang="en-US" sz="2800" dirty="0"/>
+              <a:t> </a:t>
+            </a:r>
+          </a:p>
+          <a:p>
+            <a:endParaRPr lang="en-US" sz="2800" b="0" i="0" u="none" strike="noStrike" dirty="0">
+              <a:solidFill>
+                <a:srgbClr val="000000"/>
+              </a:solidFill>
+              <a:effectLst/>
+              <a:latin typeface="Calibri" panose="020F0502020204030204" pitchFamily="34" charset="0"/>
+            </a:endParaRPr>
+          </a:p>
+          <a:p>
+            <a:r>
+              <a:rPr lang="en-US" sz="1800" b="0" i="0" u="none" strike="noStrike" dirty="0">
+                <a:solidFill>
+                  <a:srgbClr val="000000"/>
+                </a:solidFill>
+                <a:effectLst/>
+                <a:latin typeface="Calibri" panose="020F0502020204030204" pitchFamily="34" charset="0"/>
+              </a:rPr>
+              <a:t>Fox News</a:t>
+            </a:r>
+            <a:r>
+              <a:rPr lang="en-US" dirty="0"/>
+              <a:t> - </a:t>
+            </a:r>
+            <a:r>
+              <a:rPr lang="en-US" sz="1800" b="0" i="0" u="none" strike="noStrike" dirty="0">
+                <a:solidFill>
+                  <a:srgbClr val="000000"/>
+                </a:solidFill>
+                <a:effectLst/>
+                <a:latin typeface="Calibri" panose="020F0502020204030204" pitchFamily="34" charset="0"/>
+              </a:rPr>
+              <a:t>Mackenzie </a:t>
+            </a:r>
+            <a:r>
+              <a:rPr lang="en-US" sz="1800" b="0" i="0" u="none" strike="noStrike" dirty="0" err="1">
+                <a:solidFill>
+                  <a:srgbClr val="000000"/>
+                </a:solidFill>
+                <a:effectLst/>
+                <a:latin typeface="Calibri" panose="020F0502020204030204" pitchFamily="34" charset="0"/>
+              </a:rPr>
+              <a:t>Lueckâ’s</a:t>
+            </a:r>
+            <a:r>
+              <a:rPr lang="en-US" sz="1800" b="0" i="0" u="none" strike="noStrike" dirty="0">
+                <a:solidFill>
+                  <a:srgbClr val="000000"/>
+                </a:solidFill>
+                <a:effectLst/>
+                <a:latin typeface="Calibri" panose="020F0502020204030204" pitchFamily="34" charset="0"/>
+              </a:rPr>
+              <a:t> killer pleads guilty to aggravated murder, will avoid death penalty: reports, </a:t>
+            </a:r>
+            <a:r>
+              <a:rPr lang="en-US" dirty="0"/>
+              <a:t> </a:t>
+            </a:r>
+            <a:r>
+              <a:rPr lang="en-US" sz="1800" b="0" i="0" u="none" strike="noStrike" dirty="0">
+                <a:solidFill>
+                  <a:srgbClr val="000000"/>
+                </a:solidFill>
+                <a:effectLst/>
+                <a:latin typeface="Calibri" panose="020F0502020204030204" pitchFamily="34" charset="0"/>
+              </a:rPr>
+              <a:t>-0.9744</a:t>
+            </a:r>
+            <a:r>
+              <a:rPr lang="en-US" dirty="0"/>
+              <a:t> </a:t>
+            </a:r>
           </a:p>
         </p:txBody>
       </p:sp>
@@ -772,7 +864,7 @@
           <a:p>
             <a:fld id="{1F88B8BE-972A-4AD0-BD0D-E769440C7A47}" type="slidenum">
               <a:rPr lang="en-US" smtClean="0"/>
-              <a:t>7</a:t>
+              <a:t>6</a:t>
             </a:fld>
             <a:endParaRPr lang="en-US"/>
           </a:p>
@@ -781,7 +873,7 @@
     </p:spTree>
     <p:extLst>
       <p:ext uri="{BB962C8B-B14F-4D97-AF65-F5344CB8AC3E}">
-        <p14:creationId xmlns:p14="http://schemas.microsoft.com/office/powerpoint/2010/main" val="3845021542"/>
+        <p14:creationId xmlns:p14="http://schemas.microsoft.com/office/powerpoint/2010/main" val="1538445594"/>
       </p:ext>
     </p:extLst>
   </p:cSld>
@@ -835,6 +927,113 @@
           <a:bodyPr/>
           <a:lstStyle/>
           <a:p>
+            <a:pPr marL="0" marR="0" lvl="0" indent="0" algn="l" defTabSz="914400" rtl="0" eaLnBrk="1" fontAlgn="auto" latinLnBrk="0" hangingPunct="1">
+              <a:lnSpc>
+                <a:spcPct val="100000"/>
+              </a:lnSpc>
+              <a:spcBef>
+                <a:spcPts val="0"/>
+              </a:spcBef>
+              <a:spcAft>
+                <a:spcPts val="0"/>
+              </a:spcAft>
+              <a:buClrTx/>
+              <a:buSzTx/>
+              <a:buFontTx/>
+              <a:buNone/>
+              <a:tabLst/>
+              <a:defRPr/>
+            </a:pPr>
+            <a:r>
+              <a:rPr lang="en-US" dirty="0"/>
+              <a:t>Top word used in positive/negative headlines</a:t>
+            </a:r>
+          </a:p>
+          <a:p>
+            <a:endParaRPr lang="en-US" dirty="0"/>
+          </a:p>
+        </p:txBody>
+      </p:sp>
+      <p:sp>
+        <p:nvSpPr>
+          <p:cNvPr id="4" name="Slide Number Placeholder 3"/>
+          <p:cNvSpPr>
+            <a:spLocks noGrp="1"/>
+          </p:cNvSpPr>
+          <p:nvPr>
+            <p:ph type="sldNum" sz="quarter" idx="5"/>
+          </p:nvPr>
+        </p:nvSpPr>
+        <p:spPr/>
+        <p:txBody>
+          <a:bodyPr/>
+          <a:lstStyle/>
+          <a:p>
+            <a:fld id="{1F88B8BE-972A-4AD0-BD0D-E769440C7A47}" type="slidenum">
+              <a:rPr lang="en-US" smtClean="0"/>
+              <a:t>8</a:t>
+            </a:fld>
+            <a:endParaRPr lang="en-US"/>
+          </a:p>
+        </p:txBody>
+      </p:sp>
+    </p:spTree>
+    <p:extLst>
+      <p:ext uri="{BB962C8B-B14F-4D97-AF65-F5344CB8AC3E}">
+        <p14:creationId xmlns:p14="http://schemas.microsoft.com/office/powerpoint/2010/main" val="3845021542"/>
+      </p:ext>
+    </p:extLst>
+  </p:cSld>
+  <p:clrMapOvr>
+    <a:masterClrMapping/>
+  </p:clrMapOvr>
+</p:notes>
+</file>
+
+<file path=ppt/notesSlides/notesSlide4.xml><?xml version="1.0" encoding="utf-8"?>
+<p:notes xmlns:a="http://schemas.openxmlformats.org/drawingml/2006/main" xmlns:r="http://schemas.openxmlformats.org/officeDocument/2006/relationships" xmlns:p="http://schemas.openxmlformats.org/presentationml/2006/main">
+  <p:cSld>
+    <p:spTree>
+      <p:nvGrpSpPr>
+        <p:cNvPr id="1" name=""/>
+        <p:cNvGrpSpPr/>
+        <p:nvPr/>
+      </p:nvGrpSpPr>
+      <p:grpSpPr>
+        <a:xfrm>
+          <a:off x="0" y="0"/>
+          <a:ext cx="0" cy="0"/>
+          <a:chOff x="0" y="0"/>
+          <a:chExt cx="0" cy="0"/>
+        </a:xfrm>
+      </p:grpSpPr>
+      <p:sp>
+        <p:nvSpPr>
+          <p:cNvPr id="2" name="Slide Image Placeholder 1"/>
+          <p:cNvSpPr>
+            <a:spLocks noGrp="1" noRot="1" noChangeAspect="1"/>
+          </p:cNvSpPr>
+          <p:nvPr>
+            <p:ph type="sldImg"/>
+          </p:nvPr>
+        </p:nvSpPr>
+        <p:spPr/>
+      </p:sp>
+      <p:sp>
+        <p:nvSpPr>
+          <p:cNvPr id="3" name="Notes Placeholder 2"/>
+          <p:cNvSpPr>
+            <a:spLocks noGrp="1"/>
+          </p:cNvSpPr>
+          <p:nvPr>
+            <p:ph type="body" idx="1"/>
+          </p:nvPr>
+        </p:nvSpPr>
+        <p:spPr/>
+        <p:txBody>
+          <a:bodyPr/>
+          <a:lstStyle/>
+          <a:p>
             <a:r>
               <a:rPr lang="en-US" dirty="0"/>
               <a:t>Challenges</a:t>
@@ -885,7 +1084,7 @@
           <a:p>
             <a:fld id="{1F88B8BE-972A-4AD0-BD0D-E769440C7A47}" type="slidenum">
               <a:rPr lang="en-US" smtClean="0"/>
-              <a:t>9</a:t>
+              <a:t>10</a:t>
             </a:fld>
             <a:endParaRPr lang="en-US"/>
           </a:p>
@@ -1162,7 +1361,7 @@
             <a:fld id="{87DE6118-2437-4B30-8E3C-4D2BE6020583}" type="datetimeFigureOut">
               <a:rPr lang="en-US" dirty="0"/>
               <a:pPr/>
-              <a:t>10/17/2020</a:t>
+              <a:t>10/19/2020</a:t>
             </a:fld>
             <a:endParaRPr lang="en-US" dirty="0"/>
           </a:p>
@@ -1488,7 +1687,7 @@
           <a:p>
             <a:fld id="{87DE6118-2437-4B30-8E3C-4D2BE6020583}" type="datetimeFigureOut">
               <a:rPr lang="en-US" dirty="0"/>
-              <a:t>10/17/2020</a:t>
+              <a:t>10/19/2020</a:t>
             </a:fld>
             <a:endParaRPr lang="en-US" dirty="0"/>
           </a:p>
@@ -1663,7 +1862,7 @@
           <a:p>
             <a:fld id="{87DE6118-2437-4B30-8E3C-4D2BE6020583}" type="datetimeFigureOut">
               <a:rPr lang="en-US" dirty="0"/>
-              <a:t>10/17/2020</a:t>
+              <a:t>10/19/2020</a:t>
             </a:fld>
             <a:endParaRPr lang="en-US" dirty="0"/>
           </a:p>
@@ -1828,7 +2027,7 @@
           <a:p>
             <a:fld id="{87DE6118-2437-4B30-8E3C-4D2BE6020583}" type="datetimeFigureOut">
               <a:rPr lang="en-US" dirty="0"/>
-              <a:t>10/17/2020</a:t>
+              <a:t>10/19/2020</a:t>
             </a:fld>
             <a:endParaRPr lang="en-US" dirty="0"/>
           </a:p>
@@ -2101,7 +2300,7 @@
             <a:fld id="{87DE6118-2437-4B30-8E3C-4D2BE6020583}" type="datetimeFigureOut">
               <a:rPr lang="en-US" dirty="0"/>
               <a:pPr/>
-              <a:t>10/17/2020</a:t>
+              <a:t>10/19/2020</a:t>
             </a:fld>
             <a:endParaRPr lang="en-US" dirty="0"/>
           </a:p>
@@ -2491,7 +2690,7 @@
           <a:p>
             <a:fld id="{87DE6118-2437-4B30-8E3C-4D2BE6020583}" type="datetimeFigureOut">
               <a:rPr lang="en-US" dirty="0"/>
-              <a:t>10/17/2020</a:t>
+              <a:t>10/19/2020</a:t>
             </a:fld>
             <a:endParaRPr lang="en-US" dirty="0"/>
           </a:p>
@@ -2963,7 +3162,7 @@
           <a:p>
             <a:fld id="{87DE6118-2437-4B30-8E3C-4D2BE6020583}" type="datetimeFigureOut">
               <a:rPr lang="en-US" dirty="0"/>
-              <a:t>10/17/2020</a:t>
+              <a:t>10/19/2020</a:t>
             </a:fld>
             <a:endParaRPr lang="en-US" dirty="0"/>
           </a:p>
@@ -3076,7 +3275,7 @@
           <a:p>
             <a:fld id="{87DE6118-2437-4B30-8E3C-4D2BE6020583}" type="datetimeFigureOut">
               <a:rPr lang="en-US" dirty="0"/>
-              <a:t>10/17/2020</a:t>
+              <a:t>10/19/2020</a:t>
             </a:fld>
             <a:endParaRPr lang="en-US" dirty="0"/>
           </a:p>
@@ -3166,7 +3365,7 @@
           <a:p>
             <a:fld id="{87DE6118-2437-4B30-8E3C-4D2BE6020583}" type="datetimeFigureOut">
               <a:rPr lang="en-US" dirty="0"/>
-              <a:t>10/17/2020</a:t>
+              <a:t>10/19/2020</a:t>
             </a:fld>
             <a:endParaRPr lang="en-US" dirty="0"/>
           </a:p>
@@ -3508,7 +3707,7 @@
             <a:fld id="{87DE6118-2437-4B30-8E3C-4D2BE6020583}" type="datetimeFigureOut">
               <a:rPr lang="en-US" dirty="0"/>
               <a:pPr/>
-              <a:t>10/17/2020</a:t>
+              <a:t>10/19/2020</a:t>
             </a:fld>
             <a:endParaRPr lang="en-US" dirty="0"/>
           </a:p>
@@ -3893,7 +4092,7 @@
             <a:fld id="{87DE6118-2437-4B30-8E3C-4D2BE6020583}" type="datetimeFigureOut">
               <a:rPr lang="en-US" dirty="0"/>
               <a:pPr/>
-              <a:t>10/17/2020</a:t>
+              <a:t>10/19/2020</a:t>
             </a:fld>
             <a:endParaRPr lang="en-US" dirty="0"/>
           </a:p>
@@ -4168,7 +4367,7 @@
             <a:fld id="{87DE6118-2437-4B30-8E3C-4D2BE6020583}" type="datetimeFigureOut">
               <a:rPr lang="en-US" dirty="0"/>
               <a:pPr/>
-              <a:t>10/17/2020</a:t>
+              <a:t>10/19/2020</a:t>
             </a:fld>
             <a:endParaRPr lang="en-US" dirty="0"/>
           </a:p>
@@ -4801,10 +5000,10 @@
       </p:grpSpPr>
       <p:sp>
         <p:nvSpPr>
-          <p:cNvPr id="4" name="Title 3">
+          <p:cNvPr id="2" name="Title 1">
             <a:extLst>
               <a:ext uri="{FF2B5EF4-FFF2-40B4-BE49-F238E27FC236}">
-                <a16:creationId xmlns:a16="http://schemas.microsoft.com/office/drawing/2014/main" id="{57BA24D8-4846-4CBC-89B0-82F29721185A}"/>
+                <a16:creationId xmlns:a16="http://schemas.microsoft.com/office/drawing/2014/main" id="{6E1DFE7F-8996-4432-B0B9-1278B1C45367}"/>
               </a:ext>
             </a:extLst>
           </p:cNvPr>
@@ -4812,7 +5011,7 @@
             <a:spLocks noGrp="1"/>
           </p:cNvSpPr>
           <p:nvPr>
-            <p:ph type="ctrTitle"/>
+            <p:ph type="title"/>
           </p:nvPr>
         </p:nvSpPr>
         <p:spPr/>
@@ -4822,17 +5021,17 @@
           <a:p>
             <a:r>
               <a:rPr lang="en-US" dirty="0"/>
-              <a:t>appendix</a:t>
-            </a:r>
-          </a:p>
-        </p:txBody>
-      </p:sp>
-      <p:sp>
-        <p:nvSpPr>
-          <p:cNvPr id="5" name="Subtitle 4">
+              <a:t>Key takeaways</a:t>
+            </a:r>
+          </a:p>
+        </p:txBody>
+      </p:sp>
+      <p:sp>
+        <p:nvSpPr>
+          <p:cNvPr id="3" name="Content Placeholder 2">
             <a:extLst>
               <a:ext uri="{FF2B5EF4-FFF2-40B4-BE49-F238E27FC236}">
-                <a16:creationId xmlns:a16="http://schemas.microsoft.com/office/drawing/2014/main" id="{909BEE3E-3CC4-4B3D-B5AF-528107D32272}"/>
+                <a16:creationId xmlns:a16="http://schemas.microsoft.com/office/drawing/2014/main" id="{62650EB6-537B-41B0-BD21-36EDF3512704}"/>
               </a:ext>
             </a:extLst>
           </p:cNvPr>
@@ -4840,22 +5039,132 @@
             <a:spLocks noGrp="1"/>
           </p:cNvSpPr>
           <p:nvPr>
-            <p:ph type="subTitle" idx="1"/>
+            <p:ph idx="1"/>
           </p:nvPr>
         </p:nvSpPr>
         <p:spPr/>
         <p:txBody>
-          <a:bodyPr/>
+          <a:bodyPr>
+            <a:normAutofit fontScale="70000" lnSpcReduction="20000"/>
+          </a:bodyPr>
           <a:lstStyle/>
           <a:p>
-            <a:endParaRPr lang="en-US"/>
+            <a:r>
+              <a:rPr lang="en-US" dirty="0"/>
+              <a:t>Key findings</a:t>
+            </a:r>
+          </a:p>
+          <a:p>
+            <a:pPr lvl="1"/>
+            <a:r>
+              <a:rPr lang="en-US" dirty="0" err="1"/>
+              <a:t>Britebart</a:t>
+            </a:r>
+            <a:r>
+              <a:rPr lang="en-US" dirty="0"/>
+              <a:t>/</a:t>
+            </a:r>
+            <a:r>
+              <a:rPr lang="en-US" dirty="0" err="1"/>
+              <a:t>Aljezera</a:t>
+            </a:r>
+            <a:r>
+              <a:rPr lang="en-US" dirty="0"/>
+              <a:t> seem to use most extreme language</a:t>
+            </a:r>
+          </a:p>
+          <a:p>
+            <a:pPr lvl="2"/>
+            <a:r>
+              <a:rPr lang="en-US" dirty="0"/>
+              <a:t>Seem to be writing for a specific population of readers</a:t>
+            </a:r>
+          </a:p>
+          <a:p>
+            <a:pPr lvl="1"/>
+            <a:r>
+              <a:rPr lang="en-US" dirty="0"/>
+              <a:t>Negative/Positive headlines seem to have different topics with some overlap</a:t>
+            </a:r>
+          </a:p>
+          <a:p>
+            <a:pPr lvl="2"/>
+            <a:r>
+              <a:rPr lang="en-US" dirty="0"/>
+              <a:t>Topics seem to change over time based on current events</a:t>
+            </a:r>
+          </a:p>
+          <a:p>
+            <a:r>
+              <a:rPr lang="en-US" dirty="0"/>
+              <a:t>Challenges</a:t>
+            </a:r>
+          </a:p>
+          <a:p>
+            <a:pPr lvl="1"/>
+            <a:r>
+              <a:rPr lang="en-US" dirty="0"/>
+              <a:t>Sentiment scoring is not customized – NLTK Vader was trained on social media</a:t>
+            </a:r>
+          </a:p>
+          <a:p>
+            <a:pPr lvl="1"/>
+            <a:r>
+              <a:rPr lang="en-US" dirty="0" err="1"/>
+              <a:t>NewsAPI</a:t>
+            </a:r>
+            <a:r>
+              <a:rPr lang="en-US" dirty="0"/>
+              <a:t> limits access to sources</a:t>
+            </a:r>
+          </a:p>
+          <a:p>
+            <a:r>
+              <a:rPr lang="en-US" dirty="0"/>
+              <a:t>Additional questions to be asked if had more time/resources</a:t>
+            </a:r>
+          </a:p>
+          <a:p>
+            <a:pPr lvl="1"/>
+            <a:r>
+              <a:rPr lang="en-US" dirty="0"/>
+              <a:t>Emotional analysis – what’s behind the extremity of the language used</a:t>
+            </a:r>
+          </a:p>
+          <a:p>
+            <a:pPr lvl="1"/>
+            <a:r>
+              <a:rPr lang="en-US" dirty="0"/>
+              <a:t>Look at body of the articles instead of headline</a:t>
+            </a:r>
+          </a:p>
+          <a:p>
+            <a:pPr lvl="1"/>
+            <a:r>
+              <a:rPr lang="en-US" dirty="0"/>
+              <a:t>Looking more into differences in publishers and authors</a:t>
+            </a:r>
+          </a:p>
+          <a:p>
+            <a:pPr lvl="1"/>
+            <a:r>
+              <a:rPr lang="en-US" dirty="0"/>
+              <a:t>Customizing the sentiment analysis</a:t>
+            </a:r>
+          </a:p>
+          <a:p>
+            <a:pPr lvl="1"/>
+            <a:r>
+              <a:rPr lang="en-US" dirty="0"/>
+              <a:t>Add to dataset monthly to observe impact of current events</a:t>
+            </a:r>
           </a:p>
         </p:txBody>
       </p:sp>
     </p:spTree>
     <p:extLst>
       <p:ext uri="{BB962C8B-B14F-4D97-AF65-F5344CB8AC3E}">
-        <p14:creationId xmlns:p14="http://schemas.microsoft.com/office/powerpoint/2010/main" val="2873799757"/>
+        <p14:creationId xmlns:p14="http://schemas.microsoft.com/office/powerpoint/2010/main" val="1865033548"/>
       </p:ext>
     </p:extLst>
   </p:cSld>
@@ -4884,10 +5193,10 @@
       </p:grpSpPr>
       <p:sp>
         <p:nvSpPr>
-          <p:cNvPr id="2" name="Title 1">
+          <p:cNvPr id="4" name="Title 3">
             <a:extLst>
               <a:ext uri="{FF2B5EF4-FFF2-40B4-BE49-F238E27FC236}">
-                <a16:creationId xmlns:a16="http://schemas.microsoft.com/office/drawing/2014/main" id="{6E1DFE7F-8996-4432-B0B9-1278B1C45367}"/>
+                <a16:creationId xmlns:a16="http://schemas.microsoft.com/office/drawing/2014/main" id="{57BA24D8-4846-4CBC-89B0-82F29721185A}"/>
               </a:ext>
             </a:extLst>
           </p:cNvPr>
@@ -4895,7 +5204,7 @@
             <a:spLocks noGrp="1"/>
           </p:cNvSpPr>
           <p:nvPr>
-            <p:ph type="title"/>
+            <p:ph type="ctrTitle"/>
           </p:nvPr>
         </p:nvSpPr>
         <p:spPr/>
@@ -4905,17 +5214,17 @@
           <a:p>
             <a:r>
               <a:rPr lang="en-US" dirty="0"/>
-              <a:t>References </a:t>
-            </a:r>
-          </a:p>
-        </p:txBody>
-      </p:sp>
-      <p:sp>
-        <p:nvSpPr>
-          <p:cNvPr id="7" name="Content Placeholder 6">
+              <a:t>appendix</a:t>
+            </a:r>
+          </a:p>
+        </p:txBody>
+      </p:sp>
+      <p:sp>
+        <p:nvSpPr>
+          <p:cNvPr id="5" name="Subtitle 4">
             <a:extLst>
               <a:ext uri="{FF2B5EF4-FFF2-40B4-BE49-F238E27FC236}">
-                <a16:creationId xmlns:a16="http://schemas.microsoft.com/office/drawing/2014/main" id="{3C8A78CA-CB3A-4F5A-8CC6-03FD0D5CEADB}"/>
+                <a16:creationId xmlns:a16="http://schemas.microsoft.com/office/drawing/2014/main" id="{909BEE3E-3CC4-4B3D-B5AF-528107D32272}"/>
               </a:ext>
             </a:extLst>
           </p:cNvPr>
@@ -4923,7 +5232,7 @@
             <a:spLocks noGrp="1"/>
           </p:cNvSpPr>
           <p:nvPr>
-            <p:ph idx="1"/>
+            <p:ph type="subTitle" idx="1"/>
           </p:nvPr>
         </p:nvSpPr>
         <p:spPr/>
@@ -4931,14 +5240,14 @@
           <a:bodyPr/>
           <a:lstStyle/>
           <a:p>
-            <a:endParaRPr lang="en-US" dirty="0"/>
+            <a:endParaRPr lang="en-US"/>
           </a:p>
         </p:txBody>
       </p:sp>
     </p:spTree>
     <p:extLst>
       <p:ext uri="{BB962C8B-B14F-4D97-AF65-F5344CB8AC3E}">
-        <p14:creationId xmlns:p14="http://schemas.microsoft.com/office/powerpoint/2010/main" val="1768583760"/>
+        <p14:creationId xmlns:p14="http://schemas.microsoft.com/office/powerpoint/2010/main" val="2873799757"/>
       </p:ext>
     </p:extLst>
   </p:cSld>
@@ -4988,7 +5297,7 @@
           <a:p>
             <a:r>
               <a:rPr lang="en-US" dirty="0"/>
-              <a:t>Interesting things found along the way</a:t>
+              <a:t>References </a:t>
             </a:r>
           </a:p>
         </p:txBody>
@@ -5016,8 +5325,136 @@
           <a:p>
             <a:r>
               <a:rPr lang="en-US" dirty="0"/>
+              <a:t>News headlines in English published in the US</a:t>
+            </a:r>
+          </a:p>
+          <a:p>
+            <a:r>
+              <a:rPr lang="en-US" dirty="0" err="1"/>
+              <a:t>NewsAPI</a:t>
+            </a:r>
+            <a:r>
+              <a:rPr lang="en-US" dirty="0"/>
+              <a:t> - author, title, domain, </a:t>
+            </a:r>
+            <a:r>
+              <a:rPr lang="en-US" dirty="0" err="1"/>
+              <a:t>url</a:t>
+            </a:r>
+            <a:r>
+              <a:rPr lang="en-US" dirty="0"/>
+              <a:t>, headline, first 200 words</a:t>
+            </a:r>
+            <a:br>
+              <a:rPr lang="en-US" dirty="0"/>
+            </a:br>
+            <a:r>
+              <a:rPr lang="en-US" dirty="0"/>
+              <a:t>https://newsapi.org/ </a:t>
+            </a:r>
+          </a:p>
+          <a:p>
+            <a:r>
+              <a:rPr lang="en-US" dirty="0"/>
+              <a:t>Conservative/Liberal Bias of </a:t>
+            </a:r>
+            <a:r>
+              <a:rPr lang="en-US" dirty="0" err="1"/>
+              <a:t>NewsPapers</a:t>
+            </a:r>
+            <a:r>
+              <a:rPr lang="en-US" dirty="0"/>
+              <a:t> https://www.journalism.org/2014/10/21/political-polarization-media-habits/ </a:t>
+            </a:r>
+          </a:p>
+        </p:txBody>
+      </p:sp>
+    </p:spTree>
+    <p:extLst>
+      <p:ext uri="{BB962C8B-B14F-4D97-AF65-F5344CB8AC3E}">
+        <p14:creationId xmlns:p14="http://schemas.microsoft.com/office/powerpoint/2010/main" val="1768583760"/>
+      </p:ext>
+    </p:extLst>
+  </p:cSld>
+  <p:clrMapOvr>
+    <a:masterClrMapping/>
+  </p:clrMapOvr>
+</p:sld>
+</file>
+
+<file path=ppt/slides/slide13.xml><?xml version="1.0" encoding="utf-8"?>
+<p:sld xmlns:a="http://schemas.openxmlformats.org/drawingml/2006/main" xmlns:r="http://schemas.openxmlformats.org/officeDocument/2006/relationships" xmlns:p="http://schemas.openxmlformats.org/presentationml/2006/main">
+  <p:cSld>
+    <p:spTree>
+      <p:nvGrpSpPr>
+        <p:cNvPr id="1" name=""/>
+        <p:cNvGrpSpPr/>
+        <p:nvPr/>
+      </p:nvGrpSpPr>
+      <p:grpSpPr>
+        <a:xfrm>
+          <a:off x="0" y="0"/>
+          <a:ext cx="0" cy="0"/>
+          <a:chOff x="0" y="0"/>
+          <a:chExt cx="0" cy="0"/>
+        </a:xfrm>
+      </p:grpSpPr>
+      <p:sp>
+        <p:nvSpPr>
+          <p:cNvPr id="2" name="Title 1">
+            <a:extLst>
+              <a:ext uri="{FF2B5EF4-FFF2-40B4-BE49-F238E27FC236}">
+                <a16:creationId xmlns:a16="http://schemas.microsoft.com/office/drawing/2014/main" id="{6E1DFE7F-8996-4432-B0B9-1278B1C45367}"/>
+              </a:ext>
+            </a:extLst>
+          </p:cNvPr>
+          <p:cNvSpPr>
+            <a:spLocks noGrp="1"/>
+          </p:cNvSpPr>
+          <p:nvPr>
+            <p:ph type="title"/>
+          </p:nvPr>
+        </p:nvSpPr>
+        <p:spPr/>
+        <p:txBody>
+          <a:bodyPr/>
+          <a:lstStyle/>
+          <a:p>
+            <a:r>
+              <a:rPr lang="en-US" dirty="0"/>
+              <a:t>Interesting things found along the way</a:t>
+            </a:r>
+          </a:p>
+        </p:txBody>
+      </p:sp>
+      <p:sp>
+        <p:nvSpPr>
+          <p:cNvPr id="7" name="Content Placeholder 6">
+            <a:extLst>
+              <a:ext uri="{FF2B5EF4-FFF2-40B4-BE49-F238E27FC236}">
+                <a16:creationId xmlns:a16="http://schemas.microsoft.com/office/drawing/2014/main" id="{3C8A78CA-CB3A-4F5A-8CC6-03FD0D5CEADB}"/>
+              </a:ext>
+            </a:extLst>
+          </p:cNvPr>
+          <p:cNvSpPr>
+            <a:spLocks noGrp="1"/>
+          </p:cNvSpPr>
+          <p:nvPr>
+            <p:ph idx="1"/>
+          </p:nvPr>
+        </p:nvSpPr>
+        <p:spPr/>
+        <p:txBody>
+          <a:bodyPr/>
+          <a:lstStyle/>
+          <a:p>
+            <a:r>
+              <a:rPr lang="en-US" dirty="0">
+                <a:hlinkClick r:id="rId2"/>
+              </a:rPr>
               <a:t>Check out the repository here</a:t>
             </a:r>
+            <a:endParaRPr lang="en-US" dirty="0"/>
           </a:p>
         </p:txBody>
       </p:sp>
@@ -5098,7 +5535,7 @@
         <p:spPr/>
         <p:txBody>
           <a:bodyPr>
-            <a:normAutofit lnSpcReduction="10000"/>
+            <a:normAutofit/>
           </a:bodyPr>
           <a:lstStyle/>
           <a:p>
@@ -5119,7 +5556,7 @@
                 <a:effectLst/>
                 <a:latin typeface="Arial" panose="020B0604020202020204" pitchFamily="34" charset="0"/>
               </a:rPr>
-              <a:t>In this project we created a database of newspaper headlines across 9 different sources using News API and evaluated the </a:t>
+              <a:t>Evaluate the emotional strength of US news headlines in English by creating a database of </a:t>
             </a:r>
             <a:r>
               <a:rPr lang="en-US" sz="1800" dirty="0">
@@ -5128,7 +5565,7 @@
                 </a:solidFill>
                 <a:latin typeface="Arial" panose="020B0604020202020204" pitchFamily="34" charset="0"/>
               </a:rPr>
-              <a:t>emotional strength of the headlines </a:t>
+              <a:t>them </a:t>
             </a:r>
             <a:r>
               <a:rPr lang="en-US" sz="1800" b="0" i="0" u="none" strike="noStrike" dirty="0">
@@ -5138,17 +5575,16 @@
                 <a:effectLst/>
                 <a:latin typeface="Arial" panose="020B0604020202020204" pitchFamily="34" charset="0"/>
               </a:rPr>
-              <a:t>using NLTK’s Vader to determine their sentiment related to specific keywords. We will be looking at how different newspapers on the left/right bias spectrum represent immigrants</a:t>
-            </a:r>
-            <a:r>
-              <a:rPr lang="en-US" sz="1800" b="1" i="0" u="none" strike="noStrike" dirty="0">
+              <a:t>and use artificial intelligence (Vader by NLTK) to determine positive/negative sentiment</a:t>
+            </a:r>
+            <a:r>
+              <a:rPr lang="en-US" sz="1800" dirty="0">
                 <a:solidFill>
                   <a:srgbClr val="000000"/>
                 </a:solidFill>
-                <a:effectLst/>
                 <a:latin typeface="Arial" panose="020B0604020202020204" pitchFamily="34" charset="0"/>
               </a:rPr>
-              <a:t>. (slim down)</a:t>
+              <a:t> of headlines relating to immigration.</a:t>
             </a:r>
           </a:p>
           <a:p>
@@ -5161,37 +5597,13 @@
               </a:spcAft>
               <a:buNone/>
             </a:pPr>
-            <a:r>
-              <a:rPr lang="en-US" sz="1800" b="1" i="0" u="none" strike="noStrike" dirty="0">
-                <a:solidFill>
-                  <a:srgbClr val="000000"/>
-                </a:solidFill>
-                <a:effectLst/>
-                <a:latin typeface="Arial" panose="020B0604020202020204" pitchFamily="34" charset="0"/>
-              </a:rPr>
-              <a:t>Time frame, dates</a:t>
-            </a:r>
-          </a:p>
-          <a:p>
-            <a:pPr marL="0" indent="0" rtl="0">
-              <a:spcBef>
-                <a:spcPts val="1200"/>
-              </a:spcBef>
-              <a:spcAft>
-                <a:spcPts val="1200"/>
-              </a:spcAft>
-              <a:buNone/>
-            </a:pPr>
-            <a:r>
-              <a:rPr lang="en-US" sz="1800" b="0" i="0" u="none" strike="noStrike" dirty="0">
-                <a:solidFill>
-                  <a:srgbClr val="000000"/>
-                </a:solidFill>
-                <a:effectLst/>
-                <a:latin typeface="Arial" panose="020B0604020202020204" pitchFamily="34" charset="0"/>
-              </a:rPr>
-              <a:t>What is sentiment analysis: Emotion conveyed through text</a:t>
-            </a:r>
+            <a:endParaRPr lang="en-US" sz="1800" b="0" i="0" u="none" strike="noStrike" dirty="0">
+              <a:solidFill>
+                <a:srgbClr val="000000"/>
+              </a:solidFill>
+              <a:effectLst/>
+              <a:latin typeface="Arial" panose="020B0604020202020204" pitchFamily="34" charset="0"/>
+            </a:endParaRPr>
           </a:p>
           <a:p>
             <a:pPr marL="0" indent="0" rtl="0">
@@ -5343,7 +5755,7 @@
         <p:spPr/>
         <p:txBody>
           <a:bodyPr>
-            <a:normAutofit lnSpcReduction="10000"/>
+            <a:normAutofit/>
           </a:bodyPr>
           <a:lstStyle/>
           <a:p>
@@ -5440,8 +5852,8 @@
               </a:spcAft>
             </a:pPr>
             <a:r>
-              <a:rPr lang="en-US" strike="sngStrike" dirty="0"/>
-              <a:t>Create numerical representation of conservative vs. liberal news sources</a:t>
+              <a:rPr lang="en-US" dirty="0"/>
+              <a:t>Perform sentiment analysis using NLTK’s Vader</a:t>
             </a:r>
           </a:p>
           <a:p>
@@ -5455,7 +5867,7 @@
             </a:pPr>
             <a:r>
               <a:rPr lang="en-US" dirty="0"/>
-              <a:t>Perform sentiment analysis using NLTK’s Vader</a:t>
+              <a:t>Determine bins for negative/neutral/positive ratings</a:t>
             </a:r>
           </a:p>
           <a:p>
@@ -5469,46 +5881,7 @@
             </a:pPr>
             <a:r>
               <a:rPr lang="en-US" dirty="0"/>
-              <a:t>Determined bins for negative/neutral/positive ratings</a:t>
-            </a:r>
-          </a:p>
-          <a:p>
-            <a:pPr>
-              <a:spcBef>
-                <a:spcPts val="0"/>
-              </a:spcBef>
-              <a:spcAft>
-                <a:spcPts val="0"/>
-              </a:spcAft>
-            </a:pPr>
-            <a:r>
-              <a:rPr lang="en-US" dirty="0"/>
-              <a:t>Performed keyword analysis</a:t>
-            </a:r>
-          </a:p>
-          <a:p>
-            <a:pPr>
-              <a:spcBef>
-                <a:spcPts val="0"/>
-              </a:spcBef>
-              <a:spcAft>
-                <a:spcPts val="0"/>
-              </a:spcAft>
-            </a:pPr>
-            <a:endParaRPr lang="en-US" dirty="0"/>
-          </a:p>
-          <a:p>
-            <a:pPr>
-              <a:spcBef>
-                <a:spcPts val="0"/>
-              </a:spcBef>
-              <a:spcAft>
-                <a:spcPts val="0"/>
-              </a:spcAft>
-            </a:pPr>
-            <a:r>
-              <a:rPr lang="en-US" dirty="0"/>
-              <a:t>TENSE</a:t>
+              <a:t>Perform keyword analysis</a:t>
             </a:r>
           </a:p>
         </p:txBody>
@@ -5571,12 +5944,67 @@
           </a:p>
         </p:txBody>
       </p:sp>
+      <p:sp>
+        <p:nvSpPr>
+          <p:cNvPr id="5" name="TextBox 4">
+            <a:extLst>
+              <a:ext uri="{FF2B5EF4-FFF2-40B4-BE49-F238E27FC236}">
+                <a16:creationId xmlns:a16="http://schemas.microsoft.com/office/drawing/2014/main" id="{370E6952-E282-41C7-831B-5C48CF7D1B3D}"/>
+              </a:ext>
+            </a:extLst>
+          </p:cNvPr>
+          <p:cNvSpPr txBox="1"/>
+          <p:nvPr/>
+        </p:nvSpPr>
+        <p:spPr>
+          <a:xfrm>
+            <a:off x="7812741" y="1869141"/>
+            <a:ext cx="3470950" cy="923330"/>
+          </a:xfrm>
+          <a:prstGeom prst="rect">
+            <a:avLst/>
+          </a:prstGeom>
+          <a:noFill/>
+        </p:spPr>
+        <p:txBody>
+          <a:bodyPr wrap="none" rtlCol="0">
+            <a:spAutoFit/>
+          </a:bodyPr>
+          <a:lstStyle/>
+          <a:p>
+            <a:r>
+              <a:rPr lang="en-US" dirty="0"/>
+              <a:t>Describe data set</a:t>
+            </a:r>
+          </a:p>
+          <a:p>
+            <a:pPr marL="285750" indent="-285750">
+              <a:buFont typeface="Arial" panose="020B0604020202020204" pitchFamily="34" charset="0"/>
+              <a:buChar char="•"/>
+            </a:pPr>
+            <a:r>
+              <a:rPr lang="en-US" dirty="0"/>
+              <a:t>Total number of data points</a:t>
+            </a:r>
+          </a:p>
+          <a:p>
+            <a:pPr marL="285750" indent="-285750">
+              <a:buFont typeface="Arial" panose="020B0604020202020204" pitchFamily="34" charset="0"/>
+              <a:buChar char="•"/>
+            </a:pPr>
+            <a:r>
+              <a:rPr lang="en-US" dirty="0"/>
+              <a:t>How we chose these 9 sources</a:t>
+            </a:r>
+          </a:p>
+        </p:txBody>
+      </p:sp>
       <p:pic>
         <p:nvPicPr>
-          <p:cNvPr id="4" name="Content Placeholder 4">
+          <p:cNvPr id="6" name="Picture 5">
             <a:extLst>
               <a:ext uri="{FF2B5EF4-FFF2-40B4-BE49-F238E27FC236}">
-                <a16:creationId xmlns:a16="http://schemas.microsoft.com/office/drawing/2014/main" id="{8D81DDF3-5428-4900-A029-39FCFDC225BE}"/>
+                <a16:creationId xmlns:a16="http://schemas.microsoft.com/office/drawing/2014/main" id="{BA6090D4-4145-447A-BA86-D093EFF5645F}"/>
               </a:ext>
             </a:extLst>
           </p:cNvPr>
@@ -5593,61 +6021,14 @@
         </p:blipFill>
         <p:spPr>
           <a:xfrm>
-            <a:off x="1371600" y="2171700"/>
-            <a:ext cx="5372100" cy="3581400"/>
+            <a:off x="869949" y="1428750"/>
+            <a:ext cx="5929313" cy="4743450"/>
           </a:xfrm>
           <a:prstGeom prst="rect">
             <a:avLst/>
           </a:prstGeom>
         </p:spPr>
       </p:pic>
-      <p:sp>
-        <p:nvSpPr>
-          <p:cNvPr id="5" name="TextBox 4">
-            <a:extLst>
-              <a:ext uri="{FF2B5EF4-FFF2-40B4-BE49-F238E27FC236}">
-                <a16:creationId xmlns:a16="http://schemas.microsoft.com/office/drawing/2014/main" id="{370E6952-E282-41C7-831B-5C48CF7D1B3D}"/>
-              </a:ext>
-            </a:extLst>
-          </p:cNvPr>
-          <p:cNvSpPr txBox="1"/>
-          <p:nvPr/>
-        </p:nvSpPr>
-        <p:spPr>
-          <a:xfrm>
-            <a:off x="7812741" y="1869141"/>
-            <a:ext cx="2749920" cy="923330"/>
-          </a:xfrm>
-          <a:prstGeom prst="rect">
-            <a:avLst/>
-          </a:prstGeom>
-          <a:noFill/>
-        </p:spPr>
-        <p:txBody>
-          <a:bodyPr wrap="none" rtlCol="0">
-            <a:spAutoFit/>
-          </a:bodyPr>
-          <a:lstStyle/>
-          <a:p>
-            <a:r>
-              <a:rPr lang="en-US" dirty="0"/>
-              <a:t>Describe data set</a:t>
-            </a:r>
-          </a:p>
-          <a:p>
-            <a:r>
-              <a:rPr lang="en-US" dirty="0"/>
-              <a:t>Need to fix titles in image</a:t>
-            </a:r>
-          </a:p>
-          <a:p>
-            <a:r>
-              <a:rPr lang="en-US" dirty="0"/>
-              <a:t>Need summary stats table</a:t>
-            </a:r>
-          </a:p>
-        </p:txBody>
-      </p:sp>
     </p:spTree>
     <p:extLst>
       <p:ext uri="{BB962C8B-B14F-4D97-AF65-F5344CB8AC3E}">
@@ -5706,12 +6087,75 @@
           </a:p>
         </p:txBody>
       </p:sp>
+      <p:sp>
+        <p:nvSpPr>
+          <p:cNvPr id="10" name="TextBox 9">
+            <a:extLst>
+              <a:ext uri="{FF2B5EF4-FFF2-40B4-BE49-F238E27FC236}">
+                <a16:creationId xmlns:a16="http://schemas.microsoft.com/office/drawing/2014/main" id="{6480B22D-BF79-4E73-A67E-724DDD59837C}"/>
+              </a:ext>
+            </a:extLst>
+          </p:cNvPr>
+          <p:cNvSpPr txBox="1"/>
+          <p:nvPr/>
+        </p:nvSpPr>
+        <p:spPr>
+          <a:xfrm>
+            <a:off x="1098577" y="3047414"/>
+            <a:ext cx="5657823" cy="923330"/>
+          </a:xfrm>
+          <a:prstGeom prst="rect">
+            <a:avLst/>
+          </a:prstGeom>
+          <a:noFill/>
+        </p:spPr>
+        <p:txBody>
+          <a:bodyPr wrap="square" rtlCol="0">
+            <a:spAutoFit/>
+          </a:bodyPr>
+          <a:lstStyle/>
+          <a:p>
+            <a:r>
+              <a:rPr lang="en-US" dirty="0"/>
+              <a:t>Descriptive stats</a:t>
+            </a:r>
+          </a:p>
+          <a:p>
+            <a:pPr marL="285750" indent="-285750">
+              <a:buFont typeface="Arial" panose="020B0604020202020204" pitchFamily="34" charset="0"/>
+              <a:buChar char="•"/>
+            </a:pPr>
+            <a:r>
+              <a:rPr lang="en-US" dirty="0"/>
+              <a:t>Box plot explanation</a:t>
+            </a:r>
+          </a:p>
+          <a:p>
+            <a:pPr marL="285750" indent="-285750">
+              <a:buFont typeface="Arial" panose="020B0604020202020204" pitchFamily="34" charset="0"/>
+              <a:buChar char="•"/>
+            </a:pPr>
+            <a:r>
+              <a:rPr lang="en-US" dirty="0"/>
+              <a:t>Something interesting to draw </a:t>
+            </a:r>
+            <a:r>
+              <a:rPr lang="en-US" dirty="0" err="1"/>
+              <a:t>ppls</a:t>
+            </a:r>
+            <a:r>
+              <a:rPr lang="en-US" dirty="0"/>
+              <a:t> attention to</a:t>
+            </a:r>
+          </a:p>
+        </p:txBody>
+      </p:sp>
       <p:pic>
         <p:nvPicPr>
-          <p:cNvPr id="8" name="Content Placeholder 4">
+          <p:cNvPr id="4" name="Picture 3">
             <a:extLst>
               <a:ext uri="{FF2B5EF4-FFF2-40B4-BE49-F238E27FC236}">
-                <a16:creationId xmlns:a16="http://schemas.microsoft.com/office/drawing/2014/main" id="{BDF77434-7F9A-47B8-AD14-F7FF046BF989}"/>
+                <a16:creationId xmlns:a16="http://schemas.microsoft.com/office/drawing/2014/main" id="{9EDB3912-8BBA-49A4-809D-540549579B93}"/>
               </a:ext>
             </a:extLst>
           </p:cNvPr>
@@ -5728,8 +6172,8 @@
         </p:blipFill>
         <p:spPr>
           <a:xfrm>
-            <a:off x="1219200" y="2044252"/>
-            <a:ext cx="3581400" cy="3581400"/>
+            <a:off x="7414776" y="717296"/>
+            <a:ext cx="4116823" cy="5763552"/>
           </a:xfrm>
           <a:prstGeom prst="rect">
             <a:avLst/>
@@ -5738,10 +6182,10 @@
       </p:pic>
       <p:sp>
         <p:nvSpPr>
-          <p:cNvPr id="10" name="TextBox 9">
+          <p:cNvPr id="9" name="TextBox 8">
             <a:extLst>
               <a:ext uri="{FF2B5EF4-FFF2-40B4-BE49-F238E27FC236}">
-                <a16:creationId xmlns:a16="http://schemas.microsoft.com/office/drawing/2014/main" id="{6480B22D-BF79-4E73-A67E-724DDD59837C}"/>
+                <a16:creationId xmlns:a16="http://schemas.microsoft.com/office/drawing/2014/main" id="{CE94EE6F-E003-4641-8616-2FF2288DC129}"/>
               </a:ext>
             </a:extLst>
           </p:cNvPr>
@@ -5750,8 +6194,8 @@
         </p:nvSpPr>
         <p:spPr>
           <a:xfrm>
-            <a:off x="7812741" y="1869141"/>
-            <a:ext cx="2792431" cy="646331"/>
+            <a:off x="1098577" y="1848534"/>
+            <a:ext cx="6096000" cy="646331"/>
           </a:xfrm>
           <a:prstGeom prst="rect">
             <a:avLst/>
@@ -5759,20 +6203,29 @@
           <a:noFill/>
         </p:spPr>
         <p:txBody>
-          <a:bodyPr wrap="none" rtlCol="0">
+          <a:bodyPr wrap="square">
             <a:spAutoFit/>
           </a:bodyPr>
           <a:lstStyle/>
           <a:p>
-            <a:r>
-              <a:rPr lang="en-US" dirty="0"/>
-              <a:t>Descriptive stats</a:t>
-            </a:r>
-          </a:p>
-          <a:p>
-            <a:r>
-              <a:rPr lang="en-US" dirty="0"/>
-              <a:t>“Ugly” table from notebook</a:t>
+            <a:pPr marL="0" indent="0" rtl="0">
+              <a:spcBef>
+                <a:spcPts val="1200"/>
+              </a:spcBef>
+              <a:spcAft>
+                <a:spcPts val="1200"/>
+              </a:spcAft>
+              <a:buNone/>
+            </a:pPr>
+            <a:r>
+              <a:rPr lang="en-US" sz="1800" b="0" i="0" u="none" strike="noStrike" dirty="0">
+                <a:solidFill>
+                  <a:srgbClr val="000000"/>
+                </a:solidFill>
+                <a:effectLst/>
+                <a:latin typeface="Arial" panose="020B0604020202020204" pitchFamily="34" charset="0"/>
+              </a:rPr>
+              <a:t>What is sentiment analysis? Emotion conveyed through text</a:t>
             </a:r>
           </a:p>
         </p:txBody>
@@ -5835,35 +6288,6 @@
           </a:p>
         </p:txBody>
       </p:sp>
-      <p:pic>
-        <p:nvPicPr>
-          <p:cNvPr id="5" name="Content Placeholder 4">
-            <a:extLst>
-              <a:ext uri="{FF2B5EF4-FFF2-40B4-BE49-F238E27FC236}">
-                <a16:creationId xmlns:a16="http://schemas.microsoft.com/office/drawing/2014/main" id="{20995F38-0608-4CB0-8367-DC705EB68F82}"/>
-              </a:ext>
-            </a:extLst>
-          </p:cNvPr>
-          <p:cNvPicPr>
-            <a:picLocks noGrp="1" noChangeAspect="1"/>
-          </p:cNvPicPr>
-          <p:nvPr>
-            <p:ph idx="1"/>
-          </p:nvPr>
-        </p:nvPicPr>
-        <p:blipFill>
-          <a:blip r:embed="rId2"/>
-          <a:stretch>
-            <a:fillRect/>
-          </a:stretch>
-        </p:blipFill>
-        <p:spPr>
-          <a:xfrm>
-            <a:off x="1950384" y="1909483"/>
-            <a:ext cx="4476750" cy="3581400"/>
-          </a:xfrm>
-        </p:spPr>
-      </p:pic>
       <p:sp>
         <p:nvSpPr>
           <p:cNvPr id="7" name="TextBox 6">
@@ -5878,8 +6302,8 @@
         </p:nvSpPr>
         <p:spPr>
           <a:xfrm>
-            <a:off x="1139639" y="5867400"/>
-            <a:ext cx="6098240" cy="830997"/>
+            <a:off x="727468" y="5965582"/>
+            <a:ext cx="5428130" cy="461665"/>
           </a:xfrm>
           <a:prstGeom prst="rect">
             <a:avLst/>
@@ -5916,45 +6340,17 @@
             </a:pPr>
             <a:r>
               <a:rPr lang="en-US" sz="1200" dirty="0"/>
-              <a:t>-1.0 to -0.2 = negative</a:t>
-            </a:r>
-          </a:p>
-          <a:p>
-            <a:pPr lvl="1">
-              <a:spcBef>
-                <a:spcPts val="0"/>
-              </a:spcBef>
-              <a:spcAft>
-                <a:spcPts val="0"/>
-              </a:spcAft>
-            </a:pPr>
-            <a:r>
-              <a:rPr lang="en-US" sz="1200" dirty="0"/>
-              <a:t>-0.2 to 0.2 = neutral</a:t>
-            </a:r>
-          </a:p>
-          <a:p>
-            <a:pPr lvl="1">
-              <a:spcBef>
-                <a:spcPts val="0"/>
-              </a:spcBef>
-              <a:spcAft>
-                <a:spcPts val="0"/>
-              </a:spcAft>
-            </a:pPr>
-            <a:r>
-              <a:rPr lang="en-US" sz="1200" dirty="0"/>
-              <a:t>0.2 - 1 = positive</a:t>
-            </a:r>
-          </a:p>
-        </p:txBody>
-      </p:sp>
-      <p:sp>
-        <p:nvSpPr>
-          <p:cNvPr id="8" name="TextBox 7">
+              <a:t>-1.0 to -0.2 = negative	-0.2 to 0.2 = neutral		0.2 - 1 = positive</a:t>
+            </a:r>
+          </a:p>
+        </p:txBody>
+      </p:sp>
+      <p:sp>
+        <p:nvSpPr>
+          <p:cNvPr id="11" name="TextBox 10">
             <a:extLst>
               <a:ext uri="{FF2B5EF4-FFF2-40B4-BE49-F238E27FC236}">
-                <a16:creationId xmlns:a16="http://schemas.microsoft.com/office/drawing/2014/main" id="{C65C89DD-619F-4E2E-A3DA-75FBD1FCE033}"/>
+                <a16:creationId xmlns:a16="http://schemas.microsoft.com/office/drawing/2014/main" id="{FC6BB090-E3E7-428E-A2BC-36AE8BBDDCF4}"/>
               </a:ext>
             </a:extLst>
           </p:cNvPr>
@@ -5963,8 +6359,8 @@
         </p:nvSpPr>
         <p:spPr>
           <a:xfrm>
-            <a:off x="6763870" y="1909483"/>
-            <a:ext cx="5671040" cy="1200329"/>
+            <a:off x="6683470" y="1428750"/>
+            <a:ext cx="5051330" cy="1477328"/>
           </a:xfrm>
           <a:prstGeom prst="rect">
             <a:avLst/>
@@ -5972,33 +6368,216 @@
           <a:noFill/>
         </p:spPr>
         <p:txBody>
-          <a:bodyPr wrap="none" rtlCol="0">
+          <a:bodyPr wrap="square">
             <a:spAutoFit/>
           </a:bodyPr>
           <a:lstStyle/>
           <a:p>
             <a:r>
               <a:rPr lang="en-US" dirty="0"/>
-              <a:t>Count of positive/negative/neutral per news source</a:t>
-            </a:r>
-          </a:p>
-          <a:p>
-            <a:r>
-              <a:rPr lang="en-US" dirty="0"/>
-              <a:t>Need to determine talking points: </a:t>
-            </a:r>
-          </a:p>
-          <a:p>
-            <a:r>
-              <a:rPr lang="en-US" dirty="0"/>
-              <a:t>Could be extreme language, could be extreme view point</a:t>
-            </a:r>
-          </a:p>
-          <a:p>
-            <a:r>
-              <a:rPr lang="en-US" dirty="0"/>
-              <a:t>Example of positive/negative title</a:t>
-            </a:r>
+              <a:t>Example headlines</a:t>
+            </a:r>
+          </a:p>
+          <a:p>
+            <a:r>
+              <a:rPr lang="en-US" sz="1200" i="1" dirty="0"/>
+              <a:t>Nigerian Pleads Guilty to Murdering Mackenzie </a:t>
+            </a:r>
+            <a:r>
+              <a:rPr lang="en-US" sz="1200" i="1" dirty="0" err="1"/>
+              <a:t>Lueck</a:t>
+            </a:r>
+            <a:r>
+              <a:rPr lang="en-US" sz="1200" i="1" dirty="0"/>
+              <a:t>, Avoids Death Penalty</a:t>
+            </a:r>
+          </a:p>
+          <a:p>
+            <a:pPr marL="171450" indent="-171450">
+              <a:buFont typeface="Arial" panose="020B0604020202020204" pitchFamily="34" charset="0"/>
+              <a:buChar char="•"/>
+            </a:pPr>
+            <a:r>
+              <a:rPr lang="en-US" sz="1200" i="1" dirty="0"/>
+              <a:t>Score: -.94 (negative emotion), Published by Breitbart</a:t>
+            </a:r>
+          </a:p>
+          <a:p>
+            <a:pPr marL="171450" indent="-171450">
+              <a:buFont typeface="Arial" panose="020B0604020202020204" pitchFamily="34" charset="0"/>
+              <a:buChar char="•"/>
+            </a:pPr>
+            <a:endParaRPr lang="en-US" sz="1200" i="1" dirty="0"/>
+          </a:p>
+          <a:p>
+            <a:r>
+              <a:rPr lang="en-US" sz="1200" b="0" i="0" u="none" strike="noStrike" dirty="0">
+                <a:solidFill>
+                  <a:srgbClr val="000000"/>
+                </a:solidFill>
+                <a:effectLst/>
+                <a:latin typeface="Calibri" panose="020F0502020204030204" pitchFamily="34" charset="0"/>
+              </a:rPr>
+              <a:t>University of Alabama trustees vote to rename hall that honored 'ardent white supremacist’</a:t>
+            </a:r>
+            <a:r>
+              <a:rPr lang="en-US" sz="1200" dirty="0"/>
+              <a:t> </a:t>
+            </a:r>
+          </a:p>
+          <a:p>
+            <a:pPr marL="171450" indent="-171450">
+              <a:buFont typeface="Arial" panose="020B0604020202020204" pitchFamily="34" charset="0"/>
+              <a:buChar char="•"/>
+            </a:pPr>
+            <a:r>
+              <a:rPr lang="en-US" sz="1200" i="1" dirty="0"/>
+              <a:t>Score: .82 (Positive), Published by USA Today</a:t>
+            </a:r>
+          </a:p>
+        </p:txBody>
+      </p:sp>
+      <p:pic>
+        <p:nvPicPr>
+          <p:cNvPr id="16" name="Content Placeholder 8">
+            <a:extLst>
+              <a:ext uri="{FF2B5EF4-FFF2-40B4-BE49-F238E27FC236}">
+                <a16:creationId xmlns:a16="http://schemas.microsoft.com/office/drawing/2014/main" id="{84A6607B-DB84-48CE-A1D2-46D7AA3F9E6B}"/>
+              </a:ext>
+            </a:extLst>
+          </p:cNvPr>
+          <p:cNvPicPr>
+            <a:picLocks noChangeAspect="1"/>
+          </p:cNvPicPr>
+          <p:nvPr/>
+        </p:nvPicPr>
+        <p:blipFill>
+          <a:blip r:embed="rId3"/>
+          <a:stretch>
+            <a:fillRect/>
+          </a:stretch>
+        </p:blipFill>
+        <p:spPr>
+          <a:xfrm>
+            <a:off x="869949" y="1428750"/>
+            <a:ext cx="5671040" cy="4536832"/>
+          </a:xfrm>
+          <a:prstGeom prst="rect">
+            <a:avLst/>
+          </a:prstGeom>
+        </p:spPr>
+      </p:pic>
+      <p:sp>
+        <p:nvSpPr>
+          <p:cNvPr id="18" name="TextBox 17">
+            <a:extLst>
+              <a:ext uri="{FF2B5EF4-FFF2-40B4-BE49-F238E27FC236}">
+                <a16:creationId xmlns:a16="http://schemas.microsoft.com/office/drawing/2014/main" id="{B10FC46F-DA2F-49A5-9AC8-BFF20A8A5394}"/>
+              </a:ext>
+            </a:extLst>
+          </p:cNvPr>
+          <p:cNvSpPr txBox="1"/>
+          <p:nvPr/>
+        </p:nvSpPr>
+        <p:spPr>
+          <a:xfrm>
+            <a:off x="6540989" y="3951923"/>
+            <a:ext cx="5407171" cy="1569660"/>
+          </a:xfrm>
+          <a:prstGeom prst="rect">
+            <a:avLst/>
+          </a:prstGeom>
+          <a:noFill/>
+        </p:spPr>
+        <p:txBody>
+          <a:bodyPr wrap="square">
+            <a:spAutoFit/>
+          </a:bodyPr>
+          <a:lstStyle/>
+          <a:p>
+            <a:r>
+              <a:rPr lang="en-US" sz="1800" b="0" i="0" u="none" strike="noStrike" dirty="0">
+                <a:solidFill>
+                  <a:srgbClr val="000000"/>
+                </a:solidFill>
+                <a:effectLst/>
+                <a:latin typeface="Calibri" panose="020F0502020204030204" pitchFamily="34" charset="0"/>
+              </a:rPr>
+              <a:t>Can you guess the sentiment of these titles?</a:t>
+            </a:r>
+          </a:p>
+          <a:p>
+            <a:endParaRPr lang="en-US" sz="1800" b="0" i="0" u="none" strike="noStrike" dirty="0">
+              <a:solidFill>
+                <a:srgbClr val="000000"/>
+              </a:solidFill>
+              <a:effectLst/>
+              <a:latin typeface="Calibri" panose="020F0502020204030204" pitchFamily="34" charset="0"/>
+            </a:endParaRPr>
+          </a:p>
+          <a:p>
+            <a:pPr marL="285750" indent="-285750">
+              <a:buFont typeface="Arial" panose="020B0604020202020204" pitchFamily="34" charset="0"/>
+              <a:buChar char="•"/>
+            </a:pPr>
+            <a:r>
+              <a:rPr lang="en-US" sz="1200" b="0" i="0" u="none" strike="noStrike" dirty="0">
+                <a:solidFill>
+                  <a:srgbClr val="000000"/>
+                </a:solidFill>
+                <a:effectLst/>
+                <a:latin typeface="Calibri" panose="020F0502020204030204" pitchFamily="34" charset="0"/>
+              </a:rPr>
+              <a:t>Bader Ginsburg, Supreme Court justice and legal pioneer for gender equality, dies at 87</a:t>
+            </a:r>
+            <a:r>
+              <a:rPr lang="en-US" sz="1200" dirty="0"/>
+              <a:t> </a:t>
+            </a:r>
+          </a:p>
+          <a:p>
+            <a:pPr marL="285750" indent="-285750">
+              <a:buFont typeface="Arial" panose="020B0604020202020204" pitchFamily="34" charset="0"/>
+              <a:buChar char="•"/>
+            </a:pPr>
+            <a:endParaRPr lang="en-US" sz="1200" dirty="0"/>
+          </a:p>
+          <a:p>
+            <a:pPr marL="285750" indent="-285750">
+              <a:buFont typeface="Arial" panose="020B0604020202020204" pitchFamily="34" charset="0"/>
+              <a:buChar char="•"/>
+            </a:pPr>
+            <a:r>
+              <a:rPr lang="en-US" sz="1200" b="0" i="0" u="none" strike="noStrike" dirty="0">
+                <a:solidFill>
+                  <a:srgbClr val="000000"/>
+                </a:solidFill>
+                <a:effectLst/>
+                <a:latin typeface="Calibri" panose="020F0502020204030204" pitchFamily="34" charset="0"/>
+              </a:rPr>
+              <a:t>Mackenzie </a:t>
+            </a:r>
+            <a:r>
+              <a:rPr lang="en-US" sz="1200" b="0" i="0" u="none" strike="noStrike" dirty="0" err="1">
+                <a:solidFill>
+                  <a:srgbClr val="000000"/>
+                </a:solidFill>
+                <a:effectLst/>
+                <a:latin typeface="Calibri" panose="020F0502020204030204" pitchFamily="34" charset="0"/>
+              </a:rPr>
+              <a:t>Lueck’s</a:t>
+            </a:r>
+            <a:r>
+              <a:rPr lang="en-US" sz="1200" b="0" i="0" u="none" strike="noStrike" dirty="0">
+                <a:solidFill>
+                  <a:srgbClr val="000000"/>
+                </a:solidFill>
+                <a:effectLst/>
+                <a:latin typeface="Calibri" panose="020F0502020204030204" pitchFamily="34" charset="0"/>
+              </a:rPr>
+              <a:t> killer pleads guilty to aggravated murder, will avoid death penalty</a:t>
+            </a:r>
+            <a:endParaRPr lang="en-US" sz="1200" dirty="0"/>
           </a:p>
         </p:txBody>
       </p:sp>
@@ -6037,6 +6616,198 @@
           <p:cNvPr id="2" name="Title 1">
             <a:extLst>
               <a:ext uri="{FF2B5EF4-FFF2-40B4-BE49-F238E27FC236}">
+                <a16:creationId xmlns:a16="http://schemas.microsoft.com/office/drawing/2014/main" id="{E20174FA-16C5-43C9-B4DA-D902B11BEA0D}"/>
+              </a:ext>
+            </a:extLst>
+          </p:cNvPr>
+          <p:cNvSpPr>
+            <a:spLocks noGrp="1"/>
+          </p:cNvSpPr>
+          <p:nvPr>
+            <p:ph type="title"/>
+          </p:nvPr>
+        </p:nvSpPr>
+        <p:spPr/>
+        <p:txBody>
+          <a:bodyPr/>
+          <a:lstStyle/>
+          <a:p>
+            <a:r>
+              <a:rPr lang="en-US" sz="4400" b="0" i="0" u="none" strike="noStrike" dirty="0">
+                <a:solidFill>
+                  <a:srgbClr val="000000"/>
+                </a:solidFill>
+                <a:effectLst/>
+                <a:latin typeface="Calibri" panose="020F0502020204030204" pitchFamily="34" charset="0"/>
+              </a:rPr>
+              <a:t>Can you guess the sentiment of these titles?</a:t>
+            </a:r>
+          </a:p>
+        </p:txBody>
+      </p:sp>
+      <p:sp>
+        <p:nvSpPr>
+          <p:cNvPr id="3" name="Content Placeholder 2">
+            <a:extLst>
+              <a:ext uri="{FF2B5EF4-FFF2-40B4-BE49-F238E27FC236}">
+                <a16:creationId xmlns:a16="http://schemas.microsoft.com/office/drawing/2014/main" id="{E204FD48-AC00-4B41-B29D-5034C1DD8238}"/>
+              </a:ext>
+            </a:extLst>
+          </p:cNvPr>
+          <p:cNvSpPr>
+            <a:spLocks noGrp="1"/>
+          </p:cNvSpPr>
+          <p:nvPr>
+            <p:ph idx="1"/>
+          </p:nvPr>
+        </p:nvSpPr>
+        <p:spPr/>
+        <p:txBody>
+          <a:bodyPr/>
+          <a:lstStyle/>
+          <a:p>
+            <a:pPr marL="285750" indent="-285750">
+              <a:buFont typeface="Arial" panose="020B0604020202020204" pitchFamily="34" charset="0"/>
+              <a:buChar char="•"/>
+            </a:pPr>
+            <a:r>
+              <a:rPr lang="en-US" sz="2000" b="0" i="0" u="none" strike="noStrike" dirty="0">
+                <a:solidFill>
+                  <a:srgbClr val="000000"/>
+                </a:solidFill>
+                <a:effectLst/>
+                <a:latin typeface="Calibri" panose="020F0502020204030204" pitchFamily="34" charset="0"/>
+              </a:rPr>
+              <a:t>Bader Ginsburg, Supreme Court justice and legal pioneer for gender equality, dies at 87</a:t>
+            </a:r>
+            <a:r>
+              <a:rPr lang="en-US" sz="2000" dirty="0"/>
+              <a:t> </a:t>
+            </a:r>
+          </a:p>
+          <a:p>
+            <a:pPr marL="285750" indent="-285750">
+              <a:buFont typeface="Arial" panose="020B0604020202020204" pitchFamily="34" charset="0"/>
+              <a:buChar char="•"/>
+            </a:pPr>
+            <a:endParaRPr lang="en-US" sz="2000" dirty="0"/>
+          </a:p>
+          <a:p>
+            <a:pPr marL="285750" indent="-285750">
+              <a:buFont typeface="Arial" panose="020B0604020202020204" pitchFamily="34" charset="0"/>
+              <a:buChar char="•"/>
+            </a:pPr>
+            <a:r>
+              <a:rPr lang="en-US" sz="2000" b="0" i="0" u="none" strike="noStrike" dirty="0">
+                <a:solidFill>
+                  <a:srgbClr val="000000"/>
+                </a:solidFill>
+                <a:effectLst/>
+                <a:latin typeface="Calibri" panose="020F0502020204030204" pitchFamily="34" charset="0"/>
+              </a:rPr>
+              <a:t>Mackenzie </a:t>
+            </a:r>
+            <a:r>
+              <a:rPr lang="en-US" sz="2000" b="0" i="0" u="none" strike="noStrike" dirty="0" err="1">
+                <a:solidFill>
+                  <a:srgbClr val="000000"/>
+                </a:solidFill>
+                <a:effectLst/>
+                <a:latin typeface="Calibri" panose="020F0502020204030204" pitchFamily="34" charset="0"/>
+              </a:rPr>
+              <a:t>Lueck’s</a:t>
+            </a:r>
+            <a:r>
+              <a:rPr lang="en-US" sz="2000" b="0" i="0" u="none" strike="noStrike" dirty="0">
+                <a:solidFill>
+                  <a:srgbClr val="000000"/>
+                </a:solidFill>
+                <a:effectLst/>
+                <a:latin typeface="Calibri" panose="020F0502020204030204" pitchFamily="34" charset="0"/>
+              </a:rPr>
+              <a:t> killer pleads guilty to aggravated murder, will avoid death penalty</a:t>
+            </a:r>
+            <a:endParaRPr lang="en-US" sz="2000" dirty="0"/>
+          </a:p>
+          <a:p>
+            <a:endParaRPr lang="en-US" dirty="0"/>
+          </a:p>
+        </p:txBody>
+      </p:sp>
+      <p:sp>
+        <p:nvSpPr>
+          <p:cNvPr id="4" name="TextBox 3">
+            <a:extLst>
+              <a:ext uri="{FF2B5EF4-FFF2-40B4-BE49-F238E27FC236}">
+                <a16:creationId xmlns:a16="http://schemas.microsoft.com/office/drawing/2014/main" id="{942E6F93-E474-4FB3-9578-C5517A3F6B75}"/>
+              </a:ext>
+            </a:extLst>
+          </p:cNvPr>
+          <p:cNvSpPr txBox="1"/>
+          <p:nvPr/>
+        </p:nvSpPr>
+        <p:spPr>
+          <a:xfrm>
+            <a:off x="3108960" y="5049520"/>
+            <a:ext cx="6343211" cy="369332"/>
+          </a:xfrm>
+          <a:prstGeom prst="rect">
+            <a:avLst/>
+          </a:prstGeom>
+          <a:solidFill>
+            <a:schemeClr val="bg1">
+              <a:lumMod val="65000"/>
+            </a:schemeClr>
+          </a:solidFill>
+        </p:spPr>
+        <p:txBody>
+          <a:bodyPr wrap="none" rtlCol="0">
+            <a:spAutoFit/>
+          </a:bodyPr>
+          <a:lstStyle/>
+          <a:p>
+            <a:r>
+              <a:rPr lang="en-US" dirty="0"/>
+              <a:t>If we have time, might be a fun way of engaging the audience… </a:t>
+            </a:r>
+          </a:p>
+        </p:txBody>
+      </p:sp>
+    </p:spTree>
+    <p:extLst>
+      <p:ext uri="{BB962C8B-B14F-4D97-AF65-F5344CB8AC3E}">
+        <p14:creationId xmlns:p14="http://schemas.microsoft.com/office/powerpoint/2010/main" val="3946897848"/>
+      </p:ext>
+    </p:extLst>
+  </p:cSld>
+  <p:clrMapOvr>
+    <a:masterClrMapping/>
+  </p:clrMapOvr>
+</p:sld>
+</file>
+
+<file path=ppt/slides/slide8.xml><?xml version="1.0" encoding="utf-8"?>
+<p:sld xmlns:a="http://schemas.openxmlformats.org/drawingml/2006/main" xmlns:r="http://schemas.openxmlformats.org/officeDocument/2006/relationships" xmlns:p="http://schemas.openxmlformats.org/presentationml/2006/main">
+  <p:cSld>
+    <p:spTree>
+      <p:nvGrpSpPr>
+        <p:cNvPr id="1" name=""/>
+        <p:cNvGrpSpPr/>
+        <p:nvPr/>
+      </p:nvGrpSpPr>
+      <p:grpSpPr>
+        <a:xfrm>
+          <a:off x="0" y="0"/>
+          <a:ext cx="0" cy="0"/>
+          <a:chOff x="0" y="0"/>
+          <a:chExt cx="0" cy="0"/>
+        </a:xfrm>
+      </p:grpSpPr>
+      <p:sp>
+        <p:nvSpPr>
+          <p:cNvPr id="2" name="Title 1">
+            <a:extLst>
+              <a:ext uri="{FF2B5EF4-FFF2-40B4-BE49-F238E27FC236}">
                 <a16:creationId xmlns:a16="http://schemas.microsoft.com/office/drawing/2014/main" id="{A0C0ACAE-620A-40FF-81F9-65FA95FD0AAC}"/>
               </a:ext>
             </a:extLst>
@@ -6062,19 +6833,17 @@
       </p:sp>
       <p:pic>
         <p:nvPicPr>
-          <p:cNvPr id="5" name="Content Placeholder 4">
+          <p:cNvPr id="8" name="Picture 7">
             <a:extLst>
               <a:ext uri="{FF2B5EF4-FFF2-40B4-BE49-F238E27FC236}">
-                <a16:creationId xmlns:a16="http://schemas.microsoft.com/office/drawing/2014/main" id="{C0F80B75-CE59-4699-B83E-516676432F43}"/>
+                <a16:creationId xmlns:a16="http://schemas.microsoft.com/office/drawing/2014/main" id="{BC64A9B2-175F-4D1F-891A-4589A3CFFF37}"/>
               </a:ext>
             </a:extLst>
           </p:cNvPr>
           <p:cNvPicPr>
-            <a:picLocks noGrp="1" noChangeAspect="1"/>
+            <a:picLocks noChangeAspect="1"/>
           </p:cNvPicPr>
-          <p:nvPr>
-            <p:ph idx="1"/>
-          </p:nvPr>
+          <p:nvPr/>
         </p:nvPicPr>
         <p:blipFill>
           <a:blip r:embed="rId3"/>
@@ -6084,17 +6853,20 @@
         </p:blipFill>
         <p:spPr>
           <a:xfrm>
-            <a:off x="876115" y="2171700"/>
-            <a:ext cx="5372100" cy="3581400"/>
+            <a:off x="871885" y="1701382"/>
+            <a:ext cx="5487650" cy="3658433"/>
           </a:xfrm>
+          <a:prstGeom prst="rect">
+            <a:avLst/>
+          </a:prstGeom>
         </p:spPr>
       </p:pic>
       <p:pic>
         <p:nvPicPr>
-          <p:cNvPr id="7" name="Picture 6">
+          <p:cNvPr id="10" name="Picture 9">
             <a:extLst>
               <a:ext uri="{FF2B5EF4-FFF2-40B4-BE49-F238E27FC236}">
-                <a16:creationId xmlns:a16="http://schemas.microsoft.com/office/drawing/2014/main" id="{31B4DBB5-9BA0-4EB2-A444-D5F07B38B169}"/>
+                <a16:creationId xmlns:a16="http://schemas.microsoft.com/office/drawing/2014/main" id="{D714B63B-D06D-4F6D-8090-D646F3BD5E06}"/>
               </a:ext>
             </a:extLst>
           </p:cNvPr>
@@ -6111,7 +6883,7 @@
         </p:blipFill>
         <p:spPr>
           <a:xfrm>
-            <a:off x="6450481" y="2171700"/>
+            <a:off x="6359535" y="1701382"/>
             <a:ext cx="5487650" cy="3658433"/>
           </a:xfrm>
           <a:prstGeom prst="rect">
@@ -6132,7 +6904,7 @@
 </p:sld>
 </file>
 
-<file path=ppt/slides/slide8.xml><?xml version="1.0" encoding="utf-8"?>
+<file path=ppt/slides/slide9.xml><?xml version="1.0" encoding="utf-8"?>
 <p:sld xmlns:a="http://schemas.openxmlformats.org/drawingml/2006/main" xmlns:r="http://schemas.openxmlformats.org/officeDocument/2006/relationships" xmlns:p="http://schemas.openxmlformats.org/presentationml/2006/main">
   <p:cSld>
     <p:spTree>
@@ -6308,199 +7080,6 @@
     <p:extLst>
       <p:ext uri="{BB962C8B-B14F-4D97-AF65-F5344CB8AC3E}">
         <p14:creationId xmlns:p14="http://schemas.microsoft.com/office/powerpoint/2010/main" val="2513785858"/>
-      </p:ext>
-    </p:extLst>
-  </p:cSld>
-  <p:clrMapOvr>
-    <a:masterClrMapping/>
-  </p:clrMapOvr>
-</p:sld>
-</file>
-
-<file path=ppt/slides/slide9.xml><?xml version="1.0" encoding="utf-8"?>
-<p:sld xmlns:a="http://schemas.openxmlformats.org/drawingml/2006/main" xmlns:r="http://schemas.openxmlformats.org/officeDocument/2006/relationships" xmlns:p="http://schemas.openxmlformats.org/presentationml/2006/main">
-  <p:cSld>
-    <p:spTree>
-      <p:nvGrpSpPr>
-        <p:cNvPr id="1" name=""/>
-        <p:cNvGrpSpPr/>
-        <p:nvPr/>
-      </p:nvGrpSpPr>
-      <p:grpSpPr>
-        <a:xfrm>
-          <a:off x="0" y="0"/>
-          <a:ext cx="0" cy="0"/>
-          <a:chOff x="0" y="0"/>
-          <a:chExt cx="0" cy="0"/>
-        </a:xfrm>
-      </p:grpSpPr>
-      <p:sp>
-        <p:nvSpPr>
-          <p:cNvPr id="2" name="Title 1">
-            <a:extLst>
-              <a:ext uri="{FF2B5EF4-FFF2-40B4-BE49-F238E27FC236}">
-                <a16:creationId xmlns:a16="http://schemas.microsoft.com/office/drawing/2014/main" id="{6E1DFE7F-8996-4432-B0B9-1278B1C45367}"/>
-              </a:ext>
-            </a:extLst>
-          </p:cNvPr>
-          <p:cNvSpPr>
-            <a:spLocks noGrp="1"/>
-          </p:cNvSpPr>
-          <p:nvPr>
-            <p:ph type="title"/>
-          </p:nvPr>
-        </p:nvSpPr>
-        <p:spPr/>
-        <p:txBody>
-          <a:bodyPr/>
-          <a:lstStyle/>
-          <a:p>
-            <a:r>
-              <a:rPr lang="en-US" dirty="0"/>
-              <a:t>Key takeaways</a:t>
-            </a:r>
-          </a:p>
-        </p:txBody>
-      </p:sp>
-      <p:sp>
-        <p:nvSpPr>
-          <p:cNvPr id="3" name="Content Placeholder 2">
-            <a:extLst>
-              <a:ext uri="{FF2B5EF4-FFF2-40B4-BE49-F238E27FC236}">
-                <a16:creationId xmlns:a16="http://schemas.microsoft.com/office/drawing/2014/main" id="{62650EB6-537B-41B0-BD21-36EDF3512704}"/>
-              </a:ext>
-            </a:extLst>
-          </p:cNvPr>
-          <p:cNvSpPr>
-            <a:spLocks noGrp="1"/>
-          </p:cNvSpPr>
-          <p:nvPr>
-            <p:ph idx="1"/>
-          </p:nvPr>
-        </p:nvSpPr>
-        <p:spPr/>
-        <p:txBody>
-          <a:bodyPr>
-            <a:normAutofit fontScale="70000" lnSpcReduction="20000"/>
-          </a:bodyPr>
-          <a:lstStyle/>
-          <a:p>
-            <a:r>
-              <a:rPr lang="en-US" dirty="0"/>
-              <a:t>Key findings</a:t>
-            </a:r>
-          </a:p>
-          <a:p>
-            <a:pPr lvl="1"/>
-            <a:r>
-              <a:rPr lang="en-US" dirty="0" err="1"/>
-              <a:t>Britebart</a:t>
-            </a:r>
-            <a:r>
-              <a:rPr lang="en-US" dirty="0"/>
-              <a:t>/</a:t>
-            </a:r>
-            <a:r>
-              <a:rPr lang="en-US" dirty="0" err="1"/>
-              <a:t>Aljezera</a:t>
-            </a:r>
-            <a:r>
-              <a:rPr lang="en-US" dirty="0"/>
-              <a:t> seem to use most extreme language</a:t>
-            </a:r>
-          </a:p>
-          <a:p>
-            <a:pPr lvl="2"/>
-            <a:r>
-              <a:rPr lang="en-US" dirty="0"/>
-              <a:t>Seem to be writing for a specific population of readers</a:t>
-            </a:r>
-          </a:p>
-          <a:p>
-            <a:pPr lvl="1"/>
-            <a:r>
-              <a:rPr lang="en-US" dirty="0"/>
-              <a:t>Negative/Positive headlines seem to have different topics with some overlap</a:t>
-            </a:r>
-          </a:p>
-          <a:p>
-            <a:pPr lvl="2"/>
-            <a:r>
-              <a:rPr lang="en-US" dirty="0"/>
-              <a:t>Topics seem to change over time based on current events</a:t>
-            </a:r>
-          </a:p>
-          <a:p>
-            <a:r>
-              <a:rPr lang="en-US" dirty="0"/>
-              <a:t>Challenges</a:t>
-            </a:r>
-          </a:p>
-          <a:p>
-            <a:pPr lvl="1"/>
-            <a:r>
-              <a:rPr lang="en-US" dirty="0"/>
-              <a:t>Sentiment scoring is not customized – NLTK Vader was trained on social media</a:t>
-            </a:r>
-          </a:p>
-          <a:p>
-            <a:pPr lvl="1"/>
-            <a:r>
-              <a:rPr lang="en-US" dirty="0" err="1"/>
-              <a:t>NewsAPI</a:t>
-            </a:r>
-            <a:r>
-              <a:rPr lang="en-US" dirty="0"/>
-              <a:t> limits access to sources</a:t>
-            </a:r>
-          </a:p>
-          <a:p>
-            <a:r>
-              <a:rPr lang="en-US" dirty="0"/>
-              <a:t>Additional questions to be asked if had more time/resources</a:t>
-            </a:r>
-          </a:p>
-          <a:p>
-            <a:pPr lvl="1"/>
-            <a:r>
-              <a:rPr lang="en-US" dirty="0"/>
-              <a:t>Emotional analysis – what’s behind the extremity of the language used</a:t>
-            </a:r>
-          </a:p>
-          <a:p>
-            <a:pPr lvl="1"/>
-            <a:r>
-              <a:rPr lang="en-US" dirty="0"/>
-              <a:t>Look at body of the articles instead of headline</a:t>
-            </a:r>
-          </a:p>
-          <a:p>
-            <a:pPr lvl="1"/>
-            <a:r>
-              <a:rPr lang="en-US" dirty="0"/>
-              <a:t>Looking more into differences in publishers and authors</a:t>
-            </a:r>
-          </a:p>
-          <a:p>
-            <a:pPr lvl="1"/>
-            <a:r>
-              <a:rPr lang="en-US" dirty="0"/>
-              <a:t>Customizing the sentiment analysis</a:t>
-            </a:r>
-          </a:p>
-          <a:p>
-            <a:pPr lvl="1"/>
-            <a:r>
-              <a:rPr lang="en-US" dirty="0"/>
-              <a:t>Add to dataset monthly to observe impact of current events</a:t>
-            </a:r>
-          </a:p>
-        </p:txBody>
-      </p:sp>
-    </p:spTree>
-    <p:extLst>
-      <p:ext uri="{BB962C8B-B14F-4D97-AF65-F5344CB8AC3E}">
-        <p14:creationId xmlns:p14="http://schemas.microsoft.com/office/powerpoint/2010/main" val="1865033548"/>
       </p:ext>
     </p:extLst>
   </p:cSld>

</xml_diff>

<commit_message>
<final draft of deck>
</commit_message>
<xml_diff>
--- a/Group_project_deck.pptx
+++ b/Group_project_deck.pptx
@@ -5,7 +5,7 @@
     <p:sldMasterId id="2147483648" r:id="rId1"/>
   </p:sldMasterIdLst>
   <p:notesMasterIdLst>
-    <p:notesMasterId r:id="rId15"/>
+    <p:notesMasterId r:id="rId16"/>
   </p:notesMasterIdLst>
   <p:sldIdLst>
     <p:sldId id="265" r:id="rId2"/>
@@ -14,13 +14,14 @@
     <p:sldId id="259" r:id="rId5"/>
     <p:sldId id="261" r:id="rId6"/>
     <p:sldId id="260" r:id="rId7"/>
-    <p:sldId id="269" r:id="rId8"/>
-    <p:sldId id="262" r:id="rId9"/>
-    <p:sldId id="266" r:id="rId10"/>
-    <p:sldId id="264" r:id="rId11"/>
-    <p:sldId id="268" r:id="rId12"/>
-    <p:sldId id="263" r:id="rId13"/>
-    <p:sldId id="267" r:id="rId14"/>
+    <p:sldId id="262" r:id="rId8"/>
+    <p:sldId id="266" r:id="rId9"/>
+    <p:sldId id="264" r:id="rId10"/>
+    <p:sldId id="269" r:id="rId11"/>
+    <p:sldId id="270" r:id="rId12"/>
+    <p:sldId id="268" r:id="rId13"/>
+    <p:sldId id="263" r:id="rId14"/>
+    <p:sldId id="267" r:id="rId15"/>
   </p:sldIdLst>
   <p:sldSz cx="12192000" cy="6858000"/>
   <p:notesSz cx="6858000" cy="9144000"/>
@@ -538,6 +539,54 @@
               <a:defRPr/>
             </a:pPr>
             <a:r>
+              <a:rPr lang="en-US" sz="1200" b="0" i="0" u="none" strike="noStrike" dirty="0">
+                <a:solidFill>
+                  <a:srgbClr val="000000"/>
+                </a:solidFill>
+                <a:effectLst/>
+                <a:latin typeface="Arial" panose="020B0604020202020204" pitchFamily="34" charset="0"/>
+              </a:rPr>
+              <a:t>What is sentiment analysis?</a:t>
+            </a:r>
+            <a:br>
+              <a:rPr lang="en-US" sz="1200" b="0" i="0" u="none" strike="noStrike" dirty="0">
+                <a:solidFill>
+                  <a:srgbClr val="000000"/>
+                </a:solidFill>
+                <a:effectLst/>
+                <a:latin typeface="Arial" panose="020B0604020202020204" pitchFamily="34" charset="0"/>
+              </a:rPr>
+            </a:br>
+            <a:r>
+              <a:rPr lang="en-US" sz="1200" b="0" i="0" u="none" strike="noStrike" dirty="0">
+                <a:solidFill>
+                  <a:srgbClr val="000000"/>
+                </a:solidFill>
+                <a:effectLst/>
+                <a:latin typeface="Arial" panose="020B0604020202020204" pitchFamily="34" charset="0"/>
+              </a:rPr>
+              <a:t>Evaluation of positive/negative emotion conveyed through text</a:t>
+            </a:r>
+          </a:p>
+          <a:p>
+            <a:pPr marL="457200" marR="0" lvl="1" indent="0" algn="l" defTabSz="914400" rtl="0" eaLnBrk="1" fontAlgn="auto" latinLnBrk="0" hangingPunct="1">
+              <a:lnSpc>
+                <a:spcPct val="100000"/>
+              </a:lnSpc>
+              <a:spcBef>
+                <a:spcPts val="0"/>
+              </a:spcBef>
+              <a:spcAft>
+                <a:spcPts val="0"/>
+              </a:spcAft>
+              <a:buClrTx/>
+              <a:buSzTx/>
+              <a:buFontTx/>
+              <a:buNone/>
+              <a:tabLst/>
+              <a:defRPr/>
+            </a:pPr>
+            <a:r>
               <a:rPr lang="en-US" dirty="0"/>
               <a:t>Pull down and store headlines and newspaper metadata from the News API with four keywords:</a:t>
             </a:r>
@@ -730,119 +779,8 @@
           <a:lstStyle/>
           <a:p>
             <a:r>
-              <a:rPr lang="en-US" sz="1800" b="0" i="0" u="none" strike="noStrike" dirty="0">
-                <a:solidFill>
-                  <a:srgbClr val="000000"/>
-                </a:solidFill>
-                <a:effectLst/>
-                <a:latin typeface="Calibri" panose="020F0502020204030204" pitchFamily="34" charset="0"/>
-              </a:rPr>
-              <a:t>The Washington Post</a:t>
-            </a:r>
-            <a:r>
-              <a:rPr lang="en-US" sz="2800" dirty="0"/>
-              <a:t> - </a:t>
-            </a:r>
-            <a:r>
-              <a:rPr lang="en-US" sz="1800" b="0" i="0" u="none" strike="noStrike" dirty="0">
-                <a:solidFill>
-                  <a:srgbClr val="000000"/>
-                </a:solidFill>
-                <a:effectLst/>
-                <a:latin typeface="Calibri" panose="020F0502020204030204" pitchFamily="34" charset="0"/>
-              </a:rPr>
-              <a:t>Ruth Bader Ginsburg, Supreme Court justice and legal pioneer for gender equality, dies at 87,</a:t>
-            </a:r>
-            <a:r>
-              <a:rPr lang="en-US" sz="2800" dirty="0"/>
-              <a:t> </a:t>
-            </a:r>
-            <a:r>
-              <a:rPr lang="en-US" sz="1800" b="0" i="0" u="none" strike="noStrike" dirty="0">
-                <a:solidFill>
-                  <a:srgbClr val="000000"/>
-                </a:solidFill>
-                <a:effectLst/>
-                <a:latin typeface="Calibri" panose="020F0502020204030204" pitchFamily="34" charset="0"/>
-              </a:rPr>
-              <a:t>0.8176</a:t>
-            </a:r>
-            <a:r>
-              <a:rPr lang="en-US" sz="2800" dirty="0"/>
-              <a:t> </a:t>
-            </a:r>
-          </a:p>
-          <a:p>
-            <a:endParaRPr lang="en-US" sz="2800" b="0" i="0" u="none" strike="noStrike" dirty="0">
-              <a:solidFill>
-                <a:srgbClr val="000000"/>
-              </a:solidFill>
-              <a:effectLst/>
-              <a:latin typeface="Calibri" panose="020F0502020204030204" pitchFamily="34" charset="0"/>
-            </a:endParaRPr>
-          </a:p>
-          <a:p>
-            <a:r>
-              <a:rPr lang="en-US" sz="1800" b="0" i="0" u="none" strike="noStrike" dirty="0">
-                <a:solidFill>
-                  <a:srgbClr val="000000"/>
-                </a:solidFill>
-                <a:effectLst/>
-                <a:latin typeface="Calibri" panose="020F0502020204030204" pitchFamily="34" charset="0"/>
-              </a:rPr>
-              <a:t>Fox News</a:t>
-            </a:r>
-            <a:r>
-              <a:rPr lang="en-US" dirty="0"/>
-              <a:t> - </a:t>
-            </a:r>
-            <a:r>
-              <a:rPr lang="en-US" sz="1800" b="0" i="0" u="none" strike="noStrike" dirty="0">
-                <a:solidFill>
-                  <a:srgbClr val="000000"/>
-                </a:solidFill>
-                <a:effectLst/>
-                <a:latin typeface="Calibri" panose="020F0502020204030204" pitchFamily="34" charset="0"/>
-              </a:rPr>
-              <a:t>Mackenzie </a:t>
-            </a:r>
-            <a:r>
-              <a:rPr lang="en-US" sz="1800" b="0" i="0" u="none" strike="noStrike" dirty="0" err="1">
-                <a:solidFill>
-                  <a:srgbClr val="000000"/>
-                </a:solidFill>
-                <a:effectLst/>
-                <a:latin typeface="Calibri" panose="020F0502020204030204" pitchFamily="34" charset="0"/>
-              </a:rPr>
-              <a:t>Lueckâ’s</a:t>
-            </a:r>
-            <a:r>
-              <a:rPr lang="en-US" sz="1800" b="0" i="0" u="none" strike="noStrike" dirty="0">
-                <a:solidFill>
-                  <a:srgbClr val="000000"/>
-                </a:solidFill>
-                <a:effectLst/>
-                <a:latin typeface="Calibri" panose="020F0502020204030204" pitchFamily="34" charset="0"/>
-              </a:rPr>
-              <a:t> killer pleads guilty to aggravated murder, will avoid death penalty: reports, </a:t>
-            </a:r>
-            <a:r>
-              <a:rPr lang="en-US" dirty="0"/>
-              <a:t> </a:t>
-            </a:r>
-            <a:r>
-              <a:rPr lang="en-US" sz="1800" b="0" i="0" u="none" strike="noStrike" dirty="0">
-                <a:solidFill>
-                  <a:srgbClr val="000000"/>
-                </a:solidFill>
-                <a:effectLst/>
-                <a:latin typeface="Calibri" panose="020F0502020204030204" pitchFamily="34" charset="0"/>
-              </a:rPr>
-              <a:t>-0.9744</a:t>
-            </a:r>
-            <a:r>
-              <a:rPr lang="en-US" dirty="0"/>
-              <a:t> </a:t>
+              <a:rPr lang="en-US" dirty="0"/>
+              <a:t>How did we choose the sources? Pew research, political bias</a:t>
             </a:r>
           </a:p>
         </p:txBody>
@@ -864,7 +802,7 @@
           <a:p>
             <a:fld id="{1F88B8BE-972A-4AD0-BD0D-E769440C7A47}" type="slidenum">
               <a:rPr lang="en-US" smtClean="0"/>
-              <a:t>6</a:t>
+              <a:t>4</a:t>
             </a:fld>
             <a:endParaRPr lang="en-US"/>
           </a:p>
@@ -873,7 +811,7 @@
     </p:spTree>
     <p:extLst>
       <p:ext uri="{BB962C8B-B14F-4D97-AF65-F5344CB8AC3E}">
-        <p14:creationId xmlns:p14="http://schemas.microsoft.com/office/powerpoint/2010/main" val="1538445594"/>
+        <p14:creationId xmlns:p14="http://schemas.microsoft.com/office/powerpoint/2010/main" val="2822443338"/>
       </p:ext>
     </p:extLst>
   </p:cSld>
@@ -927,26 +865,49 @@
           <a:bodyPr/>
           <a:lstStyle/>
           <a:p>
-            <a:pPr marL="0" marR="0" lvl="0" indent="0" algn="l" defTabSz="914400" rtl="0" eaLnBrk="1" fontAlgn="auto" latinLnBrk="0" hangingPunct="1">
-              <a:lnSpc>
-                <a:spcPct val="100000"/>
-              </a:lnSpc>
-              <a:spcBef>
-                <a:spcPts val="0"/>
-              </a:spcBef>
-              <a:spcAft>
-                <a:spcPts val="0"/>
-              </a:spcAft>
-              <a:buClrTx/>
-              <a:buSzTx/>
-              <a:buFontTx/>
-              <a:buNone/>
-              <a:tabLst/>
-              <a:defRPr/>
+            <a:r>
+              <a:rPr lang="en-US" dirty="0"/>
+              <a:t>Descriptive stats</a:t>
+            </a:r>
+          </a:p>
+          <a:p>
+            <a:pPr marL="285750" indent="-285750">
+              <a:buFont typeface="Arial" panose="020B0604020202020204" pitchFamily="34" charset="0"/>
+              <a:buChar char="•"/>
             </a:pPr>
             <a:r>
               <a:rPr lang="en-US" dirty="0"/>
-              <a:t>Top word used in positive/negative headlines</a:t>
+              <a:t>Median is close to 0</a:t>
+            </a:r>
+          </a:p>
+          <a:p>
+            <a:pPr marL="285750" indent="-285750">
+              <a:buFont typeface="Arial" panose="020B0604020202020204" pitchFamily="34" charset="0"/>
+              <a:buChar char="•"/>
+            </a:pPr>
+            <a:r>
+              <a:rPr lang="en-US" dirty="0"/>
+              <a:t>0 is neutral </a:t>
+            </a:r>
+          </a:p>
+          <a:p>
+            <a:pPr marL="285750" indent="-285750">
+              <a:buFont typeface="Arial" panose="020B0604020202020204" pitchFamily="34" charset="0"/>
+              <a:buChar char="•"/>
+            </a:pPr>
+            <a:r>
+              <a:rPr lang="en-US" dirty="0"/>
+              <a:t>Threshold is -.2 to .2</a:t>
+            </a:r>
+          </a:p>
+          <a:p>
+            <a:pPr marL="285750" indent="-285750">
+              <a:buFont typeface="Arial" panose="020B0604020202020204" pitchFamily="34" charset="0"/>
+              <a:buChar char="•"/>
+            </a:pPr>
+            <a:r>
+              <a:rPr lang="en-US" dirty="0"/>
+              <a:t>Vast majority of scores are neutral</a:t>
             </a:r>
           </a:p>
           <a:p>
@@ -971,7 +932,7 @@
           <a:p>
             <a:fld id="{1F88B8BE-972A-4AD0-BD0D-E769440C7A47}" type="slidenum">
               <a:rPr lang="en-US" smtClean="0"/>
-              <a:t>8</a:t>
+              <a:t>5</a:t>
             </a:fld>
             <a:endParaRPr lang="en-US"/>
           </a:p>
@@ -980,7 +941,7 @@
     </p:spTree>
     <p:extLst>
       <p:ext uri="{BB962C8B-B14F-4D97-AF65-F5344CB8AC3E}">
-        <p14:creationId xmlns:p14="http://schemas.microsoft.com/office/powerpoint/2010/main" val="3845021542"/>
+        <p14:creationId xmlns:p14="http://schemas.microsoft.com/office/powerpoint/2010/main" val="1565545879"/>
       </p:ext>
     </p:extLst>
   </p:cSld>
@@ -1034,6 +995,197 @@
           <a:bodyPr/>
           <a:lstStyle/>
           <a:p>
+            <a:endParaRPr lang="en-US" dirty="0"/>
+          </a:p>
+        </p:txBody>
+      </p:sp>
+      <p:sp>
+        <p:nvSpPr>
+          <p:cNvPr id="4" name="Slide Number Placeholder 3"/>
+          <p:cNvSpPr>
+            <a:spLocks noGrp="1"/>
+          </p:cNvSpPr>
+          <p:nvPr>
+            <p:ph type="sldNum" sz="quarter" idx="5"/>
+          </p:nvPr>
+        </p:nvSpPr>
+        <p:spPr/>
+        <p:txBody>
+          <a:bodyPr/>
+          <a:lstStyle/>
+          <a:p>
+            <a:fld id="{1F88B8BE-972A-4AD0-BD0D-E769440C7A47}" type="slidenum">
+              <a:rPr lang="en-US" smtClean="0"/>
+              <a:t>6</a:t>
+            </a:fld>
+            <a:endParaRPr lang="en-US"/>
+          </a:p>
+        </p:txBody>
+      </p:sp>
+    </p:spTree>
+    <p:extLst>
+      <p:ext uri="{BB962C8B-B14F-4D97-AF65-F5344CB8AC3E}">
+        <p14:creationId xmlns:p14="http://schemas.microsoft.com/office/powerpoint/2010/main" val="1538445594"/>
+      </p:ext>
+    </p:extLst>
+  </p:cSld>
+  <p:clrMapOvr>
+    <a:masterClrMapping/>
+  </p:clrMapOvr>
+</p:notes>
+</file>
+
+<file path=ppt/notesSlides/notesSlide5.xml><?xml version="1.0" encoding="utf-8"?>
+<p:notes xmlns:a="http://schemas.openxmlformats.org/drawingml/2006/main" xmlns:r="http://schemas.openxmlformats.org/officeDocument/2006/relationships" xmlns:p="http://schemas.openxmlformats.org/presentationml/2006/main">
+  <p:cSld>
+    <p:spTree>
+      <p:nvGrpSpPr>
+        <p:cNvPr id="1" name=""/>
+        <p:cNvGrpSpPr/>
+        <p:nvPr/>
+      </p:nvGrpSpPr>
+      <p:grpSpPr>
+        <a:xfrm>
+          <a:off x="0" y="0"/>
+          <a:ext cx="0" cy="0"/>
+          <a:chOff x="0" y="0"/>
+          <a:chExt cx="0" cy="0"/>
+        </a:xfrm>
+      </p:grpSpPr>
+      <p:sp>
+        <p:nvSpPr>
+          <p:cNvPr id="2" name="Slide Image Placeholder 1"/>
+          <p:cNvSpPr>
+            <a:spLocks noGrp="1" noRot="1" noChangeAspect="1"/>
+          </p:cNvSpPr>
+          <p:nvPr>
+            <p:ph type="sldImg"/>
+          </p:nvPr>
+        </p:nvSpPr>
+        <p:spPr/>
+      </p:sp>
+      <p:sp>
+        <p:nvSpPr>
+          <p:cNvPr id="3" name="Notes Placeholder 2"/>
+          <p:cNvSpPr>
+            <a:spLocks noGrp="1"/>
+          </p:cNvSpPr>
+          <p:nvPr>
+            <p:ph type="body" idx="1"/>
+          </p:nvPr>
+        </p:nvSpPr>
+        <p:spPr/>
+        <p:txBody>
+          <a:bodyPr/>
+          <a:lstStyle/>
+          <a:p>
+            <a:pPr marL="0" marR="0" lvl="0" indent="0" algn="l" defTabSz="914400" rtl="0" eaLnBrk="1" fontAlgn="auto" latinLnBrk="0" hangingPunct="1">
+              <a:lnSpc>
+                <a:spcPct val="100000"/>
+              </a:lnSpc>
+              <a:spcBef>
+                <a:spcPts val="0"/>
+              </a:spcBef>
+              <a:spcAft>
+                <a:spcPts val="0"/>
+              </a:spcAft>
+              <a:buClrTx/>
+              <a:buSzTx/>
+              <a:buFontTx/>
+              <a:buNone/>
+              <a:tabLst/>
+              <a:defRPr/>
+            </a:pPr>
+            <a:r>
+              <a:rPr lang="en-US" dirty="0"/>
+              <a:t>Top word used in positive/negative headlines</a:t>
+            </a:r>
+          </a:p>
+          <a:p>
+            <a:endParaRPr lang="en-US" dirty="0"/>
+          </a:p>
+        </p:txBody>
+      </p:sp>
+      <p:sp>
+        <p:nvSpPr>
+          <p:cNvPr id="4" name="Slide Number Placeholder 3"/>
+          <p:cNvSpPr>
+            <a:spLocks noGrp="1"/>
+          </p:cNvSpPr>
+          <p:nvPr>
+            <p:ph type="sldNum" sz="quarter" idx="5"/>
+          </p:nvPr>
+        </p:nvSpPr>
+        <p:spPr/>
+        <p:txBody>
+          <a:bodyPr/>
+          <a:lstStyle/>
+          <a:p>
+            <a:fld id="{1F88B8BE-972A-4AD0-BD0D-E769440C7A47}" type="slidenum">
+              <a:rPr lang="en-US" smtClean="0"/>
+              <a:t>7</a:t>
+            </a:fld>
+            <a:endParaRPr lang="en-US"/>
+          </a:p>
+        </p:txBody>
+      </p:sp>
+    </p:spTree>
+    <p:extLst>
+      <p:ext uri="{BB962C8B-B14F-4D97-AF65-F5344CB8AC3E}">
+        <p14:creationId xmlns:p14="http://schemas.microsoft.com/office/powerpoint/2010/main" val="3845021542"/>
+      </p:ext>
+    </p:extLst>
+  </p:cSld>
+  <p:clrMapOvr>
+    <a:masterClrMapping/>
+  </p:clrMapOvr>
+</p:notes>
+</file>
+
+<file path=ppt/notesSlides/notesSlide6.xml><?xml version="1.0" encoding="utf-8"?>
+<p:notes xmlns:a="http://schemas.openxmlformats.org/drawingml/2006/main" xmlns:r="http://schemas.openxmlformats.org/officeDocument/2006/relationships" xmlns:p="http://schemas.openxmlformats.org/presentationml/2006/main">
+  <p:cSld>
+    <p:spTree>
+      <p:nvGrpSpPr>
+        <p:cNvPr id="1" name=""/>
+        <p:cNvGrpSpPr/>
+        <p:nvPr/>
+      </p:nvGrpSpPr>
+      <p:grpSpPr>
+        <a:xfrm>
+          <a:off x="0" y="0"/>
+          <a:ext cx="0" cy="0"/>
+          <a:chOff x="0" y="0"/>
+          <a:chExt cx="0" cy="0"/>
+        </a:xfrm>
+      </p:grpSpPr>
+      <p:sp>
+        <p:nvSpPr>
+          <p:cNvPr id="2" name="Slide Image Placeholder 1"/>
+          <p:cNvSpPr>
+            <a:spLocks noGrp="1" noRot="1" noChangeAspect="1"/>
+          </p:cNvSpPr>
+          <p:nvPr>
+            <p:ph type="sldImg"/>
+          </p:nvPr>
+        </p:nvSpPr>
+        <p:spPr/>
+      </p:sp>
+      <p:sp>
+        <p:nvSpPr>
+          <p:cNvPr id="3" name="Notes Placeholder 2"/>
+          <p:cNvSpPr>
+            <a:spLocks noGrp="1"/>
+          </p:cNvSpPr>
+          <p:nvPr>
+            <p:ph type="body" idx="1"/>
+          </p:nvPr>
+        </p:nvSpPr>
+        <p:spPr/>
+        <p:txBody>
+          <a:bodyPr/>
+          <a:lstStyle/>
+          <a:p>
             <a:r>
               <a:rPr lang="en-US" dirty="0"/>
               <a:t>Challenges</a:t>
@@ -1062,6 +1214,96 @@
             </a:r>
             <a:endParaRPr lang="en-US" dirty="0"/>
           </a:p>
+          <a:p>
+            <a:r>
+              <a:rPr lang="en-US" dirty="0"/>
+              <a:t>Use the political bias data in future analysis </a:t>
+            </a:r>
+          </a:p>
+          <a:p>
+            <a:endParaRPr lang="en-US" dirty="0"/>
+          </a:p>
+        </p:txBody>
+      </p:sp>
+      <p:sp>
+        <p:nvSpPr>
+          <p:cNvPr id="4" name="Slide Number Placeholder 3"/>
+          <p:cNvSpPr>
+            <a:spLocks noGrp="1"/>
+          </p:cNvSpPr>
+          <p:nvPr>
+            <p:ph type="sldNum" sz="quarter" idx="5"/>
+          </p:nvPr>
+        </p:nvSpPr>
+        <p:spPr/>
+        <p:txBody>
+          <a:bodyPr/>
+          <a:lstStyle/>
+          <a:p>
+            <a:fld id="{1F88B8BE-972A-4AD0-BD0D-E769440C7A47}" type="slidenum">
+              <a:rPr lang="en-US" smtClean="0"/>
+              <a:t>9</a:t>
+            </a:fld>
+            <a:endParaRPr lang="en-US"/>
+          </a:p>
+        </p:txBody>
+      </p:sp>
+    </p:spTree>
+    <p:extLst>
+      <p:ext uri="{BB962C8B-B14F-4D97-AF65-F5344CB8AC3E}">
+        <p14:creationId xmlns:p14="http://schemas.microsoft.com/office/powerpoint/2010/main" val="858953395"/>
+      </p:ext>
+    </p:extLst>
+  </p:cSld>
+  <p:clrMapOvr>
+    <a:masterClrMapping/>
+  </p:clrMapOvr>
+</p:notes>
+</file>
+
+<file path=ppt/notesSlides/notesSlide7.xml><?xml version="1.0" encoding="utf-8"?>
+<p:notes xmlns:a="http://schemas.openxmlformats.org/drawingml/2006/main" xmlns:r="http://schemas.openxmlformats.org/officeDocument/2006/relationships" xmlns:p="http://schemas.openxmlformats.org/presentationml/2006/main">
+  <p:cSld>
+    <p:spTree>
+      <p:nvGrpSpPr>
+        <p:cNvPr id="1" name=""/>
+        <p:cNvGrpSpPr/>
+        <p:nvPr/>
+      </p:nvGrpSpPr>
+      <p:grpSpPr>
+        <a:xfrm>
+          <a:off x="0" y="0"/>
+          <a:ext cx="0" cy="0"/>
+          <a:chOff x="0" y="0"/>
+          <a:chExt cx="0" cy="0"/>
+        </a:xfrm>
+      </p:grpSpPr>
+      <p:sp>
+        <p:nvSpPr>
+          <p:cNvPr id="2" name="Slide Image Placeholder 1"/>
+          <p:cNvSpPr>
+            <a:spLocks noGrp="1" noRot="1" noChangeAspect="1"/>
+          </p:cNvSpPr>
+          <p:nvPr>
+            <p:ph type="sldImg"/>
+          </p:nvPr>
+        </p:nvSpPr>
+        <p:spPr/>
+      </p:sp>
+      <p:sp>
+        <p:nvSpPr>
+          <p:cNvPr id="3" name="Notes Placeholder 2"/>
+          <p:cNvSpPr>
+            <a:spLocks noGrp="1"/>
+          </p:cNvSpPr>
+          <p:nvPr>
+            <p:ph type="body" idx="1"/>
+          </p:nvPr>
+        </p:nvSpPr>
+        <p:spPr/>
+        <p:txBody>
+          <a:bodyPr/>
+          <a:lstStyle/>
           <a:p>
             <a:endParaRPr lang="en-US" dirty="0"/>
           </a:p>
@@ -1093,7 +1335,91 @@
     </p:spTree>
     <p:extLst>
       <p:ext uri="{BB962C8B-B14F-4D97-AF65-F5344CB8AC3E}">
-        <p14:creationId xmlns:p14="http://schemas.microsoft.com/office/powerpoint/2010/main" val="858953395"/>
+        <p14:creationId xmlns:p14="http://schemas.microsoft.com/office/powerpoint/2010/main" val="2176458753"/>
+      </p:ext>
+    </p:extLst>
+  </p:cSld>
+  <p:clrMapOvr>
+    <a:masterClrMapping/>
+  </p:clrMapOvr>
+</p:notes>
+</file>
+
+<file path=ppt/notesSlides/notesSlide8.xml><?xml version="1.0" encoding="utf-8"?>
+<p:notes xmlns:a="http://schemas.openxmlformats.org/drawingml/2006/main" xmlns:r="http://schemas.openxmlformats.org/officeDocument/2006/relationships" xmlns:p="http://schemas.openxmlformats.org/presentationml/2006/main">
+  <p:cSld>
+    <p:spTree>
+      <p:nvGrpSpPr>
+        <p:cNvPr id="1" name=""/>
+        <p:cNvGrpSpPr/>
+        <p:nvPr/>
+      </p:nvGrpSpPr>
+      <p:grpSpPr>
+        <a:xfrm>
+          <a:off x="0" y="0"/>
+          <a:ext cx="0" cy="0"/>
+          <a:chOff x="0" y="0"/>
+          <a:chExt cx="0" cy="0"/>
+        </a:xfrm>
+      </p:grpSpPr>
+      <p:sp>
+        <p:nvSpPr>
+          <p:cNvPr id="2" name="Slide Image Placeholder 1"/>
+          <p:cNvSpPr>
+            <a:spLocks noGrp="1" noRot="1" noChangeAspect="1"/>
+          </p:cNvSpPr>
+          <p:nvPr>
+            <p:ph type="sldImg"/>
+          </p:nvPr>
+        </p:nvSpPr>
+        <p:spPr/>
+      </p:sp>
+      <p:sp>
+        <p:nvSpPr>
+          <p:cNvPr id="3" name="Notes Placeholder 2"/>
+          <p:cNvSpPr>
+            <a:spLocks noGrp="1"/>
+          </p:cNvSpPr>
+          <p:nvPr>
+            <p:ph type="body" idx="1"/>
+          </p:nvPr>
+        </p:nvSpPr>
+        <p:spPr/>
+        <p:txBody>
+          <a:bodyPr/>
+          <a:lstStyle/>
+          <a:p>
+            <a:endParaRPr lang="en-US" dirty="0"/>
+          </a:p>
+        </p:txBody>
+      </p:sp>
+      <p:sp>
+        <p:nvSpPr>
+          <p:cNvPr id="4" name="Slide Number Placeholder 3"/>
+          <p:cNvSpPr>
+            <a:spLocks noGrp="1"/>
+          </p:cNvSpPr>
+          <p:nvPr>
+            <p:ph type="sldNum" sz="quarter" idx="5"/>
+          </p:nvPr>
+        </p:nvSpPr>
+        <p:spPr/>
+        <p:txBody>
+          <a:bodyPr/>
+          <a:lstStyle/>
+          <a:p>
+            <a:fld id="{1F88B8BE-972A-4AD0-BD0D-E769440C7A47}" type="slidenum">
+              <a:rPr lang="en-US" smtClean="0"/>
+              <a:t>11</a:t>
+            </a:fld>
+            <a:endParaRPr lang="en-US"/>
+          </a:p>
+        </p:txBody>
+      </p:sp>
+    </p:spTree>
+    <p:extLst>
+      <p:ext uri="{BB962C8B-B14F-4D97-AF65-F5344CB8AC3E}">
+        <p14:creationId xmlns:p14="http://schemas.microsoft.com/office/powerpoint/2010/main" val="2937014855"/>
       </p:ext>
     </p:extLst>
   </p:cSld>
@@ -4898,7 +5224,7 @@
           <a:p>
             <a:r>
               <a:rPr lang="en-US" sz="6000" dirty="0"/>
-              <a:t>Does tone really get lost in text</a:t>
+              <a:t>Does tone really get lost in text?</a:t>
             </a:r>
           </a:p>
         </p:txBody>
@@ -5003,7 +5329,7 @@
           <p:cNvPr id="2" name="Title 1">
             <a:extLst>
               <a:ext uri="{FF2B5EF4-FFF2-40B4-BE49-F238E27FC236}">
-                <a16:creationId xmlns:a16="http://schemas.microsoft.com/office/drawing/2014/main" id="{6E1DFE7F-8996-4432-B0B9-1278B1C45367}"/>
+                <a16:creationId xmlns:a16="http://schemas.microsoft.com/office/drawing/2014/main" id="{E20174FA-16C5-43C9-B4DA-D902B11BEA0D}"/>
               </a:ext>
             </a:extLst>
           </p:cNvPr>
@@ -5020,8 +5346,14 @@
           <a:lstStyle/>
           <a:p>
             <a:r>
-              <a:rPr lang="en-US" dirty="0"/>
-              <a:t>Key takeaways</a:t>
+              <a:rPr lang="en-US" sz="4400" b="0" i="0" u="none" strike="noStrike" dirty="0">
+                <a:solidFill>
+                  <a:srgbClr val="000000"/>
+                </a:solidFill>
+                <a:effectLst/>
+                <a:latin typeface="Calibri" panose="020F0502020204030204" pitchFamily="34" charset="0"/>
+              </a:rPr>
+              <a:t>Can you guess the sentiment of these titles?</a:t>
             </a:r>
           </a:p>
         </p:txBody>
@@ -5031,7 +5363,7 @@
           <p:cNvPr id="3" name="Content Placeholder 2">
             <a:extLst>
               <a:ext uri="{FF2B5EF4-FFF2-40B4-BE49-F238E27FC236}">
-                <a16:creationId xmlns:a16="http://schemas.microsoft.com/office/drawing/2014/main" id="{62650EB6-537B-41B0-BD21-36EDF3512704}"/>
+                <a16:creationId xmlns:a16="http://schemas.microsoft.com/office/drawing/2014/main" id="{E204FD48-AC00-4B41-B29D-5034C1DD8238}"/>
               </a:ext>
             </a:extLst>
           </p:cNvPr>
@@ -5044,127 +5376,81 @@
         </p:nvSpPr>
         <p:spPr/>
         <p:txBody>
-          <a:bodyPr>
-            <a:normAutofit fontScale="70000" lnSpcReduction="20000"/>
-          </a:bodyPr>
+          <a:bodyPr/>
           <a:lstStyle/>
           <a:p>
-            <a:r>
-              <a:rPr lang="en-US" dirty="0"/>
-              <a:t>Key findings</a:t>
-            </a:r>
-          </a:p>
-          <a:p>
-            <a:pPr lvl="1"/>
-            <a:r>
-              <a:rPr lang="en-US" dirty="0" err="1"/>
-              <a:t>Britebart</a:t>
-            </a:r>
-            <a:r>
-              <a:rPr lang="en-US" dirty="0"/>
-              <a:t>/</a:t>
-            </a:r>
-            <a:r>
-              <a:rPr lang="en-US" dirty="0" err="1"/>
-              <a:t>Aljezera</a:t>
-            </a:r>
-            <a:r>
-              <a:rPr lang="en-US" dirty="0"/>
-              <a:t> seem to use most extreme language</a:t>
-            </a:r>
-          </a:p>
-          <a:p>
-            <a:pPr lvl="2"/>
-            <a:r>
-              <a:rPr lang="en-US" dirty="0"/>
-              <a:t>Seem to be writing for a specific population of readers</a:t>
-            </a:r>
-          </a:p>
-          <a:p>
-            <a:pPr lvl="1"/>
-            <a:r>
-              <a:rPr lang="en-US" dirty="0"/>
-              <a:t>Negative/Positive headlines seem to have different topics with some overlap</a:t>
-            </a:r>
-          </a:p>
-          <a:p>
-            <a:pPr lvl="2"/>
-            <a:r>
-              <a:rPr lang="en-US" dirty="0"/>
-              <a:t>Topics seem to change over time based on current events</a:t>
-            </a:r>
-          </a:p>
-          <a:p>
-            <a:r>
-              <a:rPr lang="en-US" dirty="0"/>
-              <a:t>Challenges</a:t>
-            </a:r>
-          </a:p>
-          <a:p>
-            <a:pPr lvl="1"/>
-            <a:r>
-              <a:rPr lang="en-US" dirty="0"/>
-              <a:t>Sentiment scoring is not customized – NLTK Vader was trained on social media</a:t>
-            </a:r>
-          </a:p>
-          <a:p>
-            <a:pPr lvl="1"/>
-            <a:r>
-              <a:rPr lang="en-US" dirty="0" err="1"/>
-              <a:t>NewsAPI</a:t>
-            </a:r>
-            <a:r>
-              <a:rPr lang="en-US" dirty="0"/>
-              <a:t> limits access to sources</a:t>
-            </a:r>
-          </a:p>
-          <a:p>
-            <a:r>
-              <a:rPr lang="en-US" dirty="0"/>
-              <a:t>Additional questions to be asked if had more time/resources</a:t>
-            </a:r>
-          </a:p>
-          <a:p>
-            <a:pPr lvl="1"/>
-            <a:r>
-              <a:rPr lang="en-US" dirty="0"/>
-              <a:t>Emotional analysis – what’s behind the extremity of the language used</a:t>
-            </a:r>
-          </a:p>
-          <a:p>
-            <a:pPr lvl="1"/>
-            <a:r>
-              <a:rPr lang="en-US" dirty="0"/>
-              <a:t>Look at body of the articles instead of headline</a:t>
-            </a:r>
-          </a:p>
-          <a:p>
-            <a:pPr lvl="1"/>
-            <a:r>
-              <a:rPr lang="en-US" dirty="0"/>
-              <a:t>Looking more into differences in publishers and authors</a:t>
-            </a:r>
-          </a:p>
-          <a:p>
-            <a:pPr lvl="1"/>
-            <a:r>
-              <a:rPr lang="en-US" dirty="0"/>
-              <a:t>Customizing the sentiment analysis</a:t>
-            </a:r>
-          </a:p>
-          <a:p>
-            <a:pPr lvl="1"/>
-            <a:r>
-              <a:rPr lang="en-US" dirty="0"/>
-              <a:t>Add to dataset monthly to observe impact of current events</a:t>
-            </a:r>
+            <a:pPr marL="285750" indent="-285750">
+              <a:buFont typeface="Arial" panose="020B0604020202020204" pitchFamily="34" charset="0"/>
+              <a:buChar char="•"/>
+            </a:pPr>
+            <a:r>
+              <a:rPr lang="en-US" sz="2000" b="0" i="0" u="none" strike="noStrike" dirty="0">
+                <a:solidFill>
+                  <a:srgbClr val="000000"/>
+                </a:solidFill>
+                <a:effectLst/>
+                <a:latin typeface="Calibri" panose="020F0502020204030204" pitchFamily="34" charset="0"/>
+              </a:rPr>
+              <a:t>Bader Ginsburg, Supreme Court justice and legal pioneer for gender equality, dies at 87</a:t>
+            </a:r>
+            <a:r>
+              <a:rPr lang="en-US" sz="2000" dirty="0"/>
+              <a:t> </a:t>
+            </a:r>
+          </a:p>
+          <a:p>
+            <a:pPr marL="285750" indent="-285750">
+              <a:buFont typeface="Arial" panose="020B0604020202020204" pitchFamily="34" charset="0"/>
+              <a:buChar char="•"/>
+            </a:pPr>
+            <a:endParaRPr lang="en-US" sz="2000" dirty="0"/>
+          </a:p>
+          <a:p>
+            <a:pPr marL="285750" indent="-285750">
+              <a:buFont typeface="Arial" panose="020B0604020202020204" pitchFamily="34" charset="0"/>
+              <a:buChar char="•"/>
+            </a:pPr>
+            <a:r>
+              <a:rPr lang="en-US" sz="2000" b="0" i="0" u="none" strike="noStrike" dirty="0">
+                <a:solidFill>
+                  <a:srgbClr val="000000"/>
+                </a:solidFill>
+                <a:effectLst/>
+                <a:latin typeface="Calibri" panose="020F0502020204030204" pitchFamily="34" charset="0"/>
+              </a:rPr>
+              <a:t>Mackenzie </a:t>
+            </a:r>
+            <a:r>
+              <a:rPr lang="en-US" sz="2000" b="0" i="0" u="none" strike="noStrike" dirty="0" err="1">
+                <a:solidFill>
+                  <a:srgbClr val="000000"/>
+                </a:solidFill>
+                <a:effectLst/>
+                <a:latin typeface="Calibri" panose="020F0502020204030204" pitchFamily="34" charset="0"/>
+              </a:rPr>
+              <a:t>Lueck’s</a:t>
+            </a:r>
+            <a:r>
+              <a:rPr lang="en-US" sz="2000" b="0" i="0" u="none" strike="noStrike" dirty="0">
+                <a:solidFill>
+                  <a:srgbClr val="000000"/>
+                </a:solidFill>
+                <a:effectLst/>
+                <a:latin typeface="Calibri" panose="020F0502020204030204" pitchFamily="34" charset="0"/>
+              </a:rPr>
+              <a:t> killer pleads guilty to aggravated murder, will avoid death penalty</a:t>
+            </a:r>
+            <a:endParaRPr lang="en-US" sz="2000" dirty="0"/>
+          </a:p>
+          <a:p>
+            <a:endParaRPr lang="en-US" dirty="0"/>
           </a:p>
         </p:txBody>
       </p:sp>
     </p:spTree>
     <p:extLst>
       <p:ext uri="{BB962C8B-B14F-4D97-AF65-F5344CB8AC3E}">
-        <p14:creationId xmlns:p14="http://schemas.microsoft.com/office/powerpoint/2010/main" val="1865033548"/>
+        <p14:creationId xmlns:p14="http://schemas.microsoft.com/office/powerpoint/2010/main" val="3946897848"/>
       </p:ext>
     </p:extLst>
   </p:cSld>
@@ -5193,10 +5479,10 @@
       </p:grpSpPr>
       <p:sp>
         <p:nvSpPr>
-          <p:cNvPr id="4" name="Title 3">
+          <p:cNvPr id="2" name="Title 1">
             <a:extLst>
               <a:ext uri="{FF2B5EF4-FFF2-40B4-BE49-F238E27FC236}">
-                <a16:creationId xmlns:a16="http://schemas.microsoft.com/office/drawing/2014/main" id="{57BA24D8-4846-4CBC-89B0-82F29721185A}"/>
+                <a16:creationId xmlns:a16="http://schemas.microsoft.com/office/drawing/2014/main" id="{E20174FA-16C5-43C9-B4DA-D902B11BEA0D}"/>
               </a:ext>
             </a:extLst>
           </p:cNvPr>
@@ -5204,7 +5490,7 @@
             <a:spLocks noGrp="1"/>
           </p:cNvSpPr>
           <p:nvPr>
-            <p:ph type="ctrTitle"/>
+            <p:ph type="title"/>
           </p:nvPr>
         </p:nvSpPr>
         <p:spPr/>
@@ -5213,18 +5499,24 @@
           <a:lstStyle/>
           <a:p>
             <a:r>
-              <a:rPr lang="en-US" dirty="0"/>
-              <a:t>appendix</a:t>
-            </a:r>
-          </a:p>
-        </p:txBody>
-      </p:sp>
-      <p:sp>
-        <p:nvSpPr>
-          <p:cNvPr id="5" name="Subtitle 4">
+              <a:rPr lang="en-US" sz="4400" b="0" i="0" u="none" strike="noStrike" dirty="0">
+                <a:solidFill>
+                  <a:srgbClr val="000000"/>
+                </a:solidFill>
+                <a:effectLst/>
+                <a:latin typeface="Calibri" panose="020F0502020204030204" pitchFamily="34" charset="0"/>
+              </a:rPr>
+              <a:t>Can you guess the sentiment of these titles?</a:t>
+            </a:r>
+          </a:p>
+        </p:txBody>
+      </p:sp>
+      <p:sp>
+        <p:nvSpPr>
+          <p:cNvPr id="3" name="Content Placeholder 2">
             <a:extLst>
               <a:ext uri="{FF2B5EF4-FFF2-40B4-BE49-F238E27FC236}">
-                <a16:creationId xmlns:a16="http://schemas.microsoft.com/office/drawing/2014/main" id="{909BEE3E-3CC4-4B3D-B5AF-528107D32272}"/>
+                <a16:creationId xmlns:a16="http://schemas.microsoft.com/office/drawing/2014/main" id="{E204FD48-AC00-4B41-B29D-5034C1DD8238}"/>
               </a:ext>
             </a:extLst>
           </p:cNvPr>
@@ -5232,7 +5524,7 @@
             <a:spLocks noGrp="1"/>
           </p:cNvSpPr>
           <p:nvPr>
-            <p:ph type="subTitle" idx="1"/>
+            <p:ph idx="1"/>
           </p:nvPr>
         </p:nvSpPr>
         <p:spPr/>
@@ -5240,14 +5532,87 @@
           <a:bodyPr/>
           <a:lstStyle/>
           <a:p>
-            <a:endParaRPr lang="en-US"/>
+            <a:pPr marL="285750" indent="-285750">
+              <a:buFont typeface="Arial" panose="020B0604020202020204" pitchFamily="34" charset="0"/>
+              <a:buChar char="•"/>
+            </a:pPr>
+            <a:r>
+              <a:rPr lang="en-US" sz="2000" b="0" i="0" u="none" strike="noStrike" dirty="0">
+                <a:solidFill>
+                  <a:srgbClr val="000000"/>
+                </a:solidFill>
+                <a:effectLst/>
+                <a:latin typeface="Calibri" panose="020F0502020204030204" pitchFamily="34" charset="0"/>
+              </a:rPr>
+              <a:t>Bader Ginsburg, Supreme Court justice and legal pioneer for gender equality, dies at 87</a:t>
+            </a:r>
+            <a:r>
+              <a:rPr lang="en-US" sz="2000" dirty="0"/>
+              <a:t> </a:t>
+            </a:r>
+          </a:p>
+          <a:p>
+            <a:pPr marL="816102" lvl="1" indent="-285750">
+              <a:buFont typeface="Arial" panose="020B0604020202020204" pitchFamily="34" charset="0"/>
+              <a:buChar char="•"/>
+            </a:pPr>
+            <a:r>
+              <a:rPr lang="en-US" dirty="0"/>
+              <a:t>The Washington Post, Score: .81</a:t>
+            </a:r>
+          </a:p>
+          <a:p>
+            <a:pPr marL="285750" indent="-285750">
+              <a:buFont typeface="Arial" panose="020B0604020202020204" pitchFamily="34" charset="0"/>
+              <a:buChar char="•"/>
+            </a:pPr>
+            <a:r>
+              <a:rPr lang="en-US" sz="2000" b="0" i="0" u="none" strike="noStrike" dirty="0">
+                <a:solidFill>
+                  <a:srgbClr val="000000"/>
+                </a:solidFill>
+                <a:effectLst/>
+                <a:latin typeface="Calibri" panose="020F0502020204030204" pitchFamily="34" charset="0"/>
+              </a:rPr>
+              <a:t>Mackenzie </a:t>
+            </a:r>
+            <a:r>
+              <a:rPr lang="en-US" sz="2000" b="0" i="0" u="none" strike="noStrike" dirty="0" err="1">
+                <a:solidFill>
+                  <a:srgbClr val="000000"/>
+                </a:solidFill>
+                <a:effectLst/>
+                <a:latin typeface="Calibri" panose="020F0502020204030204" pitchFamily="34" charset="0"/>
+              </a:rPr>
+              <a:t>Lueck’s</a:t>
+            </a:r>
+            <a:r>
+              <a:rPr lang="en-US" sz="2000" b="0" i="0" u="none" strike="noStrike" dirty="0">
+                <a:solidFill>
+                  <a:srgbClr val="000000"/>
+                </a:solidFill>
+                <a:effectLst/>
+                <a:latin typeface="Calibri" panose="020F0502020204030204" pitchFamily="34" charset="0"/>
+              </a:rPr>
+              <a:t> killer pleads guilty to aggravated murder, will avoid death penalty</a:t>
+            </a:r>
+          </a:p>
+          <a:p>
+            <a:pPr marL="816102" lvl="1" indent="-285750">
+              <a:buFont typeface="Arial" panose="020B0604020202020204" pitchFamily="34" charset="0"/>
+              <a:buChar char="•"/>
+            </a:pPr>
+            <a:r>
+              <a:rPr lang="en-US" dirty="0"/>
+              <a:t>Fox News, Score: -.97</a:t>
+            </a:r>
           </a:p>
         </p:txBody>
       </p:sp>
     </p:spTree>
     <p:extLst>
       <p:ext uri="{BB962C8B-B14F-4D97-AF65-F5344CB8AC3E}">
-        <p14:creationId xmlns:p14="http://schemas.microsoft.com/office/powerpoint/2010/main" val="2873799757"/>
+        <p14:creationId xmlns:p14="http://schemas.microsoft.com/office/powerpoint/2010/main" val="1157366014"/>
       </p:ext>
     </p:extLst>
   </p:cSld>
@@ -5276,10 +5641,10 @@
       </p:grpSpPr>
       <p:sp>
         <p:nvSpPr>
-          <p:cNvPr id="2" name="Title 1">
+          <p:cNvPr id="4" name="Title 3">
             <a:extLst>
               <a:ext uri="{FF2B5EF4-FFF2-40B4-BE49-F238E27FC236}">
-                <a16:creationId xmlns:a16="http://schemas.microsoft.com/office/drawing/2014/main" id="{6E1DFE7F-8996-4432-B0B9-1278B1C45367}"/>
+                <a16:creationId xmlns:a16="http://schemas.microsoft.com/office/drawing/2014/main" id="{57BA24D8-4846-4CBC-89B0-82F29721185A}"/>
               </a:ext>
             </a:extLst>
           </p:cNvPr>
@@ -5287,7 +5652,7 @@
             <a:spLocks noGrp="1"/>
           </p:cNvSpPr>
           <p:nvPr>
-            <p:ph type="title"/>
+            <p:ph type="ctrTitle"/>
           </p:nvPr>
         </p:nvSpPr>
         <p:spPr/>
@@ -5297,17 +5662,17 @@
           <a:p>
             <a:r>
               <a:rPr lang="en-US" dirty="0"/>
-              <a:t>References </a:t>
-            </a:r>
-          </a:p>
-        </p:txBody>
-      </p:sp>
-      <p:sp>
-        <p:nvSpPr>
-          <p:cNvPr id="7" name="Content Placeholder 6">
+              <a:t>appendix</a:t>
+            </a:r>
+          </a:p>
+        </p:txBody>
+      </p:sp>
+      <p:sp>
+        <p:nvSpPr>
+          <p:cNvPr id="5" name="Subtitle 4">
             <a:extLst>
               <a:ext uri="{FF2B5EF4-FFF2-40B4-BE49-F238E27FC236}">
-                <a16:creationId xmlns:a16="http://schemas.microsoft.com/office/drawing/2014/main" id="{3C8A78CA-CB3A-4F5A-8CC6-03FD0D5CEADB}"/>
+                <a16:creationId xmlns:a16="http://schemas.microsoft.com/office/drawing/2014/main" id="{909BEE3E-3CC4-4B3D-B5AF-528107D32272}"/>
               </a:ext>
             </a:extLst>
           </p:cNvPr>
@@ -5315,7 +5680,7 @@
             <a:spLocks noGrp="1"/>
           </p:cNvSpPr>
           <p:nvPr>
-            <p:ph idx="1"/>
+            <p:ph type="subTitle" idx="1"/>
           </p:nvPr>
         </p:nvSpPr>
         <p:spPr/>
@@ -5323,56 +5688,14 @@
           <a:bodyPr/>
           <a:lstStyle/>
           <a:p>
-            <a:r>
-              <a:rPr lang="en-US" dirty="0"/>
-              <a:t>News headlines in English published in the US</a:t>
-            </a:r>
-          </a:p>
-          <a:p>
-            <a:r>
-              <a:rPr lang="en-US" dirty="0" err="1"/>
-              <a:t>NewsAPI</a:t>
-            </a:r>
-            <a:r>
-              <a:rPr lang="en-US" dirty="0"/>
-              <a:t> - author, title, domain, </a:t>
-            </a:r>
-            <a:r>
-              <a:rPr lang="en-US" dirty="0" err="1"/>
-              <a:t>url</a:t>
-            </a:r>
-            <a:r>
-              <a:rPr lang="en-US" dirty="0"/>
-              <a:t>, headline, first 200 words</a:t>
-            </a:r>
-            <a:br>
-              <a:rPr lang="en-US" dirty="0"/>
-            </a:br>
-            <a:r>
-              <a:rPr lang="en-US" dirty="0"/>
-              <a:t>https://newsapi.org/ </a:t>
-            </a:r>
-          </a:p>
-          <a:p>
-            <a:r>
-              <a:rPr lang="en-US" dirty="0"/>
-              <a:t>Conservative/Liberal Bias of </a:t>
-            </a:r>
-            <a:r>
-              <a:rPr lang="en-US" dirty="0" err="1"/>
-              <a:t>NewsPapers</a:t>
-            </a:r>
-            <a:r>
-              <a:rPr lang="en-US" dirty="0"/>
-              <a:t> https://www.journalism.org/2014/10/21/political-polarization-media-habits/ </a:t>
-            </a:r>
+            <a:endParaRPr lang="en-US"/>
           </a:p>
         </p:txBody>
       </p:sp>
     </p:spTree>
     <p:extLst>
       <p:ext uri="{BB962C8B-B14F-4D97-AF65-F5344CB8AC3E}">
-        <p14:creationId xmlns:p14="http://schemas.microsoft.com/office/powerpoint/2010/main" val="1768583760"/>
+        <p14:creationId xmlns:p14="http://schemas.microsoft.com/office/powerpoint/2010/main" val="2873799757"/>
       </p:ext>
     </p:extLst>
   </p:cSld>
@@ -5422,7 +5745,132 @@
           <a:p>
             <a:r>
               <a:rPr lang="en-US" dirty="0"/>
-              <a:t>Interesting things found along the way</a:t>
+              <a:t>References </a:t>
+            </a:r>
+          </a:p>
+        </p:txBody>
+      </p:sp>
+      <p:sp>
+        <p:nvSpPr>
+          <p:cNvPr id="7" name="Content Placeholder 6">
+            <a:extLst>
+              <a:ext uri="{FF2B5EF4-FFF2-40B4-BE49-F238E27FC236}">
+                <a16:creationId xmlns:a16="http://schemas.microsoft.com/office/drawing/2014/main" id="{3C8A78CA-CB3A-4F5A-8CC6-03FD0D5CEADB}"/>
+              </a:ext>
+            </a:extLst>
+          </p:cNvPr>
+          <p:cNvSpPr>
+            <a:spLocks noGrp="1"/>
+          </p:cNvSpPr>
+          <p:nvPr>
+            <p:ph idx="1"/>
+          </p:nvPr>
+        </p:nvSpPr>
+        <p:spPr/>
+        <p:txBody>
+          <a:bodyPr/>
+          <a:lstStyle/>
+          <a:p>
+            <a:r>
+              <a:rPr lang="en-US" dirty="0"/>
+              <a:t>News headlines in English published in the US</a:t>
+            </a:r>
+          </a:p>
+          <a:p>
+            <a:r>
+              <a:rPr lang="en-US" dirty="0" err="1"/>
+              <a:t>NewsAPI</a:t>
+            </a:r>
+            <a:r>
+              <a:rPr lang="en-US" dirty="0"/>
+              <a:t> - author, title, domain, </a:t>
+            </a:r>
+            <a:r>
+              <a:rPr lang="en-US" dirty="0" err="1"/>
+              <a:t>url</a:t>
+            </a:r>
+            <a:r>
+              <a:rPr lang="en-US" dirty="0"/>
+              <a:t>, headline, first 200 words</a:t>
+            </a:r>
+            <a:br>
+              <a:rPr lang="en-US" dirty="0"/>
+            </a:br>
+            <a:r>
+              <a:rPr lang="en-US" dirty="0"/>
+              <a:t>https://newsapi.org/ </a:t>
+            </a:r>
+          </a:p>
+          <a:p>
+            <a:r>
+              <a:rPr lang="en-US" dirty="0"/>
+              <a:t>Conservative/Liberal Bias of </a:t>
+            </a:r>
+            <a:r>
+              <a:rPr lang="en-US" dirty="0" err="1"/>
+              <a:t>NewsPapers</a:t>
+            </a:r>
+            <a:r>
+              <a:rPr lang="en-US" dirty="0"/>
+              <a:t> https://www.journalism.org/2014/10/21/political-polarization-media-habits/ </a:t>
+            </a:r>
+          </a:p>
+        </p:txBody>
+      </p:sp>
+    </p:spTree>
+    <p:extLst>
+      <p:ext uri="{BB962C8B-B14F-4D97-AF65-F5344CB8AC3E}">
+        <p14:creationId xmlns:p14="http://schemas.microsoft.com/office/powerpoint/2010/main" val="1768583760"/>
+      </p:ext>
+    </p:extLst>
+  </p:cSld>
+  <p:clrMapOvr>
+    <a:masterClrMapping/>
+  </p:clrMapOvr>
+</p:sld>
+</file>
+
+<file path=ppt/slides/slide14.xml><?xml version="1.0" encoding="utf-8"?>
+<p:sld xmlns:a="http://schemas.openxmlformats.org/drawingml/2006/main" xmlns:r="http://schemas.openxmlformats.org/officeDocument/2006/relationships" xmlns:p="http://schemas.openxmlformats.org/presentationml/2006/main">
+  <p:cSld>
+    <p:spTree>
+      <p:nvGrpSpPr>
+        <p:cNvPr id="1" name=""/>
+        <p:cNvGrpSpPr/>
+        <p:nvPr/>
+      </p:nvGrpSpPr>
+      <p:grpSpPr>
+        <a:xfrm>
+          <a:off x="0" y="0"/>
+          <a:ext cx="0" cy="0"/>
+          <a:chOff x="0" y="0"/>
+          <a:chExt cx="0" cy="0"/>
+        </a:xfrm>
+      </p:grpSpPr>
+      <p:sp>
+        <p:nvSpPr>
+          <p:cNvPr id="2" name="Title 1">
+            <a:extLst>
+              <a:ext uri="{FF2B5EF4-FFF2-40B4-BE49-F238E27FC236}">
+                <a16:creationId xmlns:a16="http://schemas.microsoft.com/office/drawing/2014/main" id="{6E1DFE7F-8996-4432-B0B9-1278B1C45367}"/>
+              </a:ext>
+            </a:extLst>
+          </p:cNvPr>
+          <p:cNvSpPr>
+            <a:spLocks noGrp="1"/>
+          </p:cNvSpPr>
+          <p:nvPr>
+            <p:ph type="title"/>
+          </p:nvPr>
+        </p:nvSpPr>
+        <p:spPr/>
+        <p:txBody>
+          <a:bodyPr/>
+          <a:lstStyle/>
+          <a:p>
+            <a:r>
+              <a:rPr lang="en-US" dirty="0"/>
+              <a:t>Links</a:t>
             </a:r>
           </a:p>
         </p:txBody>
@@ -5556,7 +6004,7 @@
                 <a:effectLst/>
                 <a:latin typeface="Arial" panose="020B0604020202020204" pitchFamily="34" charset="0"/>
               </a:rPr>
-              <a:t>Evaluate the emotional strength of US news headlines in English by creating a database of </a:t>
+              <a:t>Evaluate the emotional strength of US English news headlines </a:t>
             </a:r>
             <a:r>
               <a:rPr lang="en-US" sz="1800" dirty="0">
@@ -5565,7 +6013,7 @@
                 </a:solidFill>
                 <a:latin typeface="Arial" panose="020B0604020202020204" pitchFamily="34" charset="0"/>
               </a:rPr>
-              <a:t>them </a:t>
+              <a:t>related to immigration </a:t>
             </a:r>
             <a:r>
               <a:rPr lang="en-US" sz="1800" b="0" i="0" u="none" strike="noStrike" dirty="0">
@@ -5575,17 +6023,14 @@
                 <a:effectLst/>
                 <a:latin typeface="Arial" panose="020B0604020202020204" pitchFamily="34" charset="0"/>
               </a:rPr>
-              <a:t>and use artificial intelligence (Vader by NLTK) to determine positive/negative sentiment</a:t>
-            </a:r>
-            <a:r>
-              <a:rPr lang="en-US" sz="1800" dirty="0">
-                <a:solidFill>
-                  <a:srgbClr val="000000"/>
-                </a:solidFill>
-                <a:latin typeface="Arial" panose="020B0604020202020204" pitchFamily="34" charset="0"/>
-              </a:rPr>
-              <a:t> of headlines relating to immigration.</a:t>
-            </a:r>
+              <a:t>using artificial intelligence (Vader by NLTK) to determine positive/negative emotion.</a:t>
+            </a:r>
+            <a:endParaRPr lang="en-US" sz="1800" dirty="0">
+              <a:solidFill>
+                <a:srgbClr val="000000"/>
+              </a:solidFill>
+              <a:latin typeface="Arial" panose="020B0604020202020204" pitchFamily="34" charset="0"/>
+            </a:endParaRPr>
           </a:p>
           <a:p>
             <a:pPr marL="0" indent="0" rtl="0">
@@ -5619,14 +6064,9 @@
               <a:rPr lang="en-US" b="0" dirty="0">
                 <a:effectLst/>
               </a:rPr>
-              <a:t>Research Questions to Answer(</a:t>
-            </a:r>
-            <a:r>
-              <a:rPr lang="en-US" b="1" dirty="0">
-                <a:effectLst/>
-              </a:rPr>
-              <a:t>needs updating)</a:t>
-            </a:r>
+              <a:t>Research Questions</a:t>
+            </a:r>
+            <a:endParaRPr lang="en-US" dirty="0"/>
           </a:p>
           <a:p>
             <a:pPr>
@@ -5657,23 +6097,17 @@
               <a:rPr lang="en-US" b="0" dirty="0">
                 <a:effectLst/>
               </a:rPr>
-              <a:t>Which topics are associated with negative or positive sentiment</a:t>
-            </a:r>
-          </a:p>
-          <a:p>
-            <a:pPr>
-              <a:spcBef>
-                <a:spcPts val="0"/>
-              </a:spcBef>
-              <a:spcAft>
-                <a:spcPts val="0"/>
-              </a:spcAft>
-            </a:pPr>
+              <a:t>Which </a:t>
+            </a:r>
+            <a:r>
+              <a:rPr lang="en-US" dirty="0"/>
+              <a:t>keywords </a:t>
+            </a:r>
             <a:r>
               <a:rPr lang="en-US" b="0" dirty="0">
                 <a:effectLst/>
               </a:rPr>
-              <a:t>What is the sentiment of conservative vs. liberal English newspaper headlines in the US? </a:t>
+              <a:t>are associated with negative or positive sentiment?</a:t>
             </a:r>
           </a:p>
         </p:txBody>
@@ -5853,7 +6287,7 @@
             </a:pPr>
             <a:r>
               <a:rPr lang="en-US" dirty="0"/>
-              <a:t>Perform sentiment analysis using NLTK’s Vader</a:t>
+              <a:t>Perform sentiment analysis of headlines using NLTK’s Vader</a:t>
             </a:r>
           </a:p>
           <a:p>
@@ -5881,7 +6315,7 @@
             </a:pPr>
             <a:r>
               <a:rPr lang="en-US" dirty="0"/>
-              <a:t>Perform keyword analysis</a:t>
+              <a:t>Perform keyword analysis using NLTK</a:t>
             </a:r>
           </a:p>
         </p:txBody>
@@ -5959,7 +6393,7 @@
         <p:spPr>
           <a:xfrm>
             <a:off x="7812741" y="1869141"/>
-            <a:ext cx="3470950" cy="923330"/>
+            <a:ext cx="3471976" cy="2031325"/>
           </a:xfrm>
           <a:prstGeom prst="rect">
             <a:avLst/>
@@ -5974,7 +6408,7 @@
           <a:p>
             <a:r>
               <a:rPr lang="en-US" dirty="0"/>
-              <a:t>Describe data set</a:t>
+              <a:t>Data set</a:t>
             </a:r>
           </a:p>
           <a:p>
@@ -5984,7 +6418,17 @@
             </a:pPr>
             <a:r>
               <a:rPr lang="en-US" dirty="0"/>
-              <a:t>Total number of data points</a:t>
+              <a:t>Total number of headlines</a:t>
+            </a:r>
+          </a:p>
+          <a:p>
+            <a:pPr marL="742950" lvl="1" indent="-285750">
+              <a:buFont typeface="Arial" panose="020B0604020202020204" pitchFamily="34" charset="0"/>
+              <a:buChar char="•"/>
+            </a:pPr>
+            <a:r>
+              <a:rPr lang="en-US" dirty="0"/>
+              <a:t>1,477</a:t>
             </a:r>
           </a:p>
           <a:p>
@@ -5994,7 +6438,37 @@
             </a:pPr>
             <a:r>
               <a:rPr lang="en-US" dirty="0"/>
-              <a:t>How we chose these 9 sources</a:t>
+              <a:t>Total number of sources</a:t>
+            </a:r>
+          </a:p>
+          <a:p>
+            <a:pPr marL="742950" lvl="1" indent="-285750">
+              <a:buFont typeface="Arial" panose="020B0604020202020204" pitchFamily="34" charset="0"/>
+              <a:buChar char="•"/>
+            </a:pPr>
+            <a:r>
+              <a:rPr lang="en-US" dirty="0"/>
+              <a:t>9</a:t>
+            </a:r>
+          </a:p>
+          <a:p>
+            <a:pPr marL="285750" indent="-285750">
+              <a:buFont typeface="Arial" panose="020B0604020202020204" pitchFamily="34" charset="0"/>
+              <a:buChar char="•"/>
+            </a:pPr>
+            <a:r>
+              <a:rPr lang="en-US" dirty="0"/>
+              <a:t>Date range</a:t>
+            </a:r>
+          </a:p>
+          <a:p>
+            <a:pPr marL="742950" lvl="1" indent="-285750">
+              <a:buFont typeface="Arial" panose="020B0604020202020204" pitchFamily="34" charset="0"/>
+              <a:buChar char="•"/>
+            </a:pPr>
+            <a:r>
+              <a:rPr lang="en-US" dirty="0"/>
+              <a:t>9/9/2020 – 10/14/2020</a:t>
             </a:r>
           </a:p>
         </p:txBody>
@@ -6014,7 +6488,7 @@
           <p:nvPr/>
         </p:nvPicPr>
         <p:blipFill>
-          <a:blip r:embed="rId2"/>
+          <a:blip r:embed="rId3"/>
           <a:stretch>
             <a:fillRect/>
           </a:stretch>
@@ -6022,7 +6496,7 @@
         <p:spPr>
           <a:xfrm>
             <a:off x="869949" y="1428750"/>
-            <a:ext cx="5929313" cy="4743450"/>
+            <a:ext cx="5922963" cy="4738370"/>
           </a:xfrm>
           <a:prstGeom prst="rect">
             <a:avLst/>
@@ -6087,75 +6561,12 @@
           </a:p>
         </p:txBody>
       </p:sp>
-      <p:sp>
-        <p:nvSpPr>
-          <p:cNvPr id="10" name="TextBox 9">
+      <p:pic>
+        <p:nvPicPr>
+          <p:cNvPr id="15" name="Picture 14">
             <a:extLst>
               <a:ext uri="{FF2B5EF4-FFF2-40B4-BE49-F238E27FC236}">
-                <a16:creationId xmlns:a16="http://schemas.microsoft.com/office/drawing/2014/main" id="{6480B22D-BF79-4E73-A67E-724DDD59837C}"/>
-              </a:ext>
-            </a:extLst>
-          </p:cNvPr>
-          <p:cNvSpPr txBox="1"/>
-          <p:nvPr/>
-        </p:nvSpPr>
-        <p:spPr>
-          <a:xfrm>
-            <a:off x="1098577" y="3047414"/>
-            <a:ext cx="5657823" cy="923330"/>
-          </a:xfrm>
-          <a:prstGeom prst="rect">
-            <a:avLst/>
-          </a:prstGeom>
-          <a:noFill/>
-        </p:spPr>
-        <p:txBody>
-          <a:bodyPr wrap="square" rtlCol="0">
-            <a:spAutoFit/>
-          </a:bodyPr>
-          <a:lstStyle/>
-          <a:p>
-            <a:r>
-              <a:rPr lang="en-US" dirty="0"/>
-              <a:t>Descriptive stats</a:t>
-            </a:r>
-          </a:p>
-          <a:p>
-            <a:pPr marL="285750" indent="-285750">
-              <a:buFont typeface="Arial" panose="020B0604020202020204" pitchFamily="34" charset="0"/>
-              <a:buChar char="•"/>
-            </a:pPr>
-            <a:r>
-              <a:rPr lang="en-US" dirty="0"/>
-              <a:t>Box plot explanation</a:t>
-            </a:r>
-          </a:p>
-          <a:p>
-            <a:pPr marL="285750" indent="-285750">
-              <a:buFont typeface="Arial" panose="020B0604020202020204" pitchFamily="34" charset="0"/>
-              <a:buChar char="•"/>
-            </a:pPr>
-            <a:r>
-              <a:rPr lang="en-US" dirty="0"/>
-              <a:t>Something interesting to draw </a:t>
-            </a:r>
-            <a:r>
-              <a:rPr lang="en-US" dirty="0" err="1"/>
-              <a:t>ppls</a:t>
-            </a:r>
-            <a:r>
-              <a:rPr lang="en-US" dirty="0"/>
-              <a:t> attention to</a:t>
-            </a:r>
-          </a:p>
-        </p:txBody>
-      </p:sp>
-      <p:pic>
-        <p:nvPicPr>
-          <p:cNvPr id="4" name="Picture 3">
-            <a:extLst>
-              <a:ext uri="{FF2B5EF4-FFF2-40B4-BE49-F238E27FC236}">
-                <a16:creationId xmlns:a16="http://schemas.microsoft.com/office/drawing/2014/main" id="{9EDB3912-8BBA-49A4-809D-540549579B93}"/>
+                <a16:creationId xmlns:a16="http://schemas.microsoft.com/office/drawing/2014/main" id="{D126E127-60B4-4D2A-9B25-6191EF293708}"/>
               </a:ext>
             </a:extLst>
           </p:cNvPr>
@@ -6164,72 +6575,21 @@
           </p:cNvPicPr>
           <p:nvPr/>
         </p:nvPicPr>
-        <p:blipFill>
-          <a:blip r:embed="rId2"/>
-          <a:stretch>
-            <a:fillRect/>
-          </a:stretch>
+        <p:blipFill rotWithShape="1">
+          <a:blip r:embed="rId3"/>
+          <a:srcRect t="5627"/>
+          <a:stretch/>
         </p:blipFill>
         <p:spPr>
           <a:xfrm>
-            <a:off x="7414776" y="717296"/>
-            <a:ext cx="4116823" cy="5763552"/>
+            <a:off x="6556986" y="622736"/>
+            <a:ext cx="4415814" cy="5834269"/>
           </a:xfrm>
           <a:prstGeom prst="rect">
             <a:avLst/>
           </a:prstGeom>
         </p:spPr>
       </p:pic>
-      <p:sp>
-        <p:nvSpPr>
-          <p:cNvPr id="9" name="TextBox 8">
-            <a:extLst>
-              <a:ext uri="{FF2B5EF4-FFF2-40B4-BE49-F238E27FC236}">
-                <a16:creationId xmlns:a16="http://schemas.microsoft.com/office/drawing/2014/main" id="{CE94EE6F-E003-4641-8616-2FF2288DC129}"/>
-              </a:ext>
-            </a:extLst>
-          </p:cNvPr>
-          <p:cNvSpPr txBox="1"/>
-          <p:nvPr/>
-        </p:nvSpPr>
-        <p:spPr>
-          <a:xfrm>
-            <a:off x="1098577" y="1848534"/>
-            <a:ext cx="6096000" cy="646331"/>
-          </a:xfrm>
-          <a:prstGeom prst="rect">
-            <a:avLst/>
-          </a:prstGeom>
-          <a:noFill/>
-        </p:spPr>
-        <p:txBody>
-          <a:bodyPr wrap="square">
-            <a:spAutoFit/>
-          </a:bodyPr>
-          <a:lstStyle/>
-          <a:p>
-            <a:pPr marL="0" indent="0" rtl="0">
-              <a:spcBef>
-                <a:spcPts val="1200"/>
-              </a:spcBef>
-              <a:spcAft>
-                <a:spcPts val="1200"/>
-              </a:spcAft>
-              <a:buNone/>
-            </a:pPr>
-            <a:r>
-              <a:rPr lang="en-US" sz="1800" b="0" i="0" u="none" strike="noStrike" dirty="0">
-                <a:solidFill>
-                  <a:srgbClr val="000000"/>
-                </a:solidFill>
-                <a:effectLst/>
-                <a:latin typeface="Arial" panose="020B0604020202020204" pitchFamily="34" charset="0"/>
-              </a:rPr>
-              <a:t>What is sentiment analysis? Emotion conveyed through text</a:t>
-            </a:r>
-          </a:p>
-        </p:txBody>
-      </p:sp>
     </p:spTree>
     <p:extLst>
       <p:ext uri="{BB962C8B-B14F-4D97-AF65-F5344CB8AC3E}">
@@ -6303,7 +6663,7 @@
         <p:spPr>
           <a:xfrm>
             <a:off x="727468" y="5965582"/>
-            <a:ext cx="5428130" cy="461665"/>
+            <a:ext cx="5541252" cy="461665"/>
           </a:xfrm>
           <a:prstGeom prst="rect">
             <a:avLst/>
@@ -6340,7 +6700,7 @@
             </a:pPr>
             <a:r>
               <a:rPr lang="en-US" sz="1200" dirty="0"/>
-              <a:t>-1.0 to -0.2 = negative	-0.2 to 0.2 = neutral		0.2 - 1 = positive</a:t>
+              <a:t>-1.0 to -0.2 = negative	-0.2 to 0.2 = neutral		0.2 to 1 = positive</a:t>
             </a:r>
           </a:p>
         </p:txBody>
@@ -6411,18 +6771,8 @@
           </a:p>
           <a:p>
             <a:r>
-              <a:rPr lang="en-US" sz="1200" b="0" i="0" u="none" strike="noStrike" dirty="0">
-                <a:solidFill>
-                  <a:srgbClr val="000000"/>
-                </a:solidFill>
-                <a:effectLst/>
-                <a:latin typeface="Calibri" panose="020F0502020204030204" pitchFamily="34" charset="0"/>
-              </a:rPr>
-              <a:t>University of Alabama trustees vote to rename hall that honored 'ardent white supremacist’</a:t>
-            </a:r>
-            <a:r>
-              <a:rPr lang="en-US" sz="1200" dirty="0"/>
-              <a:t> </a:t>
+              <a:rPr lang="en-US" sz="1200" i="1" dirty="0"/>
+              <a:t>University of Alabama trustees vote to rename hall that honored 'ardent white supremacist’ </a:t>
             </a:r>
           </a:p>
           <a:p>
@@ -6432,17 +6782,17 @@
             </a:pPr>
             <a:r>
               <a:rPr lang="en-US" sz="1200" i="1" dirty="0"/>
-              <a:t>Score: .82 (Positive), Published by USA Today</a:t>
+              <a:t>Score: .82 (positive emotion), Published by USA Today</a:t>
             </a:r>
           </a:p>
         </p:txBody>
       </p:sp>
       <p:pic>
         <p:nvPicPr>
-          <p:cNvPr id="16" name="Content Placeholder 8">
+          <p:cNvPr id="5" name="Picture 4">
             <a:extLst>
               <a:ext uri="{FF2B5EF4-FFF2-40B4-BE49-F238E27FC236}">
-                <a16:creationId xmlns:a16="http://schemas.microsoft.com/office/drawing/2014/main" id="{84A6607B-DB84-48CE-A1D2-46D7AA3F9E6B}"/>
+                <a16:creationId xmlns:a16="http://schemas.microsoft.com/office/drawing/2014/main" id="{B8DEC4B1-6A1B-4D8B-936D-D48460C6B41A}"/>
               </a:ext>
             </a:extLst>
           </p:cNvPr>
@@ -6459,128 +6809,14 @@
         </p:blipFill>
         <p:spPr>
           <a:xfrm>
-            <a:off x="869949" y="1428750"/>
-            <a:ext cx="5671040" cy="4536832"/>
+            <a:off x="853192" y="1428749"/>
+            <a:ext cx="5671041" cy="4536833"/>
           </a:xfrm>
           <a:prstGeom prst="rect">
             <a:avLst/>
           </a:prstGeom>
         </p:spPr>
       </p:pic>
-      <p:sp>
-        <p:nvSpPr>
-          <p:cNvPr id="18" name="TextBox 17">
-            <a:extLst>
-              <a:ext uri="{FF2B5EF4-FFF2-40B4-BE49-F238E27FC236}">
-                <a16:creationId xmlns:a16="http://schemas.microsoft.com/office/drawing/2014/main" id="{B10FC46F-DA2F-49A5-9AC8-BFF20A8A5394}"/>
-              </a:ext>
-            </a:extLst>
-          </p:cNvPr>
-          <p:cNvSpPr txBox="1"/>
-          <p:nvPr/>
-        </p:nvSpPr>
-        <p:spPr>
-          <a:xfrm>
-            <a:off x="6540989" y="3951923"/>
-            <a:ext cx="5407171" cy="1569660"/>
-          </a:xfrm>
-          <a:prstGeom prst="rect">
-            <a:avLst/>
-          </a:prstGeom>
-          <a:noFill/>
-        </p:spPr>
-        <p:txBody>
-          <a:bodyPr wrap="square">
-            <a:spAutoFit/>
-          </a:bodyPr>
-          <a:lstStyle/>
-          <a:p>
-            <a:r>
-              <a:rPr lang="en-US" sz="1800" b="0" i="0" u="none" strike="noStrike" dirty="0">
-                <a:solidFill>
-                  <a:srgbClr val="000000"/>
-                </a:solidFill>
-                <a:effectLst/>
-                <a:latin typeface="Calibri" panose="020F0502020204030204" pitchFamily="34" charset="0"/>
-              </a:rPr>
-              <a:t>Can you guess the sentiment of these titles?</a:t>
-            </a:r>
-          </a:p>
-          <a:p>
-            <a:endParaRPr lang="en-US" sz="1800" b="0" i="0" u="none" strike="noStrike" dirty="0">
-              <a:solidFill>
-                <a:srgbClr val="000000"/>
-              </a:solidFill>
-              <a:effectLst/>
-              <a:latin typeface="Calibri" panose="020F0502020204030204" pitchFamily="34" charset="0"/>
-            </a:endParaRPr>
-          </a:p>
-          <a:p>
-            <a:pPr marL="285750" indent="-285750">
-              <a:buFont typeface="Arial" panose="020B0604020202020204" pitchFamily="34" charset="0"/>
-              <a:buChar char="•"/>
-            </a:pPr>
-            <a:r>
-              <a:rPr lang="en-US" sz="1200" b="0" i="0" u="none" strike="noStrike" dirty="0">
-                <a:solidFill>
-                  <a:srgbClr val="000000"/>
-                </a:solidFill>
-                <a:effectLst/>
-                <a:latin typeface="Calibri" panose="020F0502020204030204" pitchFamily="34" charset="0"/>
-              </a:rPr>
-              <a:t>Bader Ginsburg, Supreme Court justice and legal pioneer for gender equality, dies at 87</a:t>
-            </a:r>
-            <a:r>
-              <a:rPr lang="en-US" sz="1200" dirty="0"/>
-              <a:t> </a:t>
-            </a:r>
-          </a:p>
-          <a:p>
-            <a:pPr marL="285750" indent="-285750">
-              <a:buFont typeface="Arial" panose="020B0604020202020204" pitchFamily="34" charset="0"/>
-              <a:buChar char="•"/>
-            </a:pPr>
-            <a:endParaRPr lang="en-US" sz="1200" dirty="0"/>
-          </a:p>
-          <a:p>
-            <a:pPr marL="285750" indent="-285750">
-              <a:buFont typeface="Arial" panose="020B0604020202020204" pitchFamily="34" charset="0"/>
-              <a:buChar char="•"/>
-            </a:pPr>
-            <a:r>
-              <a:rPr lang="en-US" sz="1200" b="0" i="0" u="none" strike="noStrike" dirty="0">
-                <a:solidFill>
-                  <a:srgbClr val="000000"/>
-                </a:solidFill>
-                <a:effectLst/>
-                <a:latin typeface="Calibri" panose="020F0502020204030204" pitchFamily="34" charset="0"/>
-              </a:rPr>
-              <a:t>Mackenzie </a:t>
-            </a:r>
-            <a:r>
-              <a:rPr lang="en-US" sz="1200" b="0" i="0" u="none" strike="noStrike" dirty="0" err="1">
-                <a:solidFill>
-                  <a:srgbClr val="000000"/>
-                </a:solidFill>
-                <a:effectLst/>
-                <a:latin typeface="Calibri" panose="020F0502020204030204" pitchFamily="34" charset="0"/>
-              </a:rPr>
-              <a:t>Lueck’s</a:t>
-            </a:r>
-            <a:r>
-              <a:rPr lang="en-US" sz="1200" b="0" i="0" u="none" strike="noStrike" dirty="0">
-                <a:solidFill>
-                  <a:srgbClr val="000000"/>
-                </a:solidFill>
-                <a:effectLst/>
-                <a:latin typeface="Calibri" panose="020F0502020204030204" pitchFamily="34" charset="0"/>
-              </a:rPr>
-              <a:t> killer pleads guilty to aggravated murder, will avoid death penalty</a:t>
-            </a:r>
-            <a:endParaRPr lang="en-US" sz="1200" dirty="0"/>
-          </a:p>
-        </p:txBody>
-      </p:sp>
     </p:spTree>
     <p:extLst>
       <p:ext uri="{BB962C8B-B14F-4D97-AF65-F5344CB8AC3E}">
@@ -6595,198 +6831,6 @@
 </file>
 
 <file path=ppt/slides/slide7.xml><?xml version="1.0" encoding="utf-8"?>
-<p:sld xmlns:a="http://schemas.openxmlformats.org/drawingml/2006/main" xmlns:r="http://schemas.openxmlformats.org/officeDocument/2006/relationships" xmlns:p="http://schemas.openxmlformats.org/presentationml/2006/main">
-  <p:cSld>
-    <p:spTree>
-      <p:nvGrpSpPr>
-        <p:cNvPr id="1" name=""/>
-        <p:cNvGrpSpPr/>
-        <p:nvPr/>
-      </p:nvGrpSpPr>
-      <p:grpSpPr>
-        <a:xfrm>
-          <a:off x="0" y="0"/>
-          <a:ext cx="0" cy="0"/>
-          <a:chOff x="0" y="0"/>
-          <a:chExt cx="0" cy="0"/>
-        </a:xfrm>
-      </p:grpSpPr>
-      <p:sp>
-        <p:nvSpPr>
-          <p:cNvPr id="2" name="Title 1">
-            <a:extLst>
-              <a:ext uri="{FF2B5EF4-FFF2-40B4-BE49-F238E27FC236}">
-                <a16:creationId xmlns:a16="http://schemas.microsoft.com/office/drawing/2014/main" id="{E20174FA-16C5-43C9-B4DA-D902B11BEA0D}"/>
-              </a:ext>
-            </a:extLst>
-          </p:cNvPr>
-          <p:cNvSpPr>
-            <a:spLocks noGrp="1"/>
-          </p:cNvSpPr>
-          <p:nvPr>
-            <p:ph type="title"/>
-          </p:nvPr>
-        </p:nvSpPr>
-        <p:spPr/>
-        <p:txBody>
-          <a:bodyPr/>
-          <a:lstStyle/>
-          <a:p>
-            <a:r>
-              <a:rPr lang="en-US" sz="4400" b="0" i="0" u="none" strike="noStrike" dirty="0">
-                <a:solidFill>
-                  <a:srgbClr val="000000"/>
-                </a:solidFill>
-                <a:effectLst/>
-                <a:latin typeface="Calibri" panose="020F0502020204030204" pitchFamily="34" charset="0"/>
-              </a:rPr>
-              <a:t>Can you guess the sentiment of these titles?</a:t>
-            </a:r>
-          </a:p>
-        </p:txBody>
-      </p:sp>
-      <p:sp>
-        <p:nvSpPr>
-          <p:cNvPr id="3" name="Content Placeholder 2">
-            <a:extLst>
-              <a:ext uri="{FF2B5EF4-FFF2-40B4-BE49-F238E27FC236}">
-                <a16:creationId xmlns:a16="http://schemas.microsoft.com/office/drawing/2014/main" id="{E204FD48-AC00-4B41-B29D-5034C1DD8238}"/>
-              </a:ext>
-            </a:extLst>
-          </p:cNvPr>
-          <p:cNvSpPr>
-            <a:spLocks noGrp="1"/>
-          </p:cNvSpPr>
-          <p:nvPr>
-            <p:ph idx="1"/>
-          </p:nvPr>
-        </p:nvSpPr>
-        <p:spPr/>
-        <p:txBody>
-          <a:bodyPr/>
-          <a:lstStyle/>
-          <a:p>
-            <a:pPr marL="285750" indent="-285750">
-              <a:buFont typeface="Arial" panose="020B0604020202020204" pitchFamily="34" charset="0"/>
-              <a:buChar char="•"/>
-            </a:pPr>
-            <a:r>
-              <a:rPr lang="en-US" sz="2000" b="0" i="0" u="none" strike="noStrike" dirty="0">
-                <a:solidFill>
-                  <a:srgbClr val="000000"/>
-                </a:solidFill>
-                <a:effectLst/>
-                <a:latin typeface="Calibri" panose="020F0502020204030204" pitchFamily="34" charset="0"/>
-              </a:rPr>
-              <a:t>Bader Ginsburg, Supreme Court justice and legal pioneer for gender equality, dies at 87</a:t>
-            </a:r>
-            <a:r>
-              <a:rPr lang="en-US" sz="2000" dirty="0"/>
-              <a:t> </a:t>
-            </a:r>
-          </a:p>
-          <a:p>
-            <a:pPr marL="285750" indent="-285750">
-              <a:buFont typeface="Arial" panose="020B0604020202020204" pitchFamily="34" charset="0"/>
-              <a:buChar char="•"/>
-            </a:pPr>
-            <a:endParaRPr lang="en-US" sz="2000" dirty="0"/>
-          </a:p>
-          <a:p>
-            <a:pPr marL="285750" indent="-285750">
-              <a:buFont typeface="Arial" panose="020B0604020202020204" pitchFamily="34" charset="0"/>
-              <a:buChar char="•"/>
-            </a:pPr>
-            <a:r>
-              <a:rPr lang="en-US" sz="2000" b="0" i="0" u="none" strike="noStrike" dirty="0">
-                <a:solidFill>
-                  <a:srgbClr val="000000"/>
-                </a:solidFill>
-                <a:effectLst/>
-                <a:latin typeface="Calibri" panose="020F0502020204030204" pitchFamily="34" charset="0"/>
-              </a:rPr>
-              <a:t>Mackenzie </a:t>
-            </a:r>
-            <a:r>
-              <a:rPr lang="en-US" sz="2000" b="0" i="0" u="none" strike="noStrike" dirty="0" err="1">
-                <a:solidFill>
-                  <a:srgbClr val="000000"/>
-                </a:solidFill>
-                <a:effectLst/>
-                <a:latin typeface="Calibri" panose="020F0502020204030204" pitchFamily="34" charset="0"/>
-              </a:rPr>
-              <a:t>Lueck’s</a:t>
-            </a:r>
-            <a:r>
-              <a:rPr lang="en-US" sz="2000" b="0" i="0" u="none" strike="noStrike" dirty="0">
-                <a:solidFill>
-                  <a:srgbClr val="000000"/>
-                </a:solidFill>
-                <a:effectLst/>
-                <a:latin typeface="Calibri" panose="020F0502020204030204" pitchFamily="34" charset="0"/>
-              </a:rPr>
-              <a:t> killer pleads guilty to aggravated murder, will avoid death penalty</a:t>
-            </a:r>
-            <a:endParaRPr lang="en-US" sz="2000" dirty="0"/>
-          </a:p>
-          <a:p>
-            <a:endParaRPr lang="en-US" dirty="0"/>
-          </a:p>
-        </p:txBody>
-      </p:sp>
-      <p:sp>
-        <p:nvSpPr>
-          <p:cNvPr id="4" name="TextBox 3">
-            <a:extLst>
-              <a:ext uri="{FF2B5EF4-FFF2-40B4-BE49-F238E27FC236}">
-                <a16:creationId xmlns:a16="http://schemas.microsoft.com/office/drawing/2014/main" id="{942E6F93-E474-4FB3-9578-C5517A3F6B75}"/>
-              </a:ext>
-            </a:extLst>
-          </p:cNvPr>
-          <p:cNvSpPr txBox="1"/>
-          <p:nvPr/>
-        </p:nvSpPr>
-        <p:spPr>
-          <a:xfrm>
-            <a:off x="3108960" y="5049520"/>
-            <a:ext cx="6343211" cy="369332"/>
-          </a:xfrm>
-          <a:prstGeom prst="rect">
-            <a:avLst/>
-          </a:prstGeom>
-          <a:solidFill>
-            <a:schemeClr val="bg1">
-              <a:lumMod val="65000"/>
-            </a:schemeClr>
-          </a:solidFill>
-        </p:spPr>
-        <p:txBody>
-          <a:bodyPr wrap="none" rtlCol="0">
-            <a:spAutoFit/>
-          </a:bodyPr>
-          <a:lstStyle/>
-          <a:p>
-            <a:r>
-              <a:rPr lang="en-US" dirty="0"/>
-              <a:t>If we have time, might be a fun way of engaging the audience… </a:t>
-            </a:r>
-          </a:p>
-        </p:txBody>
-      </p:sp>
-    </p:spTree>
-    <p:extLst>
-      <p:ext uri="{BB962C8B-B14F-4D97-AF65-F5344CB8AC3E}">
-        <p14:creationId xmlns:p14="http://schemas.microsoft.com/office/powerpoint/2010/main" val="3946897848"/>
-      </p:ext>
-    </p:extLst>
-  </p:cSld>
-  <p:clrMapOvr>
-    <a:masterClrMapping/>
-  </p:clrMapOvr>
-</p:sld>
-</file>
-
-<file path=ppt/slides/slide8.xml><?xml version="1.0" encoding="utf-8"?>
 <p:sld xmlns:a="http://schemas.openxmlformats.org/drawingml/2006/main" xmlns:r="http://schemas.openxmlformats.org/officeDocument/2006/relationships" xmlns:p="http://schemas.openxmlformats.org/presentationml/2006/main">
   <p:cSld>
     <p:spTree>
@@ -6904,7 +6948,7 @@
 </p:sld>
 </file>
 
-<file path=ppt/slides/slide9.xml><?xml version="1.0" encoding="utf-8"?>
+<file path=ppt/slides/slide8.xml><?xml version="1.0" encoding="utf-8"?>
 <p:sld xmlns:a="http://schemas.openxmlformats.org/drawingml/2006/main" xmlns:r="http://schemas.openxmlformats.org/officeDocument/2006/relationships" xmlns:p="http://schemas.openxmlformats.org/presentationml/2006/main">
   <p:cSld>
     <p:spTree>
@@ -7080,6 +7124,166 @@
     <p:extLst>
       <p:ext uri="{BB962C8B-B14F-4D97-AF65-F5344CB8AC3E}">
         <p14:creationId xmlns:p14="http://schemas.microsoft.com/office/powerpoint/2010/main" val="2513785858"/>
+      </p:ext>
+    </p:extLst>
+  </p:cSld>
+  <p:clrMapOvr>
+    <a:masterClrMapping/>
+  </p:clrMapOvr>
+</p:sld>
+</file>
+
+<file path=ppt/slides/slide9.xml><?xml version="1.0" encoding="utf-8"?>
+<p:sld xmlns:a="http://schemas.openxmlformats.org/drawingml/2006/main" xmlns:r="http://schemas.openxmlformats.org/officeDocument/2006/relationships" xmlns:p="http://schemas.openxmlformats.org/presentationml/2006/main">
+  <p:cSld>
+    <p:spTree>
+      <p:nvGrpSpPr>
+        <p:cNvPr id="1" name=""/>
+        <p:cNvGrpSpPr/>
+        <p:nvPr/>
+      </p:nvGrpSpPr>
+      <p:grpSpPr>
+        <a:xfrm>
+          <a:off x="0" y="0"/>
+          <a:ext cx="0" cy="0"/>
+          <a:chOff x="0" y="0"/>
+          <a:chExt cx="0" cy="0"/>
+        </a:xfrm>
+      </p:grpSpPr>
+      <p:sp>
+        <p:nvSpPr>
+          <p:cNvPr id="2" name="Title 1">
+            <a:extLst>
+              <a:ext uri="{FF2B5EF4-FFF2-40B4-BE49-F238E27FC236}">
+                <a16:creationId xmlns:a16="http://schemas.microsoft.com/office/drawing/2014/main" id="{6E1DFE7F-8996-4432-B0B9-1278B1C45367}"/>
+              </a:ext>
+            </a:extLst>
+          </p:cNvPr>
+          <p:cNvSpPr>
+            <a:spLocks noGrp="1"/>
+          </p:cNvSpPr>
+          <p:nvPr>
+            <p:ph type="title"/>
+          </p:nvPr>
+        </p:nvSpPr>
+        <p:spPr/>
+        <p:txBody>
+          <a:bodyPr/>
+          <a:lstStyle/>
+          <a:p>
+            <a:r>
+              <a:rPr lang="en-US" dirty="0"/>
+              <a:t>Key takeaways</a:t>
+            </a:r>
+          </a:p>
+        </p:txBody>
+      </p:sp>
+      <p:sp>
+        <p:nvSpPr>
+          <p:cNvPr id="3" name="Content Placeholder 2">
+            <a:extLst>
+              <a:ext uri="{FF2B5EF4-FFF2-40B4-BE49-F238E27FC236}">
+                <a16:creationId xmlns:a16="http://schemas.microsoft.com/office/drawing/2014/main" id="{62650EB6-537B-41B0-BD21-36EDF3512704}"/>
+              </a:ext>
+            </a:extLst>
+          </p:cNvPr>
+          <p:cNvSpPr>
+            <a:spLocks noGrp="1"/>
+          </p:cNvSpPr>
+          <p:nvPr>
+            <p:ph idx="1"/>
+          </p:nvPr>
+        </p:nvSpPr>
+        <p:spPr/>
+        <p:txBody>
+          <a:bodyPr>
+            <a:normAutofit fontScale="92500" lnSpcReduction="20000"/>
+          </a:bodyPr>
+          <a:lstStyle/>
+          <a:p>
+            <a:r>
+              <a:rPr lang="en-US" dirty="0"/>
+              <a:t>Key findings</a:t>
+            </a:r>
+          </a:p>
+          <a:p>
+            <a:pPr lvl="1"/>
+            <a:r>
+              <a:rPr lang="en-US" dirty="0"/>
+              <a:t>Breitbart/Al Jazeera seem to use most negative sentiment</a:t>
+            </a:r>
+          </a:p>
+          <a:p>
+            <a:pPr lvl="1"/>
+            <a:r>
+              <a:rPr lang="en-US" dirty="0"/>
+              <a:t>Negative/Positive headlines seem to have different topics</a:t>
+            </a:r>
+          </a:p>
+          <a:p>
+            <a:r>
+              <a:rPr lang="en-US" dirty="0"/>
+              <a:t>Challenges</a:t>
+            </a:r>
+          </a:p>
+          <a:p>
+            <a:pPr lvl="1"/>
+            <a:r>
+              <a:rPr lang="en-US" dirty="0"/>
+              <a:t>NLTK Vader</a:t>
+            </a:r>
+          </a:p>
+          <a:p>
+            <a:pPr lvl="1"/>
+            <a:r>
+              <a:rPr lang="en-US" dirty="0" err="1"/>
+              <a:t>NewsAPI</a:t>
+            </a:r>
+            <a:r>
+              <a:rPr lang="en-US" dirty="0"/>
+              <a:t> </a:t>
+            </a:r>
+          </a:p>
+          <a:p>
+            <a:r>
+              <a:rPr lang="en-US" dirty="0"/>
+              <a:t>Additional questions to be asked if had more time/resources</a:t>
+            </a:r>
+          </a:p>
+          <a:p>
+            <a:pPr lvl="1"/>
+            <a:r>
+              <a:rPr lang="en-US" dirty="0"/>
+              <a:t>Perform emotional analysis</a:t>
+            </a:r>
+          </a:p>
+          <a:p>
+            <a:pPr lvl="1"/>
+            <a:r>
+              <a:rPr lang="en-US" dirty="0"/>
+              <a:t>Add to dataset monthly </a:t>
+            </a:r>
+          </a:p>
+          <a:p>
+            <a:pPr lvl="1"/>
+            <a:r>
+              <a:rPr lang="en-US" dirty="0"/>
+              <a:t>Customize the sentiment analysis</a:t>
+            </a:r>
+          </a:p>
+          <a:p>
+            <a:pPr lvl="1"/>
+            <a:r>
+              <a:rPr lang="en-US" dirty="0"/>
+              <a:t>Look at influence of political bias</a:t>
+            </a:r>
+          </a:p>
+        </p:txBody>
+      </p:sp>
+    </p:spTree>
+    <p:extLst>
+      <p:ext uri="{BB962C8B-B14F-4D97-AF65-F5344CB8AC3E}">
+        <p14:creationId xmlns:p14="http://schemas.microsoft.com/office/powerpoint/2010/main" val="1865033548"/>
       </p:ext>
     </p:extLst>
   </p:cSld>

</xml_diff>

<commit_message>
<final deck, latest revisions to reffrences>
</commit_message>
<xml_diff>
--- a/Group_project_deck.pptx
+++ b/Group_project_deck.pptx
@@ -210,7 +210,7 @@
           <a:p>
             <a:fld id="{46BE0A99-7F05-42F8-8D10-B7D701853D1D}" type="datetimeFigureOut">
               <a:rPr lang="en-US" smtClean="0"/>
-              <a:t>10/19/2020</a:t>
+              <a:t>10/21/2020</a:t>
             </a:fld>
             <a:endParaRPr lang="en-US"/>
           </a:p>
@@ -1687,7 +1687,7 @@
             <a:fld id="{87DE6118-2437-4B30-8E3C-4D2BE6020583}" type="datetimeFigureOut">
               <a:rPr lang="en-US" dirty="0"/>
               <a:pPr/>
-              <a:t>10/19/2020</a:t>
+              <a:t>10/21/2020</a:t>
             </a:fld>
             <a:endParaRPr lang="en-US" dirty="0"/>
           </a:p>
@@ -2013,7 +2013,7 @@
           <a:p>
             <a:fld id="{87DE6118-2437-4B30-8E3C-4D2BE6020583}" type="datetimeFigureOut">
               <a:rPr lang="en-US" dirty="0"/>
-              <a:t>10/19/2020</a:t>
+              <a:t>10/21/2020</a:t>
             </a:fld>
             <a:endParaRPr lang="en-US" dirty="0"/>
           </a:p>
@@ -2188,7 +2188,7 @@
           <a:p>
             <a:fld id="{87DE6118-2437-4B30-8E3C-4D2BE6020583}" type="datetimeFigureOut">
               <a:rPr lang="en-US" dirty="0"/>
-              <a:t>10/19/2020</a:t>
+              <a:t>10/21/2020</a:t>
             </a:fld>
             <a:endParaRPr lang="en-US" dirty="0"/>
           </a:p>
@@ -2353,7 +2353,7 @@
           <a:p>
             <a:fld id="{87DE6118-2437-4B30-8E3C-4D2BE6020583}" type="datetimeFigureOut">
               <a:rPr lang="en-US" dirty="0"/>
-              <a:t>10/19/2020</a:t>
+              <a:t>10/21/2020</a:t>
             </a:fld>
             <a:endParaRPr lang="en-US" dirty="0"/>
           </a:p>
@@ -2626,7 +2626,7 @@
             <a:fld id="{87DE6118-2437-4B30-8E3C-4D2BE6020583}" type="datetimeFigureOut">
               <a:rPr lang="en-US" dirty="0"/>
               <a:pPr/>
-              <a:t>10/19/2020</a:t>
+              <a:t>10/21/2020</a:t>
             </a:fld>
             <a:endParaRPr lang="en-US" dirty="0"/>
           </a:p>
@@ -3016,7 +3016,7 @@
           <a:p>
             <a:fld id="{87DE6118-2437-4B30-8E3C-4D2BE6020583}" type="datetimeFigureOut">
               <a:rPr lang="en-US" dirty="0"/>
-              <a:t>10/19/2020</a:t>
+              <a:t>10/21/2020</a:t>
             </a:fld>
             <a:endParaRPr lang="en-US" dirty="0"/>
           </a:p>
@@ -3488,7 +3488,7 @@
           <a:p>
             <a:fld id="{87DE6118-2437-4B30-8E3C-4D2BE6020583}" type="datetimeFigureOut">
               <a:rPr lang="en-US" dirty="0"/>
-              <a:t>10/19/2020</a:t>
+              <a:t>10/21/2020</a:t>
             </a:fld>
             <a:endParaRPr lang="en-US" dirty="0"/>
           </a:p>
@@ -3601,7 +3601,7 @@
           <a:p>
             <a:fld id="{87DE6118-2437-4B30-8E3C-4D2BE6020583}" type="datetimeFigureOut">
               <a:rPr lang="en-US" dirty="0"/>
-              <a:t>10/19/2020</a:t>
+              <a:t>10/21/2020</a:t>
             </a:fld>
             <a:endParaRPr lang="en-US" dirty="0"/>
           </a:p>
@@ -3691,7 +3691,7 @@
           <a:p>
             <a:fld id="{87DE6118-2437-4B30-8E3C-4D2BE6020583}" type="datetimeFigureOut">
               <a:rPr lang="en-US" dirty="0"/>
-              <a:t>10/19/2020</a:t>
+              <a:t>10/21/2020</a:t>
             </a:fld>
             <a:endParaRPr lang="en-US" dirty="0"/>
           </a:p>
@@ -4033,7 +4033,7 @@
             <a:fld id="{87DE6118-2437-4B30-8E3C-4D2BE6020583}" type="datetimeFigureOut">
               <a:rPr lang="en-US" dirty="0"/>
               <a:pPr/>
-              <a:t>10/19/2020</a:t>
+              <a:t>10/21/2020</a:t>
             </a:fld>
             <a:endParaRPr lang="en-US" dirty="0"/>
           </a:p>
@@ -4418,7 +4418,7 @@
             <a:fld id="{87DE6118-2437-4B30-8E3C-4D2BE6020583}" type="datetimeFigureOut">
               <a:rPr lang="en-US" dirty="0"/>
               <a:pPr/>
-              <a:t>10/19/2020</a:t>
+              <a:t>10/21/2020</a:t>
             </a:fld>
             <a:endParaRPr lang="en-US" dirty="0"/>
           </a:p>
@@ -4693,7 +4693,7 @@
             <a:fld id="{87DE6118-2437-4B30-8E3C-4D2BE6020583}" type="datetimeFigureOut">
               <a:rPr lang="en-US" dirty="0"/>
               <a:pPr/>
-              <a:t>10/19/2020</a:t>
+              <a:t>10/21/2020</a:t>
             </a:fld>
             <a:endParaRPr lang="en-US" dirty="0"/>
           </a:p>
@@ -5768,51 +5768,54 @@
         </p:nvSpPr>
         <p:spPr/>
         <p:txBody>
-          <a:bodyPr/>
+          <a:bodyPr>
+            <a:normAutofit fontScale="62500" lnSpcReduction="20000"/>
+          </a:bodyPr>
           <a:lstStyle/>
           <a:p>
             <a:r>
-              <a:rPr lang="en-US" dirty="0"/>
-              <a:t>News headlines in English published in the US</a:t>
-            </a:r>
-          </a:p>
-          <a:p>
-            <a:r>
               <a:rPr lang="en-US" dirty="0" err="1"/>
-              <a:t>NewsAPI</a:t>
-            </a:r>
-            <a:r>
-              <a:rPr lang="en-US" dirty="0"/>
-              <a:t> - author, title, domain, </a:t>
-            </a:r>
-            <a:r>
-              <a:rPr lang="en-US" dirty="0" err="1"/>
-              <a:t>url</a:t>
-            </a:r>
-            <a:r>
-              <a:rPr lang="en-US" dirty="0"/>
-              <a:t>, headline, first 200 words</a:t>
-            </a:r>
-            <a:br>
-              <a:rPr lang="en-US" dirty="0"/>
-            </a:br>
-            <a:r>
-              <a:rPr lang="en-US" dirty="0"/>
-              <a:t>https://newsapi.org/ </a:t>
-            </a:r>
-          </a:p>
-          <a:p>
-            <a:r>
-              <a:rPr lang="en-US" dirty="0"/>
-              <a:t>Conservative/Liberal Bias of </a:t>
-            </a:r>
-            <a:r>
-              <a:rPr lang="en-US" dirty="0" err="1"/>
-              <a:t>NewsPapers</a:t>
-            </a:r>
-            <a:r>
-              <a:rPr lang="en-US" dirty="0"/>
-              <a:t> https://www.journalism.org/2014/10/21/political-polarization-media-habits/ </a:t>
+              <a:t>Chaithra</a:t>
+            </a:r>
+            <a:r>
+              <a:rPr lang="en-US" dirty="0"/>
+              <a:t>, V. D. (2019). Hybrid approach: naive bayes and sentiment VADER for analyzing sentiment of mobile unboxing video comments. International Journal of Electrical and Computer Engineering (IJECE), 9(5), 4452-4459.</a:t>
+            </a:r>
+          </a:p>
+          <a:p>
+            <a:endParaRPr lang="en-US" dirty="0"/>
+          </a:p>
+          <a:p>
+            <a:r>
+              <a:rPr lang="en-US" dirty="0"/>
+              <a:t>Davies, Mark. (2016-) Corpus of News on the Web (NOW): 10 billion words from 20 countries, updated every day. Available online at https://www.english-corpora.org/now/.</a:t>
+            </a:r>
+          </a:p>
+          <a:p>
+            <a:endParaRPr lang="en-US" dirty="0"/>
+          </a:p>
+          <a:p>
+            <a:r>
+              <a:rPr lang="en-US" dirty="0"/>
+              <a:t>Gilbert, C. H. E., &amp; Hutto, E. (2014, June). Vader: A parsimonious rule-based model for sentiment analysis of social media text. In Eighth International Conference on Weblogs and Social Media (ICWSM-14). Available at (20/04/16) http://comp.social.gatech.edu/papers/icwsm14.vader.hutto.pdf (Vol. 81, p. 82).</a:t>
+            </a:r>
+          </a:p>
+          <a:p>
+            <a:endParaRPr lang="en-US" dirty="0"/>
+          </a:p>
+          <a:p>
+            <a:r>
+              <a:rPr lang="en-US" dirty="0"/>
+              <a:t>Martin, B. &amp; Koufos, N. (2020). Sentiment analysis on Reddit news headlines with Python’s Natural Language Toolkit (NLTK). Learn Data Science. https://www.learndatasci.com/tutorials/sentiment-analysis-reddit-headlines-pythons-nltk/.</a:t>
+            </a:r>
+          </a:p>
+          <a:p>
+            <a:endParaRPr lang="en-US" dirty="0"/>
+          </a:p>
+          <a:p>
+            <a:r>
+              <a:rPr lang="en-US" dirty="0"/>
+              <a:t>Pew Research Center (2014). “Wave 1 American trends panel: Mar 19, 2014-Apr 29, 2014.” Washington, D.C. https://www.journalism.org/2014/10/21/political-polarization-media-habits/.</a:t>
             </a:r>
           </a:p>
         </p:txBody>

</xml_diff>